<commit_message>
Update the FDI case study.
</commit_message>
<xml_diff>
--- a/OT_System_Attack_Case_Study/PowerGrid_FDI/designDoc.pptx
+++ b/OT_System_Attack_Case_Study/PowerGrid_FDI/designDoc.pptx
@@ -7,6 +7,7 @@
   <p:sldIdLst>
     <p:sldId id="257" r:id="rId2"/>
     <p:sldId id="269" r:id="rId3"/>
+    <p:sldId id="270" r:id="rId4"/>
   </p:sldIdLst>
   <p:sldSz cx="12192000" cy="6858000"/>
   <p:notesSz cx="6858000" cy="9144000"/>
@@ -105,6 +106,11 @@
       </a:defRPr>
     </a:lvl9pPr>
   </p:defaultTextStyle>
+  <p:extLst>
+    <p:ext uri="{EFAFB233-063F-42B5-8137-9DF3F51BA10A}">
+      <p15:sldGuideLst xmlns:p15="http://schemas.microsoft.com/office/powerpoint/2012/main"/>
+    </p:ext>
+  </p:extLst>
 </p:presentation>
 </file>
 
@@ -257,7 +263,7 @@
           <a:p>
             <a:fld id="{B8627D30-517B-4F82-BB6C-561A23409F2A}" type="datetimeFigureOut">
               <a:rPr lang="en-SG" smtClean="0"/>
-              <a:t>7/1/2025</a:t>
+              <a:t>8/1/2025</a:t>
             </a:fld>
             <a:endParaRPr lang="en-SG"/>
           </a:p>
@@ -457,7 +463,7 @@
           <a:p>
             <a:fld id="{B8627D30-517B-4F82-BB6C-561A23409F2A}" type="datetimeFigureOut">
               <a:rPr lang="en-SG" smtClean="0"/>
-              <a:t>7/1/2025</a:t>
+              <a:t>8/1/2025</a:t>
             </a:fld>
             <a:endParaRPr lang="en-SG"/>
           </a:p>
@@ -667,7 +673,7 @@
           <a:p>
             <a:fld id="{B8627D30-517B-4F82-BB6C-561A23409F2A}" type="datetimeFigureOut">
               <a:rPr lang="en-SG" smtClean="0"/>
-              <a:t>7/1/2025</a:t>
+              <a:t>8/1/2025</a:t>
             </a:fld>
             <a:endParaRPr lang="en-SG"/>
           </a:p>
@@ -867,7 +873,7 @@
           <a:p>
             <a:fld id="{B8627D30-517B-4F82-BB6C-561A23409F2A}" type="datetimeFigureOut">
               <a:rPr lang="en-SG" smtClean="0"/>
-              <a:t>7/1/2025</a:t>
+              <a:t>8/1/2025</a:t>
             </a:fld>
             <a:endParaRPr lang="en-SG"/>
           </a:p>
@@ -1143,7 +1149,7 @@
           <a:p>
             <a:fld id="{B8627D30-517B-4F82-BB6C-561A23409F2A}" type="datetimeFigureOut">
               <a:rPr lang="en-SG" smtClean="0"/>
-              <a:t>7/1/2025</a:t>
+              <a:t>8/1/2025</a:t>
             </a:fld>
             <a:endParaRPr lang="en-SG"/>
           </a:p>
@@ -1411,7 +1417,7 @@
           <a:p>
             <a:fld id="{B8627D30-517B-4F82-BB6C-561A23409F2A}" type="datetimeFigureOut">
               <a:rPr lang="en-SG" smtClean="0"/>
-              <a:t>7/1/2025</a:t>
+              <a:t>8/1/2025</a:t>
             </a:fld>
             <a:endParaRPr lang="en-SG"/>
           </a:p>
@@ -1826,7 +1832,7 @@
           <a:p>
             <a:fld id="{B8627D30-517B-4F82-BB6C-561A23409F2A}" type="datetimeFigureOut">
               <a:rPr lang="en-SG" smtClean="0"/>
-              <a:t>7/1/2025</a:t>
+              <a:t>8/1/2025</a:t>
             </a:fld>
             <a:endParaRPr lang="en-SG"/>
           </a:p>
@@ -1968,7 +1974,7 @@
           <a:p>
             <a:fld id="{B8627D30-517B-4F82-BB6C-561A23409F2A}" type="datetimeFigureOut">
               <a:rPr lang="en-SG" smtClean="0"/>
-              <a:t>7/1/2025</a:t>
+              <a:t>8/1/2025</a:t>
             </a:fld>
             <a:endParaRPr lang="en-SG"/>
           </a:p>
@@ -2081,7 +2087,7 @@
           <a:p>
             <a:fld id="{B8627D30-517B-4F82-BB6C-561A23409F2A}" type="datetimeFigureOut">
               <a:rPr lang="en-SG" smtClean="0"/>
-              <a:t>7/1/2025</a:t>
+              <a:t>8/1/2025</a:t>
             </a:fld>
             <a:endParaRPr lang="en-SG"/>
           </a:p>
@@ -2394,7 +2400,7 @@
           <a:p>
             <a:fld id="{B8627D30-517B-4F82-BB6C-561A23409F2A}" type="datetimeFigureOut">
               <a:rPr lang="en-SG" smtClean="0"/>
-              <a:t>7/1/2025</a:t>
+              <a:t>8/1/2025</a:t>
             </a:fld>
             <a:endParaRPr lang="en-SG"/>
           </a:p>
@@ -2683,7 +2689,7 @@
           <a:p>
             <a:fld id="{B8627D30-517B-4F82-BB6C-561A23409F2A}" type="datetimeFigureOut">
               <a:rPr lang="en-SG" smtClean="0"/>
-              <a:t>7/1/2025</a:t>
+              <a:t>8/1/2025</a:t>
             </a:fld>
             <a:endParaRPr lang="en-SG"/>
           </a:p>
@@ -2926,7 +2932,7 @@
           <a:p>
             <a:fld id="{B8627D30-517B-4F82-BB6C-561A23409F2A}" type="datetimeFigureOut">
               <a:rPr lang="en-SG" smtClean="0"/>
-              <a:t>7/1/2025</a:t>
+              <a:t>8/1/2025</a:t>
             </a:fld>
             <a:endParaRPr lang="en-SG"/>
           </a:p>
@@ -8680,6 +8686,1266 @@
     <p:extLst>
       <p:ext uri="{BB962C8B-B14F-4D97-AF65-F5344CB8AC3E}">
         <p14:creationId xmlns:p14="http://schemas.microsoft.com/office/powerpoint/2010/main" val="3667390039"/>
+      </p:ext>
+    </p:extLst>
+  </p:cSld>
+  <p:clrMapOvr>
+    <a:masterClrMapping/>
+  </p:clrMapOvr>
+</p:sld>
+</file>
+
+<file path=ppt/slides/slide3.xml><?xml version="1.0" encoding="utf-8"?>
+<p:sld xmlns:a="http://schemas.openxmlformats.org/drawingml/2006/main" xmlns:r="http://schemas.openxmlformats.org/officeDocument/2006/relationships" xmlns:p="http://schemas.openxmlformats.org/presentationml/2006/main">
+  <p:cSld>
+    <p:spTree>
+      <p:nvGrpSpPr>
+        <p:cNvPr id="1" name=""/>
+        <p:cNvGrpSpPr/>
+        <p:nvPr/>
+      </p:nvGrpSpPr>
+      <p:grpSpPr>
+        <a:xfrm>
+          <a:off x="0" y="0"/>
+          <a:ext cx="0" cy="0"/>
+          <a:chOff x="0" y="0"/>
+          <a:chExt cx="0" cy="0"/>
+        </a:xfrm>
+      </p:grpSpPr>
+      <p:sp>
+        <p:nvSpPr>
+          <p:cNvPr id="4" name="Rectangle: Rounded Corners 3">
+            <a:extLst>
+              <a:ext uri="{FF2B5EF4-FFF2-40B4-BE49-F238E27FC236}">
+                <a16:creationId xmlns:a16="http://schemas.microsoft.com/office/drawing/2014/main" id="{96E2912D-D956-6015-1BA1-9593DD37DBD8}"/>
+              </a:ext>
+            </a:extLst>
+          </p:cNvPr>
+          <p:cNvSpPr/>
+          <p:nvPr/>
+        </p:nvSpPr>
+        <p:spPr>
+          <a:xfrm>
+            <a:off x="585794" y="1890333"/>
+            <a:ext cx="1130711" cy="576072"/>
+          </a:xfrm>
+          <a:prstGeom prst="roundRect">
+            <a:avLst/>
+          </a:prstGeom>
+        </p:spPr>
+        <p:style>
+          <a:lnRef idx="2">
+            <a:schemeClr val="accent2">
+              <a:shade val="15000"/>
+            </a:schemeClr>
+          </a:lnRef>
+          <a:fillRef idx="1">
+            <a:schemeClr val="accent2"/>
+          </a:fillRef>
+          <a:effectRef idx="0">
+            <a:schemeClr val="accent2"/>
+          </a:effectRef>
+          <a:fontRef idx="minor">
+            <a:schemeClr val="lt1"/>
+          </a:fontRef>
+        </p:style>
+        <p:txBody>
+          <a:bodyPr rtlCol="0" anchor="ctr"/>
+          <a:lstStyle/>
+          <a:p>
+            <a:pPr algn="ctr"/>
+            <a:r>
+              <a:rPr lang="en-US" sz="1200" b="1" dirty="0"/>
+              <a:t>System Introduction</a:t>
+            </a:r>
+            <a:endParaRPr lang="en-SG" sz="1200" b="1" dirty="0"/>
+          </a:p>
+        </p:txBody>
+      </p:sp>
+      <p:sp>
+        <p:nvSpPr>
+          <p:cNvPr id="5" name="Arrow: Right 4">
+            <a:extLst>
+              <a:ext uri="{FF2B5EF4-FFF2-40B4-BE49-F238E27FC236}">
+                <a16:creationId xmlns:a16="http://schemas.microsoft.com/office/drawing/2014/main" id="{126A2766-D704-3C06-264D-DDC4EB6EF5BB}"/>
+              </a:ext>
+            </a:extLst>
+          </p:cNvPr>
+          <p:cNvSpPr/>
+          <p:nvPr/>
+        </p:nvSpPr>
+        <p:spPr>
+          <a:xfrm>
+            <a:off x="1770159" y="2023731"/>
+            <a:ext cx="265176" cy="239154"/>
+          </a:xfrm>
+          <a:prstGeom prst="rightArrow">
+            <a:avLst/>
+          </a:prstGeom>
+          <a:solidFill>
+            <a:schemeClr val="accent2"/>
+          </a:solidFill>
+        </p:spPr>
+        <p:style>
+          <a:lnRef idx="2">
+            <a:schemeClr val="accent1">
+              <a:shade val="15000"/>
+            </a:schemeClr>
+          </a:lnRef>
+          <a:fillRef idx="1">
+            <a:schemeClr val="accent1"/>
+          </a:fillRef>
+          <a:effectRef idx="0">
+            <a:schemeClr val="accent1"/>
+          </a:effectRef>
+          <a:fontRef idx="minor">
+            <a:schemeClr val="lt1"/>
+          </a:fontRef>
+        </p:style>
+        <p:txBody>
+          <a:bodyPr rtlCol="0" anchor="ctr"/>
+          <a:lstStyle/>
+          <a:p>
+            <a:pPr algn="ctr"/>
+            <a:endParaRPr lang="en-SG"/>
+          </a:p>
+        </p:txBody>
+      </p:sp>
+      <p:sp>
+        <p:nvSpPr>
+          <p:cNvPr id="6" name="Rectangle: Rounded Corners 5">
+            <a:extLst>
+              <a:ext uri="{FF2B5EF4-FFF2-40B4-BE49-F238E27FC236}">
+                <a16:creationId xmlns:a16="http://schemas.microsoft.com/office/drawing/2014/main" id="{18CA6B9B-B63D-1BB1-0F57-1C25BCCB4F40}"/>
+              </a:ext>
+            </a:extLst>
+          </p:cNvPr>
+          <p:cNvSpPr/>
+          <p:nvPr/>
+        </p:nvSpPr>
+        <p:spPr>
+          <a:xfrm>
+            <a:off x="2099999" y="1890333"/>
+            <a:ext cx="1130711" cy="576072"/>
+          </a:xfrm>
+          <a:prstGeom prst="roundRect">
+            <a:avLst/>
+          </a:prstGeom>
+          <a:solidFill>
+            <a:schemeClr val="accent6">
+              <a:lumMod val="75000"/>
+            </a:schemeClr>
+          </a:solidFill>
+        </p:spPr>
+        <p:style>
+          <a:lnRef idx="2">
+            <a:schemeClr val="accent2">
+              <a:shade val="15000"/>
+            </a:schemeClr>
+          </a:lnRef>
+          <a:fillRef idx="1">
+            <a:schemeClr val="accent2"/>
+          </a:fillRef>
+          <a:effectRef idx="0">
+            <a:schemeClr val="accent2"/>
+          </a:effectRef>
+          <a:fontRef idx="minor">
+            <a:schemeClr val="lt1"/>
+          </a:fontRef>
+        </p:style>
+        <p:txBody>
+          <a:bodyPr rtlCol="0" anchor="ctr"/>
+          <a:lstStyle/>
+          <a:p>
+            <a:pPr algn="ctr"/>
+            <a:r>
+              <a:rPr lang="en-US" sz="1200" b="1" dirty="0"/>
+              <a:t>Background knowledge </a:t>
+            </a:r>
+            <a:endParaRPr lang="en-SG" sz="1200" b="1" dirty="0"/>
+          </a:p>
+        </p:txBody>
+      </p:sp>
+      <p:sp>
+        <p:nvSpPr>
+          <p:cNvPr id="7" name="Arrow: Right 6">
+            <a:extLst>
+              <a:ext uri="{FF2B5EF4-FFF2-40B4-BE49-F238E27FC236}">
+                <a16:creationId xmlns:a16="http://schemas.microsoft.com/office/drawing/2014/main" id="{5E925369-A3DB-CBDE-64BD-E68E0B62A2AD}"/>
+              </a:ext>
+            </a:extLst>
+          </p:cNvPr>
+          <p:cNvSpPr/>
+          <p:nvPr/>
+        </p:nvSpPr>
+        <p:spPr>
+          <a:xfrm rot="19188392">
+            <a:off x="3293006" y="1727245"/>
+            <a:ext cx="265176" cy="239154"/>
+          </a:xfrm>
+          <a:prstGeom prst="rightArrow">
+            <a:avLst/>
+          </a:prstGeom>
+          <a:solidFill>
+            <a:schemeClr val="accent6">
+              <a:lumMod val="75000"/>
+            </a:schemeClr>
+          </a:solidFill>
+        </p:spPr>
+        <p:style>
+          <a:lnRef idx="2">
+            <a:schemeClr val="accent1">
+              <a:shade val="15000"/>
+            </a:schemeClr>
+          </a:lnRef>
+          <a:fillRef idx="1">
+            <a:schemeClr val="accent1"/>
+          </a:fillRef>
+          <a:effectRef idx="0">
+            <a:schemeClr val="accent1"/>
+          </a:effectRef>
+          <a:fontRef idx="minor">
+            <a:schemeClr val="lt1"/>
+          </a:fontRef>
+        </p:style>
+        <p:txBody>
+          <a:bodyPr rtlCol="0" anchor="ctr"/>
+          <a:lstStyle/>
+          <a:p>
+            <a:pPr algn="ctr"/>
+            <a:endParaRPr lang="en-SG"/>
+          </a:p>
+        </p:txBody>
+      </p:sp>
+      <p:sp>
+        <p:nvSpPr>
+          <p:cNvPr id="8" name="Rectangle: Rounded Corners 7">
+            <a:extLst>
+              <a:ext uri="{FF2B5EF4-FFF2-40B4-BE49-F238E27FC236}">
+                <a16:creationId xmlns:a16="http://schemas.microsoft.com/office/drawing/2014/main" id="{BE895092-D2A0-9FDC-16D0-5BB1FFAEF0B8}"/>
+              </a:ext>
+            </a:extLst>
+          </p:cNvPr>
+          <p:cNvSpPr/>
+          <p:nvPr/>
+        </p:nvSpPr>
+        <p:spPr>
+          <a:xfrm>
+            <a:off x="3689076" y="1476210"/>
+            <a:ext cx="1130711" cy="576072"/>
+          </a:xfrm>
+          <a:prstGeom prst="roundRect">
+            <a:avLst/>
+          </a:prstGeom>
+          <a:solidFill>
+            <a:schemeClr val="tx2">
+              <a:lumMod val="75000"/>
+              <a:lumOff val="25000"/>
+            </a:schemeClr>
+          </a:solidFill>
+        </p:spPr>
+        <p:style>
+          <a:lnRef idx="2">
+            <a:schemeClr val="accent2">
+              <a:shade val="15000"/>
+            </a:schemeClr>
+          </a:lnRef>
+          <a:fillRef idx="1">
+            <a:schemeClr val="accent2"/>
+          </a:fillRef>
+          <a:effectRef idx="0">
+            <a:schemeClr val="accent2"/>
+          </a:effectRef>
+          <a:fontRef idx="minor">
+            <a:schemeClr val="lt1"/>
+          </a:fontRef>
+        </p:style>
+        <p:txBody>
+          <a:bodyPr rtlCol="0" anchor="ctr"/>
+          <a:lstStyle/>
+          <a:p>
+            <a:pPr lvl="0"/>
+            <a:r>
+              <a:rPr lang="en-US" sz="1200" b="1" dirty="0"/>
+              <a:t>Vulnerability Introduction </a:t>
+            </a:r>
+            <a:endParaRPr lang="en-SG" sz="1200" dirty="0"/>
+          </a:p>
+        </p:txBody>
+      </p:sp>
+      <p:sp>
+        <p:nvSpPr>
+          <p:cNvPr id="9" name="Arrow: Right 8">
+            <a:extLst>
+              <a:ext uri="{FF2B5EF4-FFF2-40B4-BE49-F238E27FC236}">
+                <a16:creationId xmlns:a16="http://schemas.microsoft.com/office/drawing/2014/main" id="{BF08C941-011A-6E9C-BE5F-019FEAF4FEC5}"/>
+              </a:ext>
+            </a:extLst>
+          </p:cNvPr>
+          <p:cNvSpPr/>
+          <p:nvPr/>
+        </p:nvSpPr>
+        <p:spPr>
+          <a:xfrm rot="1948786">
+            <a:off x="3308552" y="2428436"/>
+            <a:ext cx="265176" cy="239154"/>
+          </a:xfrm>
+          <a:prstGeom prst="rightArrow">
+            <a:avLst/>
+          </a:prstGeom>
+          <a:solidFill>
+            <a:schemeClr val="accent6">
+              <a:lumMod val="75000"/>
+            </a:schemeClr>
+          </a:solidFill>
+        </p:spPr>
+        <p:style>
+          <a:lnRef idx="2">
+            <a:schemeClr val="accent1">
+              <a:shade val="15000"/>
+            </a:schemeClr>
+          </a:lnRef>
+          <a:fillRef idx="1">
+            <a:schemeClr val="accent1"/>
+          </a:fillRef>
+          <a:effectRef idx="0">
+            <a:schemeClr val="accent1"/>
+          </a:effectRef>
+          <a:fontRef idx="minor">
+            <a:schemeClr val="lt1"/>
+          </a:fontRef>
+        </p:style>
+        <p:txBody>
+          <a:bodyPr rtlCol="0" anchor="ctr"/>
+          <a:lstStyle/>
+          <a:p>
+            <a:pPr algn="ctr"/>
+            <a:endParaRPr lang="en-SG"/>
+          </a:p>
+        </p:txBody>
+      </p:sp>
+      <p:sp>
+        <p:nvSpPr>
+          <p:cNvPr id="10" name="Rectangle: Rounded Corners 9">
+            <a:extLst>
+              <a:ext uri="{FF2B5EF4-FFF2-40B4-BE49-F238E27FC236}">
+                <a16:creationId xmlns:a16="http://schemas.microsoft.com/office/drawing/2014/main" id="{3FB0E68D-E2FF-36E0-EB67-525C0B8E93DC}"/>
+              </a:ext>
+            </a:extLst>
+          </p:cNvPr>
+          <p:cNvSpPr/>
+          <p:nvPr/>
+        </p:nvSpPr>
+        <p:spPr>
+          <a:xfrm>
+            <a:off x="3682361" y="2401832"/>
+            <a:ext cx="1216635" cy="576072"/>
+          </a:xfrm>
+          <a:prstGeom prst="roundRect">
+            <a:avLst/>
+          </a:prstGeom>
+          <a:solidFill>
+            <a:schemeClr val="tx2">
+              <a:lumMod val="50000"/>
+              <a:lumOff val="50000"/>
+            </a:schemeClr>
+          </a:solidFill>
+        </p:spPr>
+        <p:style>
+          <a:lnRef idx="2">
+            <a:schemeClr val="accent2">
+              <a:shade val="15000"/>
+            </a:schemeClr>
+          </a:lnRef>
+          <a:fillRef idx="1">
+            <a:schemeClr val="accent2"/>
+          </a:fillRef>
+          <a:effectRef idx="0">
+            <a:schemeClr val="accent2"/>
+          </a:effectRef>
+          <a:fontRef idx="minor">
+            <a:schemeClr val="lt1"/>
+          </a:fontRef>
+        </p:style>
+        <p:txBody>
+          <a:bodyPr rtlCol="0" anchor="ctr"/>
+          <a:lstStyle/>
+          <a:p>
+            <a:pPr lvl="0"/>
+            <a:r>
+              <a:rPr lang="en-US" sz="1200" b="1" dirty="0"/>
+              <a:t>Attack Vector Introduction </a:t>
+            </a:r>
+            <a:endParaRPr lang="en-SG" sz="1200" dirty="0"/>
+          </a:p>
+        </p:txBody>
+      </p:sp>
+      <p:sp>
+        <p:nvSpPr>
+          <p:cNvPr id="11" name="Arrow: Right 10">
+            <a:extLst>
+              <a:ext uri="{FF2B5EF4-FFF2-40B4-BE49-F238E27FC236}">
+                <a16:creationId xmlns:a16="http://schemas.microsoft.com/office/drawing/2014/main" id="{A8627963-739F-5830-F0F8-9AFDE543A2BB}"/>
+              </a:ext>
+            </a:extLst>
+          </p:cNvPr>
+          <p:cNvSpPr/>
+          <p:nvPr/>
+        </p:nvSpPr>
+        <p:spPr>
+          <a:xfrm rot="1818275">
+            <a:off x="4978403" y="2015795"/>
+            <a:ext cx="265176" cy="239154"/>
+          </a:xfrm>
+          <a:prstGeom prst="rightArrow">
+            <a:avLst/>
+          </a:prstGeom>
+          <a:solidFill>
+            <a:schemeClr val="tx2">
+              <a:lumMod val="75000"/>
+              <a:lumOff val="25000"/>
+            </a:schemeClr>
+          </a:solidFill>
+        </p:spPr>
+        <p:style>
+          <a:lnRef idx="2">
+            <a:schemeClr val="accent1">
+              <a:shade val="15000"/>
+            </a:schemeClr>
+          </a:lnRef>
+          <a:fillRef idx="1">
+            <a:schemeClr val="accent1"/>
+          </a:fillRef>
+          <a:effectRef idx="0">
+            <a:schemeClr val="accent1"/>
+          </a:effectRef>
+          <a:fontRef idx="minor">
+            <a:schemeClr val="lt1"/>
+          </a:fontRef>
+        </p:style>
+        <p:txBody>
+          <a:bodyPr rtlCol="0" anchor="ctr"/>
+          <a:lstStyle/>
+          <a:p>
+            <a:pPr algn="ctr"/>
+            <a:endParaRPr lang="en-SG"/>
+          </a:p>
+        </p:txBody>
+      </p:sp>
+      <p:sp>
+        <p:nvSpPr>
+          <p:cNvPr id="12" name="Arrow: Right 11">
+            <a:extLst>
+              <a:ext uri="{FF2B5EF4-FFF2-40B4-BE49-F238E27FC236}">
+                <a16:creationId xmlns:a16="http://schemas.microsoft.com/office/drawing/2014/main" id="{A3BB8F0D-6DC9-BF64-7027-C09F04FE43D4}"/>
+              </a:ext>
+            </a:extLst>
+          </p:cNvPr>
+          <p:cNvSpPr/>
+          <p:nvPr/>
+        </p:nvSpPr>
+        <p:spPr>
+          <a:xfrm rot="19840491">
+            <a:off x="5011587" y="2634647"/>
+            <a:ext cx="265176" cy="239154"/>
+          </a:xfrm>
+          <a:prstGeom prst="rightArrow">
+            <a:avLst/>
+          </a:prstGeom>
+          <a:solidFill>
+            <a:schemeClr val="tx2">
+              <a:lumMod val="50000"/>
+              <a:lumOff val="50000"/>
+            </a:schemeClr>
+          </a:solidFill>
+        </p:spPr>
+        <p:style>
+          <a:lnRef idx="2">
+            <a:schemeClr val="accent1">
+              <a:shade val="15000"/>
+            </a:schemeClr>
+          </a:lnRef>
+          <a:fillRef idx="1">
+            <a:schemeClr val="accent1"/>
+          </a:fillRef>
+          <a:effectRef idx="0">
+            <a:schemeClr val="accent1"/>
+          </a:effectRef>
+          <a:fontRef idx="minor">
+            <a:schemeClr val="lt1"/>
+          </a:fontRef>
+        </p:style>
+        <p:txBody>
+          <a:bodyPr rtlCol="0" anchor="ctr"/>
+          <a:lstStyle/>
+          <a:p>
+            <a:pPr algn="ctr"/>
+            <a:endParaRPr lang="en-SG" dirty="0"/>
+          </a:p>
+        </p:txBody>
+      </p:sp>
+      <p:sp>
+        <p:nvSpPr>
+          <p:cNvPr id="13" name="Rectangle: Rounded Corners 12">
+            <a:extLst>
+              <a:ext uri="{FF2B5EF4-FFF2-40B4-BE49-F238E27FC236}">
+                <a16:creationId xmlns:a16="http://schemas.microsoft.com/office/drawing/2014/main" id="{849E1D2F-4D0B-0D71-5650-53C83F88137F}"/>
+              </a:ext>
+            </a:extLst>
+          </p:cNvPr>
+          <p:cNvSpPr/>
+          <p:nvPr/>
+        </p:nvSpPr>
+        <p:spPr>
+          <a:xfrm>
+            <a:off x="5313093" y="2101083"/>
+            <a:ext cx="1130711" cy="576072"/>
+          </a:xfrm>
+          <a:prstGeom prst="roundRect">
+            <a:avLst/>
+          </a:prstGeom>
+          <a:solidFill>
+            <a:srgbClr val="C00000"/>
+          </a:solidFill>
+        </p:spPr>
+        <p:style>
+          <a:lnRef idx="2">
+            <a:schemeClr val="accent2">
+              <a:shade val="15000"/>
+            </a:schemeClr>
+          </a:lnRef>
+          <a:fillRef idx="1">
+            <a:schemeClr val="accent2"/>
+          </a:fillRef>
+          <a:effectRef idx="0">
+            <a:schemeClr val="accent2"/>
+          </a:effectRef>
+          <a:fontRef idx="minor">
+            <a:schemeClr val="lt1"/>
+          </a:fontRef>
+        </p:style>
+        <p:txBody>
+          <a:bodyPr rtlCol="0" anchor="ctr"/>
+          <a:lstStyle/>
+          <a:p>
+            <a:pPr algn="ctr"/>
+            <a:r>
+              <a:rPr lang="en-US" sz="1200" b="1" dirty="0"/>
+              <a:t>Attack Demo</a:t>
+            </a:r>
+            <a:endParaRPr lang="en-SG" sz="1200" b="1" dirty="0"/>
+          </a:p>
+        </p:txBody>
+      </p:sp>
+      <p:sp>
+        <p:nvSpPr>
+          <p:cNvPr id="14" name="Arrow: Right 13">
+            <a:extLst>
+              <a:ext uri="{FF2B5EF4-FFF2-40B4-BE49-F238E27FC236}">
+                <a16:creationId xmlns:a16="http://schemas.microsoft.com/office/drawing/2014/main" id="{157855F4-D2C6-58AA-7CB6-4622331F4EA9}"/>
+              </a:ext>
+            </a:extLst>
+          </p:cNvPr>
+          <p:cNvSpPr/>
+          <p:nvPr/>
+        </p:nvSpPr>
+        <p:spPr>
+          <a:xfrm>
+            <a:off x="6508326" y="2245129"/>
+            <a:ext cx="265176" cy="239154"/>
+          </a:xfrm>
+          <a:prstGeom prst="rightArrow">
+            <a:avLst/>
+          </a:prstGeom>
+          <a:solidFill>
+            <a:srgbClr val="C00000"/>
+          </a:solidFill>
+        </p:spPr>
+        <p:style>
+          <a:lnRef idx="2">
+            <a:schemeClr val="accent1">
+              <a:shade val="15000"/>
+            </a:schemeClr>
+          </a:lnRef>
+          <a:fillRef idx="1">
+            <a:schemeClr val="accent1"/>
+          </a:fillRef>
+          <a:effectRef idx="0">
+            <a:schemeClr val="accent1"/>
+          </a:effectRef>
+          <a:fontRef idx="minor">
+            <a:schemeClr val="lt1"/>
+          </a:fontRef>
+        </p:style>
+        <p:txBody>
+          <a:bodyPr rtlCol="0" anchor="ctr"/>
+          <a:lstStyle/>
+          <a:p>
+            <a:pPr algn="ctr"/>
+            <a:endParaRPr lang="en-SG"/>
+          </a:p>
+        </p:txBody>
+      </p:sp>
+      <p:sp>
+        <p:nvSpPr>
+          <p:cNvPr id="15" name="Rectangle: Rounded Corners 14">
+            <a:extLst>
+              <a:ext uri="{FF2B5EF4-FFF2-40B4-BE49-F238E27FC236}">
+                <a16:creationId xmlns:a16="http://schemas.microsoft.com/office/drawing/2014/main" id="{91A84CB9-E26E-0309-1FB4-69BBF7CA5B13}"/>
+              </a:ext>
+            </a:extLst>
+          </p:cNvPr>
+          <p:cNvSpPr/>
+          <p:nvPr/>
+        </p:nvSpPr>
+        <p:spPr>
+          <a:xfrm>
+            <a:off x="6909398" y="2095888"/>
+            <a:ext cx="1130711" cy="576072"/>
+          </a:xfrm>
+          <a:prstGeom prst="roundRect">
+            <a:avLst/>
+          </a:prstGeom>
+          <a:solidFill>
+            <a:schemeClr val="accent5">
+              <a:lumMod val="75000"/>
+            </a:schemeClr>
+          </a:solidFill>
+        </p:spPr>
+        <p:style>
+          <a:lnRef idx="2">
+            <a:schemeClr val="accent2">
+              <a:shade val="15000"/>
+            </a:schemeClr>
+          </a:lnRef>
+          <a:fillRef idx="1">
+            <a:schemeClr val="accent2"/>
+          </a:fillRef>
+          <a:effectRef idx="0">
+            <a:schemeClr val="accent2"/>
+          </a:effectRef>
+          <a:fontRef idx="minor">
+            <a:schemeClr val="lt1"/>
+          </a:fontRef>
+        </p:style>
+        <p:txBody>
+          <a:bodyPr rtlCol="0" anchor="ctr"/>
+          <a:lstStyle/>
+          <a:p>
+            <a:pPr algn="ctr"/>
+            <a:r>
+              <a:rPr lang="en-US" sz="1200" b="1" dirty="0"/>
+              <a:t>Attack Path analysis </a:t>
+            </a:r>
+            <a:endParaRPr lang="en-SG" sz="1200" b="1" dirty="0"/>
+          </a:p>
+        </p:txBody>
+      </p:sp>
+      <p:sp>
+        <p:nvSpPr>
+          <p:cNvPr id="16" name="Arrow: Right 15">
+            <a:extLst>
+              <a:ext uri="{FF2B5EF4-FFF2-40B4-BE49-F238E27FC236}">
+                <a16:creationId xmlns:a16="http://schemas.microsoft.com/office/drawing/2014/main" id="{2F0A3F9F-D823-C56D-853A-4DE9FA322657}"/>
+              </a:ext>
+            </a:extLst>
+          </p:cNvPr>
+          <p:cNvSpPr/>
+          <p:nvPr/>
+        </p:nvSpPr>
+        <p:spPr>
+          <a:xfrm rot="16200000">
+            <a:off x="7306691" y="1745509"/>
+            <a:ext cx="265176" cy="239154"/>
+          </a:xfrm>
+          <a:prstGeom prst="rightArrow">
+            <a:avLst/>
+          </a:prstGeom>
+          <a:solidFill>
+            <a:schemeClr val="tx2">
+              <a:lumMod val="25000"/>
+              <a:lumOff val="75000"/>
+            </a:schemeClr>
+          </a:solidFill>
+          <a:ln>
+            <a:solidFill>
+              <a:schemeClr val="accent1"/>
+            </a:solidFill>
+          </a:ln>
+        </p:spPr>
+        <p:style>
+          <a:lnRef idx="2">
+            <a:schemeClr val="accent1">
+              <a:shade val="15000"/>
+            </a:schemeClr>
+          </a:lnRef>
+          <a:fillRef idx="1">
+            <a:schemeClr val="accent1"/>
+          </a:fillRef>
+          <a:effectRef idx="0">
+            <a:schemeClr val="accent1"/>
+          </a:effectRef>
+          <a:fontRef idx="minor">
+            <a:schemeClr val="lt1"/>
+          </a:fontRef>
+        </p:style>
+        <p:txBody>
+          <a:bodyPr rtlCol="0" anchor="ctr"/>
+          <a:lstStyle/>
+          <a:p>
+            <a:pPr algn="ctr"/>
+            <a:endParaRPr lang="en-SG" dirty="0"/>
+          </a:p>
+        </p:txBody>
+      </p:sp>
+      <p:sp>
+        <p:nvSpPr>
+          <p:cNvPr id="17" name="Rectangle: Rounded Corners 16">
+            <a:extLst>
+              <a:ext uri="{FF2B5EF4-FFF2-40B4-BE49-F238E27FC236}">
+                <a16:creationId xmlns:a16="http://schemas.microsoft.com/office/drawing/2014/main" id="{80B20F6D-7CAF-C6AD-2625-9D1C7DB248B3}"/>
+              </a:ext>
+            </a:extLst>
+          </p:cNvPr>
+          <p:cNvSpPr/>
+          <p:nvPr/>
+        </p:nvSpPr>
+        <p:spPr>
+          <a:xfrm>
+            <a:off x="6759412" y="1039585"/>
+            <a:ext cx="1564720" cy="576072"/>
+          </a:xfrm>
+          <a:prstGeom prst="roundRect">
+            <a:avLst/>
+          </a:prstGeom>
+          <a:solidFill>
+            <a:schemeClr val="tx2">
+              <a:lumMod val="75000"/>
+              <a:lumOff val="25000"/>
+            </a:schemeClr>
+          </a:solidFill>
+          <a:ln>
+            <a:solidFill>
+              <a:srgbClr val="0070C0"/>
+            </a:solidFill>
+          </a:ln>
+        </p:spPr>
+        <p:style>
+          <a:lnRef idx="2">
+            <a:schemeClr val="accent2">
+              <a:shade val="15000"/>
+            </a:schemeClr>
+          </a:lnRef>
+          <a:fillRef idx="1">
+            <a:schemeClr val="accent2"/>
+          </a:fillRef>
+          <a:effectRef idx="0">
+            <a:schemeClr val="accent2"/>
+          </a:effectRef>
+          <a:fontRef idx="minor">
+            <a:schemeClr val="lt1"/>
+          </a:fontRef>
+        </p:style>
+        <p:txBody>
+          <a:bodyPr rtlCol="0" anchor="ctr"/>
+          <a:lstStyle/>
+          <a:p>
+            <a:pPr lvl="0"/>
+            <a:r>
+              <a:rPr lang="en-US" sz="1200" b="1" dirty="0"/>
+              <a:t>Defense strategies Implement </a:t>
+            </a:r>
+            <a:endParaRPr lang="en-SG" sz="1200" b="1" dirty="0"/>
+          </a:p>
+        </p:txBody>
+      </p:sp>
+      <p:sp>
+        <p:nvSpPr>
+          <p:cNvPr id="18" name="Arrow: Right 17">
+            <a:extLst>
+              <a:ext uri="{FF2B5EF4-FFF2-40B4-BE49-F238E27FC236}">
+                <a16:creationId xmlns:a16="http://schemas.microsoft.com/office/drawing/2014/main" id="{8461E0B2-8E54-674D-8611-3249FC4FBBF6}"/>
+              </a:ext>
+            </a:extLst>
+          </p:cNvPr>
+          <p:cNvSpPr/>
+          <p:nvPr/>
+        </p:nvSpPr>
+        <p:spPr>
+          <a:xfrm rot="19731344">
+            <a:off x="4888605" y="1277199"/>
+            <a:ext cx="265176" cy="239154"/>
+          </a:xfrm>
+          <a:prstGeom prst="rightArrow">
+            <a:avLst/>
+          </a:prstGeom>
+          <a:solidFill>
+            <a:schemeClr val="tx2">
+              <a:lumMod val="75000"/>
+              <a:lumOff val="25000"/>
+            </a:schemeClr>
+          </a:solidFill>
+        </p:spPr>
+        <p:style>
+          <a:lnRef idx="2">
+            <a:schemeClr val="accent1">
+              <a:shade val="15000"/>
+            </a:schemeClr>
+          </a:lnRef>
+          <a:fillRef idx="1">
+            <a:schemeClr val="accent1"/>
+          </a:fillRef>
+          <a:effectRef idx="0">
+            <a:schemeClr val="accent1"/>
+          </a:effectRef>
+          <a:fontRef idx="minor">
+            <a:schemeClr val="lt1"/>
+          </a:fontRef>
+        </p:style>
+        <p:txBody>
+          <a:bodyPr rtlCol="0" anchor="ctr"/>
+          <a:lstStyle/>
+          <a:p>
+            <a:pPr algn="ctr"/>
+            <a:endParaRPr lang="en-SG"/>
+          </a:p>
+        </p:txBody>
+      </p:sp>
+      <p:pic>
+        <p:nvPicPr>
+          <p:cNvPr id="19" name="Picture 18">
+            <a:extLst>
+              <a:ext uri="{FF2B5EF4-FFF2-40B4-BE49-F238E27FC236}">
+                <a16:creationId xmlns:a16="http://schemas.microsoft.com/office/drawing/2014/main" id="{85E2F316-3B54-5A90-2117-69711C1E60A4}"/>
+              </a:ext>
+            </a:extLst>
+          </p:cNvPr>
+          <p:cNvPicPr>
+            <a:picLocks noChangeAspect="1"/>
+          </p:cNvPicPr>
+          <p:nvPr/>
+        </p:nvPicPr>
+        <p:blipFill>
+          <a:blip r:embed="rId2"/>
+          <a:stretch>
+            <a:fillRect/>
+          </a:stretch>
+        </p:blipFill>
+        <p:spPr>
+          <a:xfrm>
+            <a:off x="5218378" y="1002822"/>
+            <a:ext cx="1125173" cy="582782"/>
+          </a:xfrm>
+          <a:prstGeom prst="rect">
+            <a:avLst/>
+          </a:prstGeom>
+          <a:ln w="12700">
+            <a:solidFill>
+              <a:schemeClr val="tx1"/>
+            </a:solidFill>
+          </a:ln>
+        </p:spPr>
+      </p:pic>
+      <p:sp>
+        <p:nvSpPr>
+          <p:cNvPr id="20" name="Arrow: Right 19">
+            <a:extLst>
+              <a:ext uri="{FF2B5EF4-FFF2-40B4-BE49-F238E27FC236}">
+                <a16:creationId xmlns:a16="http://schemas.microsoft.com/office/drawing/2014/main" id="{609DD587-E9E6-EA99-D557-EBC3886E7332}"/>
+              </a:ext>
+            </a:extLst>
+          </p:cNvPr>
+          <p:cNvSpPr/>
+          <p:nvPr/>
+        </p:nvSpPr>
+        <p:spPr>
+          <a:xfrm>
+            <a:off x="6418893" y="1182572"/>
+            <a:ext cx="265176" cy="239154"/>
+          </a:xfrm>
+          <a:prstGeom prst="rightArrow">
+            <a:avLst/>
+          </a:prstGeom>
+          <a:solidFill>
+            <a:schemeClr val="tx2">
+              <a:lumMod val="75000"/>
+              <a:lumOff val="25000"/>
+            </a:schemeClr>
+          </a:solidFill>
+        </p:spPr>
+        <p:style>
+          <a:lnRef idx="2">
+            <a:schemeClr val="accent1">
+              <a:shade val="15000"/>
+            </a:schemeClr>
+          </a:lnRef>
+          <a:fillRef idx="1">
+            <a:schemeClr val="accent1"/>
+          </a:fillRef>
+          <a:effectRef idx="0">
+            <a:schemeClr val="accent1"/>
+          </a:effectRef>
+          <a:fontRef idx="minor">
+            <a:schemeClr val="lt1"/>
+          </a:fontRef>
+        </p:style>
+        <p:txBody>
+          <a:bodyPr rtlCol="0" anchor="ctr"/>
+          <a:lstStyle/>
+          <a:p>
+            <a:pPr algn="ctr"/>
+            <a:endParaRPr lang="en-SG"/>
+          </a:p>
+        </p:txBody>
+      </p:sp>
+      <p:sp>
+        <p:nvSpPr>
+          <p:cNvPr id="21" name="Arrow: Right 20">
+            <a:extLst>
+              <a:ext uri="{FF2B5EF4-FFF2-40B4-BE49-F238E27FC236}">
+                <a16:creationId xmlns:a16="http://schemas.microsoft.com/office/drawing/2014/main" id="{AC3E2F75-BC82-74F6-2FCD-74A0EEE22A60}"/>
+              </a:ext>
+            </a:extLst>
+          </p:cNvPr>
+          <p:cNvSpPr/>
+          <p:nvPr/>
+        </p:nvSpPr>
+        <p:spPr>
+          <a:xfrm>
+            <a:off x="8139695" y="2276710"/>
+            <a:ext cx="265176" cy="239154"/>
+          </a:xfrm>
+          <a:prstGeom prst="rightArrow">
+            <a:avLst/>
+          </a:prstGeom>
+          <a:solidFill>
+            <a:schemeClr val="accent2"/>
+          </a:solidFill>
+        </p:spPr>
+        <p:style>
+          <a:lnRef idx="2">
+            <a:schemeClr val="accent1">
+              <a:shade val="15000"/>
+            </a:schemeClr>
+          </a:lnRef>
+          <a:fillRef idx="1">
+            <a:schemeClr val="accent1"/>
+          </a:fillRef>
+          <a:effectRef idx="0">
+            <a:schemeClr val="accent1"/>
+          </a:effectRef>
+          <a:fontRef idx="minor">
+            <a:schemeClr val="lt1"/>
+          </a:fontRef>
+        </p:style>
+        <p:txBody>
+          <a:bodyPr rtlCol="0" anchor="ctr"/>
+          <a:lstStyle/>
+          <a:p>
+            <a:pPr algn="ctr"/>
+            <a:endParaRPr lang="en-SG"/>
+          </a:p>
+        </p:txBody>
+      </p:sp>
+      <p:pic>
+        <p:nvPicPr>
+          <p:cNvPr id="22" name="Picture 21">
+            <a:extLst>
+              <a:ext uri="{FF2B5EF4-FFF2-40B4-BE49-F238E27FC236}">
+                <a16:creationId xmlns:a16="http://schemas.microsoft.com/office/drawing/2014/main" id="{C0C2EFA3-D0AF-8908-6F32-469384A054CF}"/>
+              </a:ext>
+            </a:extLst>
+          </p:cNvPr>
+          <p:cNvPicPr>
+            <a:picLocks noChangeAspect="1"/>
+          </p:cNvPicPr>
+          <p:nvPr/>
+        </p:nvPicPr>
+        <p:blipFill>
+          <a:blip r:embed="rId3"/>
+          <a:stretch>
+            <a:fillRect/>
+          </a:stretch>
+        </p:blipFill>
+        <p:spPr>
+          <a:xfrm>
+            <a:off x="8504424" y="2090968"/>
+            <a:ext cx="1697304" cy="569944"/>
+          </a:xfrm>
+          <a:prstGeom prst="rect">
+            <a:avLst/>
+          </a:prstGeom>
+          <a:ln w="19050">
+            <a:solidFill>
+              <a:schemeClr val="tx1"/>
+            </a:solidFill>
+          </a:ln>
+        </p:spPr>
+      </p:pic>
+      <p:sp>
+        <p:nvSpPr>
+          <p:cNvPr id="23" name="TextBox 22">
+            <a:extLst>
+              <a:ext uri="{FF2B5EF4-FFF2-40B4-BE49-F238E27FC236}">
+                <a16:creationId xmlns:a16="http://schemas.microsoft.com/office/drawing/2014/main" id="{9A4F9416-9D96-E0BD-812E-E834A3BED097}"/>
+              </a:ext>
+            </a:extLst>
+          </p:cNvPr>
+          <p:cNvSpPr txBox="1"/>
+          <p:nvPr/>
+        </p:nvSpPr>
+        <p:spPr>
+          <a:xfrm>
+            <a:off x="5055284" y="438651"/>
+            <a:ext cx="3187918" cy="523220"/>
+          </a:xfrm>
+          <a:prstGeom prst="rect">
+            <a:avLst/>
+          </a:prstGeom>
+          <a:noFill/>
+        </p:spPr>
+        <p:txBody>
+          <a:bodyPr wrap="square">
+            <a:spAutoFit/>
+          </a:bodyPr>
+          <a:lstStyle/>
+          <a:p>
+            <a:r>
+              <a:rPr lang="en-US" sz="1400" b="1" dirty="0">
+                <a:solidFill>
+                  <a:schemeClr val="tx2">
+                    <a:lumMod val="75000"/>
+                    <a:lumOff val="25000"/>
+                  </a:schemeClr>
+                </a:solidFill>
+              </a:rPr>
+              <a:t>Matching to MITRE </a:t>
+            </a:r>
+            <a:r>
+              <a:rPr lang="en-US" sz="1400" b="1" u="sng" dirty="0">
+                <a:solidFill>
+                  <a:schemeClr val="tx2">
+                    <a:lumMod val="75000"/>
+                    <a:lumOff val="25000"/>
+                  </a:schemeClr>
+                </a:solidFill>
+              </a:rPr>
+              <a:t>C</a:t>
+            </a:r>
+            <a:r>
+              <a:rPr lang="en-US" sz="1400" dirty="0"/>
+              <a:t>ommon </a:t>
+            </a:r>
+            <a:r>
+              <a:rPr lang="en-US" sz="1400" b="1" u="sng" dirty="0">
+                <a:solidFill>
+                  <a:schemeClr val="tx2">
+                    <a:lumMod val="75000"/>
+                    <a:lumOff val="25000"/>
+                  </a:schemeClr>
+                </a:solidFill>
+              </a:rPr>
+              <a:t>W</a:t>
+            </a:r>
+            <a:r>
+              <a:rPr lang="en-US" sz="1400" dirty="0"/>
+              <a:t>eakness </a:t>
+            </a:r>
+            <a:r>
+              <a:rPr lang="en-US" sz="1400" b="1" u="sng" dirty="0">
+                <a:solidFill>
+                  <a:schemeClr val="tx2">
+                    <a:lumMod val="75000"/>
+                    <a:lumOff val="25000"/>
+                  </a:schemeClr>
+                </a:solidFill>
+              </a:rPr>
+              <a:t>E</a:t>
+            </a:r>
+            <a:r>
+              <a:rPr lang="en-US" sz="1400" dirty="0"/>
+              <a:t>numeration</a:t>
+            </a:r>
+          </a:p>
+        </p:txBody>
+      </p:sp>
+      <p:sp>
+        <p:nvSpPr>
+          <p:cNvPr id="24" name="TextBox 23">
+            <a:extLst>
+              <a:ext uri="{FF2B5EF4-FFF2-40B4-BE49-F238E27FC236}">
+                <a16:creationId xmlns:a16="http://schemas.microsoft.com/office/drawing/2014/main" id="{6ECFF126-EDD6-EB72-4E32-F75F2F4156D8}"/>
+              </a:ext>
+            </a:extLst>
+          </p:cNvPr>
+          <p:cNvSpPr txBox="1"/>
+          <p:nvPr/>
+        </p:nvSpPr>
+        <p:spPr>
+          <a:xfrm>
+            <a:off x="7967074" y="2731110"/>
+            <a:ext cx="3005726" cy="738664"/>
+          </a:xfrm>
+          <a:prstGeom prst="rect">
+            <a:avLst/>
+          </a:prstGeom>
+          <a:noFill/>
+        </p:spPr>
+        <p:txBody>
+          <a:bodyPr wrap="square" rtlCol="0">
+            <a:spAutoFit/>
+          </a:bodyPr>
+          <a:lstStyle/>
+          <a:p>
+            <a:r>
+              <a:rPr lang="en-US" sz="1400" b="1" dirty="0">
+                <a:solidFill>
+                  <a:schemeClr val="accent2">
+                    <a:lumMod val="75000"/>
+                  </a:schemeClr>
+                </a:solidFill>
+              </a:rPr>
+              <a:t>Mapping to MITRE</a:t>
+            </a:r>
+            <a:r>
+              <a:rPr lang="en-US" sz="1400" b="1" dirty="0"/>
+              <a:t> </a:t>
+            </a:r>
+          </a:p>
+          <a:p>
+            <a:r>
+              <a:rPr lang="en-US" sz="1400" b="1" u="sng" dirty="0">
+                <a:solidFill>
+                  <a:schemeClr val="accent2">
+                    <a:lumMod val="75000"/>
+                  </a:schemeClr>
+                </a:solidFill>
+              </a:rPr>
+              <a:t>A</a:t>
+            </a:r>
+            <a:r>
+              <a:rPr lang="en-US" sz="1400" dirty="0"/>
+              <a:t>dversarial </a:t>
+            </a:r>
+            <a:r>
+              <a:rPr lang="en-US" sz="1400" b="1" u="sng" dirty="0">
+                <a:solidFill>
+                  <a:schemeClr val="accent2">
+                    <a:lumMod val="75000"/>
+                  </a:schemeClr>
+                </a:solidFill>
+              </a:rPr>
+              <a:t>T</a:t>
+            </a:r>
+            <a:r>
+              <a:rPr lang="en-US" sz="1400" dirty="0"/>
+              <a:t>actics, </a:t>
+            </a:r>
+            <a:r>
+              <a:rPr lang="en-US" sz="1400" b="1" u="sng" dirty="0">
+                <a:solidFill>
+                  <a:schemeClr val="accent2">
+                    <a:lumMod val="75000"/>
+                  </a:schemeClr>
+                </a:solidFill>
+              </a:rPr>
+              <a:t>T</a:t>
+            </a:r>
+            <a:r>
+              <a:rPr lang="en-US" sz="1400" dirty="0"/>
+              <a:t>echniques, </a:t>
+            </a:r>
+          </a:p>
+          <a:p>
+            <a:r>
+              <a:rPr lang="en-US" sz="1400" b="1" u="sng" dirty="0">
+                <a:solidFill>
+                  <a:schemeClr val="accent2">
+                    <a:lumMod val="75000"/>
+                  </a:schemeClr>
+                </a:solidFill>
+              </a:rPr>
+              <a:t>&amp;</a:t>
+            </a:r>
+            <a:r>
+              <a:rPr lang="en-US" sz="1400" dirty="0" err="1"/>
+              <a:t>nd</a:t>
+            </a:r>
+            <a:r>
+              <a:rPr lang="en-US" sz="1400" dirty="0"/>
+              <a:t> </a:t>
+            </a:r>
+            <a:r>
+              <a:rPr lang="en-US" sz="1400" b="1" u="sng" dirty="0">
+                <a:solidFill>
+                  <a:schemeClr val="accent2">
+                    <a:lumMod val="75000"/>
+                  </a:schemeClr>
+                </a:solidFill>
+              </a:rPr>
+              <a:t>C</a:t>
+            </a:r>
+            <a:r>
+              <a:rPr lang="en-US" sz="1400" dirty="0"/>
+              <a:t>ommon </a:t>
+            </a:r>
+            <a:r>
+              <a:rPr lang="en-US" sz="1400" b="1" u="sng" dirty="0">
+                <a:solidFill>
+                  <a:schemeClr val="accent2">
+                    <a:lumMod val="75000"/>
+                  </a:schemeClr>
+                </a:solidFill>
+              </a:rPr>
+              <a:t>K</a:t>
+            </a:r>
+            <a:r>
+              <a:rPr lang="en-US" sz="1400" dirty="0"/>
+              <a:t>nowledge</a:t>
+            </a:r>
+            <a:endParaRPr lang="en-SG" sz="1400" dirty="0"/>
+          </a:p>
+        </p:txBody>
+      </p:sp>
+      <p:sp>
+        <p:nvSpPr>
+          <p:cNvPr id="29" name="TextBox 28">
+            <a:extLst>
+              <a:ext uri="{FF2B5EF4-FFF2-40B4-BE49-F238E27FC236}">
+                <a16:creationId xmlns:a16="http://schemas.microsoft.com/office/drawing/2014/main" id="{741E3576-C525-D617-82D4-576446F2CA54}"/>
+              </a:ext>
+            </a:extLst>
+          </p:cNvPr>
+          <p:cNvSpPr txBox="1"/>
+          <p:nvPr/>
+        </p:nvSpPr>
+        <p:spPr>
+          <a:xfrm>
+            <a:off x="585794" y="530984"/>
+            <a:ext cx="2016345" cy="369332"/>
+          </a:xfrm>
+          <a:prstGeom prst="rect">
+            <a:avLst/>
+          </a:prstGeom>
+          <a:noFill/>
+        </p:spPr>
+        <p:txBody>
+          <a:bodyPr wrap="square" rtlCol="0">
+            <a:spAutoFit/>
+          </a:bodyPr>
+          <a:lstStyle/>
+          <a:p>
+            <a:r>
+              <a:rPr lang="en-SG" b="1" dirty="0"/>
+              <a:t>Case Study Flow </a:t>
+            </a:r>
+          </a:p>
+        </p:txBody>
+      </p:sp>
+    </p:spTree>
+    <p:extLst>
+      <p:ext uri="{BB962C8B-B14F-4D97-AF65-F5344CB8AC3E}">
+        <p14:creationId xmlns:p14="http://schemas.microsoft.com/office/powerpoint/2010/main" val="1719979142"/>
       </p:ext>
     </p:extLst>
   </p:cSld>

</xml_diff>

<commit_message>
Finished the introduction section.
</commit_message>
<xml_diff>
--- a/OT_System_Attack_Case_Study/PowerGrid_FDI/designDoc.pptx
+++ b/OT_System_Attack_Case_Study/PowerGrid_FDI/designDoc.pptx
@@ -4,10 +4,15 @@
   <p:sldMasterIdLst>
     <p:sldMasterId id="2147483648" r:id="rId1"/>
   </p:sldMasterIdLst>
+  <p:notesMasterIdLst>
+    <p:notesMasterId r:id="rId7"/>
+  </p:notesMasterIdLst>
   <p:sldIdLst>
     <p:sldId id="257" r:id="rId2"/>
     <p:sldId id="269" r:id="rId3"/>
     <p:sldId id="270" r:id="rId4"/>
+    <p:sldId id="271" r:id="rId5"/>
+    <p:sldId id="267" r:id="rId6"/>
   </p:sldIdLst>
   <p:sldSz cx="12192000" cy="6858000"/>
   <p:notesSz cx="6858000" cy="9144000"/>
@@ -112,6 +117,440 @@
     </p:ext>
   </p:extLst>
 </p:presentation>
+</file>
+
+<file path=ppt/notesMasters/notesMaster1.xml><?xml version="1.0" encoding="utf-8"?>
+<p:notesMaster xmlns:a="http://schemas.openxmlformats.org/drawingml/2006/main" xmlns:r="http://schemas.openxmlformats.org/officeDocument/2006/relationships" xmlns:p="http://schemas.openxmlformats.org/presentationml/2006/main">
+  <p:cSld>
+    <p:bg>
+      <p:bgRef idx="1001">
+        <a:schemeClr val="bg1"/>
+      </p:bgRef>
+    </p:bg>
+    <p:spTree>
+      <p:nvGrpSpPr>
+        <p:cNvPr id="1" name=""/>
+        <p:cNvGrpSpPr/>
+        <p:nvPr/>
+      </p:nvGrpSpPr>
+      <p:grpSpPr>
+        <a:xfrm>
+          <a:off x="0" y="0"/>
+          <a:ext cx="0" cy="0"/>
+          <a:chOff x="0" y="0"/>
+          <a:chExt cx="0" cy="0"/>
+        </a:xfrm>
+      </p:grpSpPr>
+      <p:sp>
+        <p:nvSpPr>
+          <p:cNvPr id="2" name="Header Placeholder 1"/>
+          <p:cNvSpPr>
+            <a:spLocks noGrp="1"/>
+          </p:cNvSpPr>
+          <p:nvPr>
+            <p:ph type="hdr" sz="quarter"/>
+          </p:nvPr>
+        </p:nvSpPr>
+        <p:spPr>
+          <a:xfrm>
+            <a:off x="0" y="0"/>
+            <a:ext cx="2971800" cy="458788"/>
+          </a:xfrm>
+          <a:prstGeom prst="rect">
+            <a:avLst/>
+          </a:prstGeom>
+        </p:spPr>
+        <p:txBody>
+          <a:bodyPr vert="horz" lIns="91440" tIns="45720" rIns="91440" bIns="45720" rtlCol="0"/>
+          <a:lstStyle>
+            <a:lvl1pPr algn="l">
+              <a:defRPr sz="1200"/>
+            </a:lvl1pPr>
+          </a:lstStyle>
+          <a:p>
+            <a:endParaRPr lang="en-SG"/>
+          </a:p>
+        </p:txBody>
+      </p:sp>
+      <p:sp>
+        <p:nvSpPr>
+          <p:cNvPr id="3" name="Date Placeholder 2"/>
+          <p:cNvSpPr>
+            <a:spLocks noGrp="1"/>
+          </p:cNvSpPr>
+          <p:nvPr>
+            <p:ph type="dt" idx="1"/>
+          </p:nvPr>
+        </p:nvSpPr>
+        <p:spPr>
+          <a:xfrm>
+            <a:off x="3884613" y="0"/>
+            <a:ext cx="2971800" cy="458788"/>
+          </a:xfrm>
+          <a:prstGeom prst="rect">
+            <a:avLst/>
+          </a:prstGeom>
+        </p:spPr>
+        <p:txBody>
+          <a:bodyPr vert="horz" lIns="91440" tIns="45720" rIns="91440" bIns="45720" rtlCol="0"/>
+          <a:lstStyle>
+            <a:lvl1pPr algn="r">
+              <a:defRPr sz="1200"/>
+            </a:lvl1pPr>
+          </a:lstStyle>
+          <a:p>
+            <a:fld id="{7F88F6F8-461C-427D-8861-247692F1DA60}" type="datetimeFigureOut">
+              <a:rPr lang="en-SG" smtClean="0"/>
+              <a:t>8/1/2025</a:t>
+            </a:fld>
+            <a:endParaRPr lang="en-SG"/>
+          </a:p>
+        </p:txBody>
+      </p:sp>
+      <p:sp>
+        <p:nvSpPr>
+          <p:cNvPr id="4" name="Slide Image Placeholder 3"/>
+          <p:cNvSpPr>
+            <a:spLocks noGrp="1" noRot="1" noChangeAspect="1"/>
+          </p:cNvSpPr>
+          <p:nvPr>
+            <p:ph type="sldImg" idx="2"/>
+          </p:nvPr>
+        </p:nvSpPr>
+        <p:spPr>
+          <a:xfrm>
+            <a:off x="685800" y="1143000"/>
+            <a:ext cx="5486400" cy="3086100"/>
+          </a:xfrm>
+          <a:prstGeom prst="rect">
+            <a:avLst/>
+          </a:prstGeom>
+          <a:noFill/>
+          <a:ln w="12700">
+            <a:solidFill>
+              <a:prstClr val="black"/>
+            </a:solidFill>
+          </a:ln>
+        </p:spPr>
+        <p:txBody>
+          <a:bodyPr vert="horz" lIns="91440" tIns="45720" rIns="91440" bIns="45720" rtlCol="0" anchor="ctr"/>
+          <a:lstStyle/>
+          <a:p>
+            <a:endParaRPr lang="en-SG"/>
+          </a:p>
+        </p:txBody>
+      </p:sp>
+      <p:sp>
+        <p:nvSpPr>
+          <p:cNvPr id="5" name="Notes Placeholder 4"/>
+          <p:cNvSpPr>
+            <a:spLocks noGrp="1"/>
+          </p:cNvSpPr>
+          <p:nvPr>
+            <p:ph type="body" sz="quarter" idx="3"/>
+          </p:nvPr>
+        </p:nvSpPr>
+        <p:spPr>
+          <a:xfrm>
+            <a:off x="685800" y="4400550"/>
+            <a:ext cx="5486400" cy="3600450"/>
+          </a:xfrm>
+          <a:prstGeom prst="rect">
+            <a:avLst/>
+          </a:prstGeom>
+        </p:spPr>
+        <p:txBody>
+          <a:bodyPr vert="horz" lIns="91440" tIns="45720" rIns="91440" bIns="45720" rtlCol="0"/>
+          <a:lstStyle/>
+          <a:p>
+            <a:pPr lvl="0"/>
+            <a:r>
+              <a:rPr lang="en-US"/>
+              <a:t>Click to edit Master text styles</a:t>
+            </a:r>
+          </a:p>
+          <a:p>
+            <a:pPr lvl="1"/>
+            <a:r>
+              <a:rPr lang="en-US"/>
+              <a:t>Second level</a:t>
+            </a:r>
+          </a:p>
+          <a:p>
+            <a:pPr lvl="2"/>
+            <a:r>
+              <a:rPr lang="en-US"/>
+              <a:t>Third level</a:t>
+            </a:r>
+          </a:p>
+          <a:p>
+            <a:pPr lvl="3"/>
+            <a:r>
+              <a:rPr lang="en-US"/>
+              <a:t>Fourth level</a:t>
+            </a:r>
+          </a:p>
+          <a:p>
+            <a:pPr lvl="4"/>
+            <a:r>
+              <a:rPr lang="en-US"/>
+              <a:t>Fifth level</a:t>
+            </a:r>
+            <a:endParaRPr lang="en-SG"/>
+          </a:p>
+        </p:txBody>
+      </p:sp>
+      <p:sp>
+        <p:nvSpPr>
+          <p:cNvPr id="6" name="Footer Placeholder 5"/>
+          <p:cNvSpPr>
+            <a:spLocks noGrp="1"/>
+          </p:cNvSpPr>
+          <p:nvPr>
+            <p:ph type="ftr" sz="quarter" idx="4"/>
+          </p:nvPr>
+        </p:nvSpPr>
+        <p:spPr>
+          <a:xfrm>
+            <a:off x="0" y="8685213"/>
+            <a:ext cx="2971800" cy="458787"/>
+          </a:xfrm>
+          <a:prstGeom prst="rect">
+            <a:avLst/>
+          </a:prstGeom>
+        </p:spPr>
+        <p:txBody>
+          <a:bodyPr vert="horz" lIns="91440" tIns="45720" rIns="91440" bIns="45720" rtlCol="0" anchor="b"/>
+          <a:lstStyle>
+            <a:lvl1pPr algn="l">
+              <a:defRPr sz="1200"/>
+            </a:lvl1pPr>
+          </a:lstStyle>
+          <a:p>
+            <a:endParaRPr lang="en-SG"/>
+          </a:p>
+        </p:txBody>
+      </p:sp>
+      <p:sp>
+        <p:nvSpPr>
+          <p:cNvPr id="7" name="Slide Number Placeholder 6"/>
+          <p:cNvSpPr>
+            <a:spLocks noGrp="1"/>
+          </p:cNvSpPr>
+          <p:nvPr>
+            <p:ph type="sldNum" sz="quarter" idx="5"/>
+          </p:nvPr>
+        </p:nvSpPr>
+        <p:spPr>
+          <a:xfrm>
+            <a:off x="3884613" y="8685213"/>
+            <a:ext cx="2971800" cy="458787"/>
+          </a:xfrm>
+          <a:prstGeom prst="rect">
+            <a:avLst/>
+          </a:prstGeom>
+        </p:spPr>
+        <p:txBody>
+          <a:bodyPr vert="horz" lIns="91440" tIns="45720" rIns="91440" bIns="45720" rtlCol="0" anchor="b"/>
+          <a:lstStyle>
+            <a:lvl1pPr algn="r">
+              <a:defRPr sz="1200"/>
+            </a:lvl1pPr>
+          </a:lstStyle>
+          <a:p>
+            <a:fld id="{DC98F027-588D-4372-93F5-EF16D98193B7}" type="slidenum">
+              <a:rPr lang="en-SG" smtClean="0"/>
+              <a:t>‹#›</a:t>
+            </a:fld>
+            <a:endParaRPr lang="en-SG"/>
+          </a:p>
+        </p:txBody>
+      </p:sp>
+    </p:spTree>
+    <p:extLst>
+      <p:ext uri="{BB962C8B-B14F-4D97-AF65-F5344CB8AC3E}">
+        <p14:creationId xmlns:p14="http://schemas.microsoft.com/office/powerpoint/2010/main" val="224616217"/>
+      </p:ext>
+    </p:extLst>
+  </p:cSld>
+  <p:clrMap bg1="lt1" tx1="dk1" bg2="lt2" tx2="dk2" accent1="accent1" accent2="accent2" accent3="accent3" accent4="accent4" accent5="accent5" accent6="accent6" hlink="hlink" folHlink="folHlink"/>
+  <p:notesStyle>
+    <a:lvl1pPr marL="0" algn="l" defTabSz="914400" rtl="0" eaLnBrk="1" latinLnBrk="0" hangingPunct="1">
+      <a:defRPr sz="1200" kern="1200">
+        <a:solidFill>
+          <a:schemeClr val="tx1"/>
+        </a:solidFill>
+        <a:latin typeface="+mn-lt"/>
+        <a:ea typeface="+mn-ea"/>
+        <a:cs typeface="+mn-cs"/>
+      </a:defRPr>
+    </a:lvl1pPr>
+    <a:lvl2pPr marL="457200" algn="l" defTabSz="914400" rtl="0" eaLnBrk="1" latinLnBrk="0" hangingPunct="1">
+      <a:defRPr sz="1200" kern="1200">
+        <a:solidFill>
+          <a:schemeClr val="tx1"/>
+        </a:solidFill>
+        <a:latin typeface="+mn-lt"/>
+        <a:ea typeface="+mn-ea"/>
+        <a:cs typeface="+mn-cs"/>
+      </a:defRPr>
+    </a:lvl2pPr>
+    <a:lvl3pPr marL="914400" algn="l" defTabSz="914400" rtl="0" eaLnBrk="1" latinLnBrk="0" hangingPunct="1">
+      <a:defRPr sz="1200" kern="1200">
+        <a:solidFill>
+          <a:schemeClr val="tx1"/>
+        </a:solidFill>
+        <a:latin typeface="+mn-lt"/>
+        <a:ea typeface="+mn-ea"/>
+        <a:cs typeface="+mn-cs"/>
+      </a:defRPr>
+    </a:lvl3pPr>
+    <a:lvl4pPr marL="1371600" algn="l" defTabSz="914400" rtl="0" eaLnBrk="1" latinLnBrk="0" hangingPunct="1">
+      <a:defRPr sz="1200" kern="1200">
+        <a:solidFill>
+          <a:schemeClr val="tx1"/>
+        </a:solidFill>
+        <a:latin typeface="+mn-lt"/>
+        <a:ea typeface="+mn-ea"/>
+        <a:cs typeface="+mn-cs"/>
+      </a:defRPr>
+    </a:lvl4pPr>
+    <a:lvl5pPr marL="1828800" algn="l" defTabSz="914400" rtl="0" eaLnBrk="1" latinLnBrk="0" hangingPunct="1">
+      <a:defRPr sz="1200" kern="1200">
+        <a:solidFill>
+          <a:schemeClr val="tx1"/>
+        </a:solidFill>
+        <a:latin typeface="+mn-lt"/>
+        <a:ea typeface="+mn-ea"/>
+        <a:cs typeface="+mn-cs"/>
+      </a:defRPr>
+    </a:lvl5pPr>
+    <a:lvl6pPr marL="2286000" algn="l" defTabSz="914400" rtl="0" eaLnBrk="1" latinLnBrk="0" hangingPunct="1">
+      <a:defRPr sz="1200" kern="1200">
+        <a:solidFill>
+          <a:schemeClr val="tx1"/>
+        </a:solidFill>
+        <a:latin typeface="+mn-lt"/>
+        <a:ea typeface="+mn-ea"/>
+        <a:cs typeface="+mn-cs"/>
+      </a:defRPr>
+    </a:lvl6pPr>
+    <a:lvl7pPr marL="2743200" algn="l" defTabSz="914400" rtl="0" eaLnBrk="1" latinLnBrk="0" hangingPunct="1">
+      <a:defRPr sz="1200" kern="1200">
+        <a:solidFill>
+          <a:schemeClr val="tx1"/>
+        </a:solidFill>
+        <a:latin typeface="+mn-lt"/>
+        <a:ea typeface="+mn-ea"/>
+        <a:cs typeface="+mn-cs"/>
+      </a:defRPr>
+    </a:lvl7pPr>
+    <a:lvl8pPr marL="3200400" algn="l" defTabSz="914400" rtl="0" eaLnBrk="1" latinLnBrk="0" hangingPunct="1">
+      <a:defRPr sz="1200" kern="1200">
+        <a:solidFill>
+          <a:schemeClr val="tx1"/>
+        </a:solidFill>
+        <a:latin typeface="+mn-lt"/>
+        <a:ea typeface="+mn-ea"/>
+        <a:cs typeface="+mn-cs"/>
+      </a:defRPr>
+    </a:lvl8pPr>
+    <a:lvl9pPr marL="3657600" algn="l" defTabSz="914400" rtl="0" eaLnBrk="1" latinLnBrk="0" hangingPunct="1">
+      <a:defRPr sz="1200" kern="1200">
+        <a:solidFill>
+          <a:schemeClr val="tx1"/>
+        </a:solidFill>
+        <a:latin typeface="+mn-lt"/>
+        <a:ea typeface="+mn-ea"/>
+        <a:cs typeface="+mn-cs"/>
+      </a:defRPr>
+    </a:lvl9pPr>
+  </p:notesStyle>
+</p:notesMaster>
+</file>
+
+<file path=ppt/notesSlides/notesSlide1.xml><?xml version="1.0" encoding="utf-8"?>
+<p:notes xmlns:a="http://schemas.openxmlformats.org/drawingml/2006/main" xmlns:r="http://schemas.openxmlformats.org/officeDocument/2006/relationships" xmlns:p="http://schemas.openxmlformats.org/presentationml/2006/main">
+  <p:cSld>
+    <p:spTree>
+      <p:nvGrpSpPr>
+        <p:cNvPr id="1" name=""/>
+        <p:cNvGrpSpPr/>
+        <p:nvPr/>
+      </p:nvGrpSpPr>
+      <p:grpSpPr>
+        <a:xfrm>
+          <a:off x="0" y="0"/>
+          <a:ext cx="0" cy="0"/>
+          <a:chOff x="0" y="0"/>
+          <a:chExt cx="0" cy="0"/>
+        </a:xfrm>
+      </p:grpSpPr>
+      <p:sp>
+        <p:nvSpPr>
+          <p:cNvPr id="2" name="Slide Image Placeholder 1"/>
+          <p:cNvSpPr>
+            <a:spLocks noGrp="1" noRot="1" noChangeAspect="1"/>
+          </p:cNvSpPr>
+          <p:nvPr>
+            <p:ph type="sldImg"/>
+          </p:nvPr>
+        </p:nvSpPr>
+        <p:spPr/>
+      </p:sp>
+      <p:sp>
+        <p:nvSpPr>
+          <p:cNvPr id="3" name="Notes Placeholder 2"/>
+          <p:cNvSpPr>
+            <a:spLocks noGrp="1"/>
+          </p:cNvSpPr>
+          <p:nvPr>
+            <p:ph type="body" idx="1"/>
+          </p:nvPr>
+        </p:nvSpPr>
+        <p:spPr/>
+        <p:txBody>
+          <a:bodyPr/>
+          <a:lstStyle/>
+          <a:p>
+            <a:endParaRPr lang="en-SG" dirty="0"/>
+          </a:p>
+        </p:txBody>
+      </p:sp>
+      <p:sp>
+        <p:nvSpPr>
+          <p:cNvPr id="4" name="Slide Number Placeholder 3"/>
+          <p:cNvSpPr>
+            <a:spLocks noGrp="1"/>
+          </p:cNvSpPr>
+          <p:nvPr>
+            <p:ph type="sldNum" sz="quarter" idx="5"/>
+          </p:nvPr>
+        </p:nvSpPr>
+        <p:spPr/>
+        <p:txBody>
+          <a:bodyPr/>
+          <a:lstStyle/>
+          <a:p>
+            <a:fld id="{2F8A4C87-30FF-4E0D-9FFA-CCB73B1DE919}" type="slidenum">
+              <a:rPr lang="en-SG" smtClean="0"/>
+              <a:t>5</a:t>
+            </a:fld>
+            <a:endParaRPr lang="en-SG"/>
+          </a:p>
+        </p:txBody>
+      </p:sp>
+    </p:spTree>
+    <p:extLst>
+      <p:ext uri="{BB962C8B-B14F-4D97-AF65-F5344CB8AC3E}">
+        <p14:creationId xmlns:p14="http://schemas.microsoft.com/office/powerpoint/2010/main" val="4019932902"/>
+      </p:ext>
+    </p:extLst>
+  </p:cSld>
+  <p:clrMapOvr>
+    <a:masterClrMapping/>
+  </p:clrMapOvr>
+</p:notes>
 </file>
 
 <file path=ppt/slideLayouts/slideLayout1.xml><?xml version="1.0" encoding="utf-8"?>
@@ -9946,6 +10385,4209 @@
     <p:extLst>
       <p:ext uri="{BB962C8B-B14F-4D97-AF65-F5344CB8AC3E}">
         <p14:creationId xmlns:p14="http://schemas.microsoft.com/office/powerpoint/2010/main" val="1719979142"/>
+      </p:ext>
+    </p:extLst>
+  </p:cSld>
+  <p:clrMapOvr>
+    <a:masterClrMapping/>
+  </p:clrMapOvr>
+</p:sld>
+</file>
+
+<file path=ppt/slides/slide4.xml><?xml version="1.0" encoding="utf-8"?>
+<p:sld xmlns:a="http://schemas.openxmlformats.org/drawingml/2006/main" xmlns:r="http://schemas.openxmlformats.org/officeDocument/2006/relationships" xmlns:p="http://schemas.openxmlformats.org/presentationml/2006/main">
+  <p:cSld>
+    <p:spTree>
+      <p:nvGrpSpPr>
+        <p:cNvPr id="1" name=""/>
+        <p:cNvGrpSpPr/>
+        <p:nvPr/>
+      </p:nvGrpSpPr>
+      <p:grpSpPr>
+        <a:xfrm>
+          <a:off x="0" y="0"/>
+          <a:ext cx="0" cy="0"/>
+          <a:chOff x="0" y="0"/>
+          <a:chExt cx="0" cy="0"/>
+        </a:xfrm>
+      </p:grpSpPr>
+    </p:spTree>
+    <p:extLst>
+      <p:ext uri="{BB962C8B-B14F-4D97-AF65-F5344CB8AC3E}">
+        <p14:creationId xmlns:p14="http://schemas.microsoft.com/office/powerpoint/2010/main" val="3113519799"/>
+      </p:ext>
+    </p:extLst>
+  </p:cSld>
+  <p:clrMapOvr>
+    <a:masterClrMapping/>
+  </p:clrMapOvr>
+</p:sld>
+</file>
+
+<file path=ppt/slides/slide5.xml><?xml version="1.0" encoding="utf-8"?>
+<p:sld xmlns:a="http://schemas.openxmlformats.org/drawingml/2006/main" xmlns:r="http://schemas.openxmlformats.org/officeDocument/2006/relationships" xmlns:p="http://schemas.openxmlformats.org/presentationml/2006/main">
+  <p:cSld>
+    <p:spTree>
+      <p:nvGrpSpPr>
+        <p:cNvPr id="1" name=""/>
+        <p:cNvGrpSpPr/>
+        <p:nvPr/>
+      </p:nvGrpSpPr>
+      <p:grpSpPr>
+        <a:xfrm>
+          <a:off x="0" y="0"/>
+          <a:ext cx="0" cy="0"/>
+          <a:chOff x="0" y="0"/>
+          <a:chExt cx="0" cy="0"/>
+        </a:xfrm>
+      </p:grpSpPr>
+      <p:sp>
+        <p:nvSpPr>
+          <p:cNvPr id="95" name="Rectangle 94">
+            <a:extLst>
+              <a:ext uri="{FF2B5EF4-FFF2-40B4-BE49-F238E27FC236}">
+                <a16:creationId xmlns:a16="http://schemas.microsoft.com/office/drawing/2014/main" id="{D7F40817-3A8A-DE9B-7946-8CD27695C336}"/>
+              </a:ext>
+            </a:extLst>
+          </p:cNvPr>
+          <p:cNvSpPr/>
+          <p:nvPr/>
+        </p:nvSpPr>
+        <p:spPr>
+          <a:xfrm>
+            <a:off x="888916" y="5027500"/>
+            <a:ext cx="4996640" cy="1445692"/>
+          </a:xfrm>
+          <a:prstGeom prst="rect">
+            <a:avLst/>
+          </a:prstGeom>
+          <a:solidFill>
+            <a:schemeClr val="accent5">
+              <a:lumMod val="20000"/>
+              <a:lumOff val="80000"/>
+            </a:schemeClr>
+          </a:solidFill>
+          <a:ln>
+            <a:solidFill>
+              <a:schemeClr val="tx1"/>
+            </a:solidFill>
+            <a:prstDash val="sysDash"/>
+          </a:ln>
+        </p:spPr>
+        <p:style>
+          <a:lnRef idx="2">
+            <a:schemeClr val="accent6"/>
+          </a:lnRef>
+          <a:fillRef idx="1">
+            <a:schemeClr val="lt1"/>
+          </a:fillRef>
+          <a:effectRef idx="0">
+            <a:schemeClr val="accent6"/>
+          </a:effectRef>
+          <a:fontRef idx="minor">
+            <a:schemeClr val="dk1"/>
+          </a:fontRef>
+        </p:style>
+        <p:txBody>
+          <a:bodyPr rtlCol="0" anchor="ctr"/>
+          <a:lstStyle/>
+          <a:p>
+            <a:pPr algn="ctr"/>
+            <a:endParaRPr lang="en-SG" dirty="0"/>
+          </a:p>
+        </p:txBody>
+      </p:sp>
+      <p:sp>
+        <p:nvSpPr>
+          <p:cNvPr id="110" name="Rectangle 109">
+            <a:extLst>
+              <a:ext uri="{FF2B5EF4-FFF2-40B4-BE49-F238E27FC236}">
+                <a16:creationId xmlns:a16="http://schemas.microsoft.com/office/drawing/2014/main" id="{3CD0485E-C08F-274E-E616-4A8F32E2089A}"/>
+              </a:ext>
+            </a:extLst>
+          </p:cNvPr>
+          <p:cNvSpPr/>
+          <p:nvPr/>
+        </p:nvSpPr>
+        <p:spPr>
+          <a:xfrm>
+            <a:off x="7484934" y="573211"/>
+            <a:ext cx="3348672" cy="4195803"/>
+          </a:xfrm>
+          <a:prstGeom prst="rect">
+            <a:avLst/>
+          </a:prstGeom>
+          <a:solidFill>
+            <a:schemeClr val="accent4">
+              <a:lumMod val="20000"/>
+              <a:lumOff val="80000"/>
+            </a:schemeClr>
+          </a:solidFill>
+          <a:ln>
+            <a:solidFill>
+              <a:schemeClr val="accent6">
+                <a:lumMod val="75000"/>
+              </a:schemeClr>
+            </a:solidFill>
+            <a:prstDash val="sysDash"/>
+          </a:ln>
+        </p:spPr>
+        <p:style>
+          <a:lnRef idx="2">
+            <a:schemeClr val="accent6"/>
+          </a:lnRef>
+          <a:fillRef idx="1">
+            <a:schemeClr val="lt1"/>
+          </a:fillRef>
+          <a:effectRef idx="0">
+            <a:schemeClr val="accent6"/>
+          </a:effectRef>
+          <a:fontRef idx="minor">
+            <a:schemeClr val="dk1"/>
+          </a:fontRef>
+        </p:style>
+        <p:txBody>
+          <a:bodyPr rtlCol="0" anchor="ctr"/>
+          <a:lstStyle/>
+          <a:p>
+            <a:pPr algn="ctr"/>
+            <a:endParaRPr lang="en-SG"/>
+          </a:p>
+        </p:txBody>
+      </p:sp>
+      <p:sp>
+        <p:nvSpPr>
+          <p:cNvPr id="5" name="Rectangle 4">
+            <a:extLst>
+              <a:ext uri="{FF2B5EF4-FFF2-40B4-BE49-F238E27FC236}">
+                <a16:creationId xmlns:a16="http://schemas.microsoft.com/office/drawing/2014/main" id="{D7FFF871-B03F-4291-F282-DEB916A16AE4}"/>
+              </a:ext>
+            </a:extLst>
+          </p:cNvPr>
+          <p:cNvSpPr/>
+          <p:nvPr/>
+        </p:nvSpPr>
+        <p:spPr>
+          <a:xfrm>
+            <a:off x="928256" y="1296564"/>
+            <a:ext cx="5869571" cy="3476624"/>
+          </a:xfrm>
+          <a:prstGeom prst="rect">
+            <a:avLst/>
+          </a:prstGeom>
+          <a:solidFill>
+            <a:schemeClr val="accent6">
+              <a:lumMod val="20000"/>
+              <a:lumOff val="80000"/>
+            </a:schemeClr>
+          </a:solidFill>
+          <a:ln>
+            <a:solidFill>
+              <a:schemeClr val="accent6">
+                <a:lumMod val="75000"/>
+              </a:schemeClr>
+            </a:solidFill>
+            <a:prstDash val="sysDash"/>
+          </a:ln>
+        </p:spPr>
+        <p:style>
+          <a:lnRef idx="2">
+            <a:schemeClr val="accent6"/>
+          </a:lnRef>
+          <a:fillRef idx="1">
+            <a:schemeClr val="lt1"/>
+          </a:fillRef>
+          <a:effectRef idx="0">
+            <a:schemeClr val="accent6"/>
+          </a:effectRef>
+          <a:fontRef idx="minor">
+            <a:schemeClr val="dk1"/>
+          </a:fontRef>
+        </p:style>
+        <p:txBody>
+          <a:bodyPr rtlCol="0" anchor="ctr"/>
+          <a:lstStyle/>
+          <a:p>
+            <a:pPr algn="ctr"/>
+            <a:endParaRPr lang="en-SG"/>
+          </a:p>
+        </p:txBody>
+      </p:sp>
+      <p:pic>
+        <p:nvPicPr>
+          <p:cNvPr id="4" name="Picture 3">
+            <a:extLst>
+              <a:ext uri="{FF2B5EF4-FFF2-40B4-BE49-F238E27FC236}">
+                <a16:creationId xmlns:a16="http://schemas.microsoft.com/office/drawing/2014/main" id="{3C627943-54ED-BDAC-125B-422DF1857A04}"/>
+              </a:ext>
+            </a:extLst>
+          </p:cNvPr>
+          <p:cNvPicPr>
+            <a:picLocks noChangeAspect="1"/>
+          </p:cNvPicPr>
+          <p:nvPr/>
+        </p:nvPicPr>
+        <p:blipFill>
+          <a:blip r:embed="rId3"/>
+          <a:stretch>
+            <a:fillRect/>
+          </a:stretch>
+        </p:blipFill>
+        <p:spPr>
+          <a:xfrm>
+            <a:off x="3977310" y="2611683"/>
+            <a:ext cx="2526404" cy="1431628"/>
+          </a:xfrm>
+          <a:prstGeom prst="rect">
+            <a:avLst/>
+          </a:prstGeom>
+          <a:ln w="12700">
+            <a:solidFill>
+              <a:schemeClr val="tx1"/>
+            </a:solidFill>
+          </a:ln>
+        </p:spPr>
+      </p:pic>
+      <p:pic>
+        <p:nvPicPr>
+          <p:cNvPr id="6" name="Picture 5">
+            <a:extLst>
+              <a:ext uri="{FF2B5EF4-FFF2-40B4-BE49-F238E27FC236}">
+                <a16:creationId xmlns:a16="http://schemas.microsoft.com/office/drawing/2014/main" id="{1DCC539B-648E-0650-F1DB-F1E3CE9B01ED}"/>
+              </a:ext>
+            </a:extLst>
+          </p:cNvPr>
+          <p:cNvPicPr>
+            <a:picLocks noChangeAspect="1"/>
+          </p:cNvPicPr>
+          <p:nvPr/>
+        </p:nvPicPr>
+        <p:blipFill>
+          <a:blip r:embed="rId4"/>
+          <a:stretch>
+            <a:fillRect/>
+          </a:stretch>
+        </p:blipFill>
+        <p:spPr>
+          <a:xfrm>
+            <a:off x="1249124" y="1835338"/>
+            <a:ext cx="531176" cy="467941"/>
+          </a:xfrm>
+          <a:prstGeom prst="rect">
+            <a:avLst/>
+          </a:prstGeom>
+          <a:ln w="19050">
+            <a:solidFill>
+              <a:schemeClr val="tx1"/>
+            </a:solidFill>
+          </a:ln>
+        </p:spPr>
+      </p:pic>
+      <p:sp>
+        <p:nvSpPr>
+          <p:cNvPr id="7" name="TextBox 6">
+            <a:extLst>
+              <a:ext uri="{FF2B5EF4-FFF2-40B4-BE49-F238E27FC236}">
+                <a16:creationId xmlns:a16="http://schemas.microsoft.com/office/drawing/2014/main" id="{105D2E4B-8883-FD40-BA1B-1E3DC7FBECA0}"/>
+              </a:ext>
+            </a:extLst>
+          </p:cNvPr>
+          <p:cNvSpPr txBox="1"/>
+          <p:nvPr/>
+        </p:nvSpPr>
+        <p:spPr>
+          <a:xfrm>
+            <a:off x="1744155" y="2048160"/>
+            <a:ext cx="1562613" cy="553998"/>
+          </a:xfrm>
+          <a:prstGeom prst="rect">
+            <a:avLst/>
+          </a:prstGeom>
+          <a:noFill/>
+        </p:spPr>
+        <p:txBody>
+          <a:bodyPr wrap="square">
+            <a:spAutoFit/>
+          </a:bodyPr>
+          <a:lstStyle/>
+          <a:p>
+            <a:r>
+              <a:rPr lang="en-US" sz="1000" b="1" dirty="0">
+                <a:solidFill>
+                  <a:schemeClr val="tx1">
+                    <a:lumMod val="75000"/>
+                    <a:lumOff val="25000"/>
+                  </a:schemeClr>
+                </a:solidFill>
+              </a:rPr>
+              <a:t>VM_ID</a:t>
+            </a:r>
+            <a:r>
+              <a:rPr lang="en-US" sz="1000" dirty="0">
+                <a:solidFill>
+                  <a:schemeClr val="tx1">
+                    <a:lumMod val="75000"/>
+                    <a:lumOff val="25000"/>
+                  </a:schemeClr>
+                </a:solidFill>
+              </a:rPr>
+              <a:t>: PW-</a:t>
+            </a:r>
+            <a:r>
+              <a:rPr lang="en-US" sz="1000" dirty="0" err="1">
+                <a:solidFill>
+                  <a:schemeClr val="tx1">
+                    <a:lumMod val="75000"/>
+                    <a:lumOff val="25000"/>
+                  </a:schemeClr>
+                </a:solidFill>
+              </a:rPr>
+              <a:t>PowerLink</a:t>
+            </a:r>
+            <a:endParaRPr lang="en-US" sz="1000" dirty="0">
+              <a:solidFill>
+                <a:schemeClr val="tx1">
+                  <a:lumMod val="75000"/>
+                  <a:lumOff val="25000"/>
+                </a:schemeClr>
+              </a:solidFill>
+            </a:endParaRPr>
+          </a:p>
+          <a:p>
+            <a:r>
+              <a:rPr lang="en-US" sz="1000" b="1" dirty="0" err="1">
+                <a:solidFill>
+                  <a:schemeClr val="tx1">
+                    <a:lumMod val="75000"/>
+                    <a:lumOff val="25000"/>
+                  </a:schemeClr>
+                </a:solidFill>
+              </a:rPr>
+              <a:t>Func</a:t>
+            </a:r>
+            <a:r>
+              <a:rPr lang="en-US" sz="1000" dirty="0">
+                <a:solidFill>
+                  <a:schemeClr val="tx1">
+                    <a:lumMod val="75000"/>
+                    <a:lumOff val="25000"/>
+                  </a:schemeClr>
+                </a:solidFill>
+              </a:rPr>
+              <a:t>: Power Link </a:t>
+            </a:r>
+          </a:p>
+          <a:p>
+            <a:r>
+              <a:rPr lang="en-US" sz="1000" b="1" dirty="0">
+                <a:solidFill>
+                  <a:schemeClr val="tx1">
+                    <a:lumMod val="75000"/>
+                    <a:lumOff val="25000"/>
+                  </a:schemeClr>
+                </a:solidFill>
+              </a:rPr>
+              <a:t>IP</a:t>
+            </a:r>
+            <a:r>
+              <a:rPr lang="en-US" sz="1000" dirty="0">
+                <a:solidFill>
+                  <a:schemeClr val="tx1">
+                    <a:lumMod val="75000"/>
+                    <a:lumOff val="25000"/>
+                  </a:schemeClr>
+                </a:solidFill>
+              </a:rPr>
+              <a:t>: </a:t>
+            </a:r>
+            <a:r>
+              <a:rPr lang="en-SG" sz="1000" i="0" dirty="0">
+                <a:solidFill>
+                  <a:srgbClr val="4B5563"/>
+                </a:solidFill>
+                <a:effectLst/>
+              </a:rPr>
+              <a:t>10.107.109.5</a:t>
+            </a:r>
+            <a:endParaRPr lang="en-US" sz="1000" dirty="0">
+              <a:solidFill>
+                <a:schemeClr val="tx1">
+                  <a:lumMod val="75000"/>
+                  <a:lumOff val="25000"/>
+                </a:schemeClr>
+              </a:solidFill>
+            </a:endParaRPr>
+          </a:p>
+        </p:txBody>
+      </p:sp>
+      <p:cxnSp>
+        <p:nvCxnSpPr>
+          <p:cNvPr id="10" name="Straight Connector 9">
+            <a:extLst>
+              <a:ext uri="{FF2B5EF4-FFF2-40B4-BE49-F238E27FC236}">
+                <a16:creationId xmlns:a16="http://schemas.microsoft.com/office/drawing/2014/main" id="{5529708A-93B8-6C43-7F17-7280EF930EB6}"/>
+              </a:ext>
+            </a:extLst>
+          </p:cNvPr>
+          <p:cNvCxnSpPr>
+            <a:cxnSpLocks/>
+            <a:stCxn id="6" idx="2"/>
+          </p:cNvCxnSpPr>
+          <p:nvPr/>
+        </p:nvCxnSpPr>
+        <p:spPr>
+          <a:xfrm>
+            <a:off x="1514712" y="2303279"/>
+            <a:ext cx="0" cy="283893"/>
+          </a:xfrm>
+          <a:prstGeom prst="line">
+            <a:avLst/>
+          </a:prstGeom>
+        </p:spPr>
+        <p:style>
+          <a:lnRef idx="2">
+            <a:schemeClr val="dk1"/>
+          </a:lnRef>
+          <a:fillRef idx="0">
+            <a:schemeClr val="dk1"/>
+          </a:fillRef>
+          <a:effectRef idx="1">
+            <a:schemeClr val="dk1"/>
+          </a:effectRef>
+          <a:fontRef idx="minor">
+            <a:schemeClr val="tx1"/>
+          </a:fontRef>
+        </p:style>
+      </p:cxnSp>
+      <p:sp>
+        <p:nvSpPr>
+          <p:cNvPr id="12" name="TextBox 11">
+            <a:extLst>
+              <a:ext uri="{FF2B5EF4-FFF2-40B4-BE49-F238E27FC236}">
+                <a16:creationId xmlns:a16="http://schemas.microsoft.com/office/drawing/2014/main" id="{4DB694A7-83B9-DC20-D152-D3793A917D06}"/>
+              </a:ext>
+            </a:extLst>
+          </p:cNvPr>
+          <p:cNvSpPr txBox="1"/>
+          <p:nvPr/>
+        </p:nvSpPr>
+        <p:spPr>
+          <a:xfrm>
+            <a:off x="3901009" y="4051634"/>
+            <a:ext cx="2679005" cy="553998"/>
+          </a:xfrm>
+          <a:prstGeom prst="rect">
+            <a:avLst/>
+          </a:prstGeom>
+          <a:noFill/>
+        </p:spPr>
+        <p:txBody>
+          <a:bodyPr wrap="square">
+            <a:spAutoFit/>
+          </a:bodyPr>
+          <a:lstStyle/>
+          <a:p>
+            <a:r>
+              <a:rPr lang="en-US" sz="1000" b="1" dirty="0">
+                <a:solidFill>
+                  <a:schemeClr val="tx1">
+                    <a:lumMod val="75000"/>
+                    <a:lumOff val="25000"/>
+                  </a:schemeClr>
+                </a:solidFill>
+              </a:rPr>
+              <a:t>VM_ID</a:t>
+            </a:r>
+            <a:r>
+              <a:rPr lang="en-US" sz="1000" dirty="0">
+                <a:solidFill>
+                  <a:schemeClr val="tx1">
+                    <a:lumMod val="75000"/>
+                    <a:lumOff val="25000"/>
+                  </a:schemeClr>
+                </a:solidFill>
+              </a:rPr>
+              <a:t>: PW-PowerGrid</a:t>
+            </a:r>
+          </a:p>
+          <a:p>
+            <a:r>
+              <a:rPr lang="en-US" sz="1000" b="1" dirty="0" err="1">
+                <a:solidFill>
+                  <a:schemeClr val="tx1">
+                    <a:lumMod val="75000"/>
+                    <a:lumOff val="25000"/>
+                  </a:schemeClr>
+                </a:solidFill>
+              </a:rPr>
+              <a:t>Func</a:t>
+            </a:r>
+            <a:r>
+              <a:rPr lang="en-US" sz="1000" dirty="0">
+                <a:solidFill>
+                  <a:schemeClr val="tx1">
+                    <a:lumMod val="75000"/>
+                    <a:lumOff val="25000"/>
+                  </a:schemeClr>
+                </a:solidFill>
+              </a:rPr>
+              <a:t>: Power Grid Physical World Simulator </a:t>
+            </a:r>
+          </a:p>
+          <a:p>
+            <a:r>
+              <a:rPr lang="en-US" sz="1000" b="1" dirty="0">
+                <a:solidFill>
+                  <a:schemeClr val="tx1">
+                    <a:lumMod val="75000"/>
+                    <a:lumOff val="25000"/>
+                  </a:schemeClr>
+                </a:solidFill>
+              </a:rPr>
+              <a:t>IP</a:t>
+            </a:r>
+            <a:r>
+              <a:rPr lang="en-US" sz="1000" dirty="0">
+                <a:solidFill>
+                  <a:schemeClr val="tx1">
+                    <a:lumMod val="75000"/>
+                    <a:lumOff val="25000"/>
+                  </a:schemeClr>
+                </a:solidFill>
+              </a:rPr>
+              <a:t>: </a:t>
+            </a:r>
+            <a:r>
+              <a:rPr lang="en-SG" sz="1000" i="0" dirty="0">
+                <a:solidFill>
+                  <a:srgbClr val="4B5563"/>
+                </a:solidFill>
+                <a:effectLst/>
+              </a:rPr>
+              <a:t>10.107.109.</a:t>
+            </a:r>
+            <a:r>
+              <a:rPr lang="en-SG" sz="1000" dirty="0">
+                <a:solidFill>
+                  <a:srgbClr val="4B5563"/>
+                </a:solidFill>
+              </a:rPr>
+              <a:t>8</a:t>
+            </a:r>
+            <a:endParaRPr lang="en-US" sz="1000" dirty="0">
+              <a:solidFill>
+                <a:schemeClr val="tx1">
+                  <a:lumMod val="75000"/>
+                  <a:lumOff val="25000"/>
+                </a:schemeClr>
+              </a:solidFill>
+            </a:endParaRPr>
+          </a:p>
+        </p:txBody>
+      </p:sp>
+      <p:pic>
+        <p:nvPicPr>
+          <p:cNvPr id="13" name="Picture 12">
+            <a:extLst>
+              <a:ext uri="{FF2B5EF4-FFF2-40B4-BE49-F238E27FC236}">
+                <a16:creationId xmlns:a16="http://schemas.microsoft.com/office/drawing/2014/main" id="{D01BC2A3-9041-AE40-23A5-FF73A4D37ED9}"/>
+              </a:ext>
+            </a:extLst>
+          </p:cNvPr>
+          <p:cNvPicPr>
+            <a:picLocks noChangeAspect="1"/>
+          </p:cNvPicPr>
+          <p:nvPr/>
+        </p:nvPicPr>
+        <p:blipFill>
+          <a:blip r:embed="rId5"/>
+          <a:stretch>
+            <a:fillRect/>
+          </a:stretch>
+        </p:blipFill>
+        <p:spPr>
+          <a:xfrm>
+            <a:off x="1249124" y="2587172"/>
+            <a:ext cx="2455208" cy="1405606"/>
+          </a:xfrm>
+          <a:prstGeom prst="rect">
+            <a:avLst/>
+          </a:prstGeom>
+          <a:ln w="9525">
+            <a:solidFill>
+              <a:schemeClr val="tx1"/>
+            </a:solidFill>
+          </a:ln>
+        </p:spPr>
+      </p:pic>
+      <p:cxnSp>
+        <p:nvCxnSpPr>
+          <p:cNvPr id="15" name="Straight Connector 14">
+            <a:extLst>
+              <a:ext uri="{FF2B5EF4-FFF2-40B4-BE49-F238E27FC236}">
+                <a16:creationId xmlns:a16="http://schemas.microsoft.com/office/drawing/2014/main" id="{CDEF1AD5-1CA8-8B8E-A9FC-45705B9FAF57}"/>
+              </a:ext>
+            </a:extLst>
+          </p:cNvPr>
+          <p:cNvCxnSpPr>
+            <a:cxnSpLocks/>
+          </p:cNvCxnSpPr>
+          <p:nvPr/>
+        </p:nvCxnSpPr>
+        <p:spPr>
+          <a:xfrm>
+            <a:off x="4652742" y="2379401"/>
+            <a:ext cx="0" cy="173867"/>
+          </a:xfrm>
+          <a:prstGeom prst="line">
+            <a:avLst/>
+          </a:prstGeom>
+        </p:spPr>
+        <p:style>
+          <a:lnRef idx="2">
+            <a:schemeClr val="dk1"/>
+          </a:lnRef>
+          <a:fillRef idx="0">
+            <a:schemeClr val="dk1"/>
+          </a:fillRef>
+          <a:effectRef idx="1">
+            <a:schemeClr val="dk1"/>
+          </a:effectRef>
+          <a:fontRef idx="minor">
+            <a:schemeClr val="tx1"/>
+          </a:fontRef>
+        </p:style>
+      </p:cxnSp>
+      <p:sp>
+        <p:nvSpPr>
+          <p:cNvPr id="19" name="TextBox 18">
+            <a:extLst>
+              <a:ext uri="{FF2B5EF4-FFF2-40B4-BE49-F238E27FC236}">
+                <a16:creationId xmlns:a16="http://schemas.microsoft.com/office/drawing/2014/main" id="{C3734061-E325-C68D-BF51-3C929E4C1813}"/>
+              </a:ext>
+            </a:extLst>
+          </p:cNvPr>
+          <p:cNvSpPr txBox="1"/>
+          <p:nvPr/>
+        </p:nvSpPr>
+        <p:spPr>
+          <a:xfrm>
+            <a:off x="1202510" y="4003283"/>
+            <a:ext cx="2087693" cy="553998"/>
+          </a:xfrm>
+          <a:prstGeom prst="rect">
+            <a:avLst/>
+          </a:prstGeom>
+          <a:noFill/>
+        </p:spPr>
+        <p:txBody>
+          <a:bodyPr wrap="square">
+            <a:spAutoFit/>
+          </a:bodyPr>
+          <a:lstStyle/>
+          <a:p>
+            <a:r>
+              <a:rPr lang="en-US" sz="1000" b="1" dirty="0">
+                <a:solidFill>
+                  <a:schemeClr val="tx1">
+                    <a:lumMod val="75000"/>
+                    <a:lumOff val="25000"/>
+                  </a:schemeClr>
+                </a:solidFill>
+              </a:rPr>
+              <a:t>VM_ID</a:t>
+            </a:r>
+            <a:r>
+              <a:rPr lang="en-US" sz="1000" dirty="0">
+                <a:solidFill>
+                  <a:schemeClr val="tx1">
+                    <a:lumMod val="75000"/>
+                    <a:lumOff val="25000"/>
+                  </a:schemeClr>
+                </a:solidFill>
+              </a:rPr>
+              <a:t>: PW-Railway </a:t>
+            </a:r>
+          </a:p>
+          <a:p>
+            <a:r>
+              <a:rPr lang="en-US" sz="1000" b="1" dirty="0" err="1">
+                <a:solidFill>
+                  <a:schemeClr val="tx1">
+                    <a:lumMod val="75000"/>
+                    <a:lumOff val="25000"/>
+                  </a:schemeClr>
+                </a:solidFill>
+              </a:rPr>
+              <a:t>Func</a:t>
+            </a:r>
+            <a:r>
+              <a:rPr lang="en-US" sz="1000" dirty="0">
+                <a:solidFill>
+                  <a:schemeClr val="tx1">
+                    <a:lumMod val="75000"/>
+                    <a:lumOff val="25000"/>
+                  </a:schemeClr>
+                </a:solidFill>
+              </a:rPr>
+              <a:t>: Power Customer Simulator </a:t>
+            </a:r>
+          </a:p>
+          <a:p>
+            <a:r>
+              <a:rPr lang="en-US" sz="1000" b="1" dirty="0">
+                <a:solidFill>
+                  <a:schemeClr val="tx1">
+                    <a:lumMod val="75000"/>
+                    <a:lumOff val="25000"/>
+                  </a:schemeClr>
+                </a:solidFill>
+              </a:rPr>
+              <a:t>IP</a:t>
+            </a:r>
+            <a:r>
+              <a:rPr lang="en-US" sz="1000" dirty="0">
+                <a:solidFill>
+                  <a:schemeClr val="tx1">
+                    <a:lumMod val="75000"/>
+                    <a:lumOff val="25000"/>
+                  </a:schemeClr>
+                </a:solidFill>
+              </a:rPr>
+              <a:t>: </a:t>
+            </a:r>
+            <a:r>
+              <a:rPr lang="en-SG" sz="1000" i="0" dirty="0">
+                <a:solidFill>
+                  <a:srgbClr val="4B5563"/>
+                </a:solidFill>
+                <a:effectLst/>
+              </a:rPr>
+              <a:t>10.107.109.</a:t>
+            </a:r>
+            <a:r>
+              <a:rPr lang="en-SG" sz="1000" dirty="0">
+                <a:solidFill>
+                  <a:srgbClr val="4B5563"/>
+                </a:solidFill>
+              </a:rPr>
+              <a:t>7</a:t>
+            </a:r>
+            <a:endParaRPr lang="en-US" sz="1000" dirty="0">
+              <a:solidFill>
+                <a:schemeClr val="tx1">
+                  <a:lumMod val="75000"/>
+                  <a:lumOff val="25000"/>
+                </a:schemeClr>
+              </a:solidFill>
+            </a:endParaRPr>
+          </a:p>
+        </p:txBody>
+      </p:sp>
+      <p:pic>
+        <p:nvPicPr>
+          <p:cNvPr id="20" name="Picture 19">
+            <a:extLst>
+              <a:ext uri="{FF2B5EF4-FFF2-40B4-BE49-F238E27FC236}">
+                <a16:creationId xmlns:a16="http://schemas.microsoft.com/office/drawing/2014/main" id="{17C05340-2FA4-F9E9-1F2A-C6BD9C655DD0}"/>
+              </a:ext>
+            </a:extLst>
+          </p:cNvPr>
+          <p:cNvPicPr>
+            <a:picLocks noChangeAspect="1"/>
+          </p:cNvPicPr>
+          <p:nvPr/>
+        </p:nvPicPr>
+        <p:blipFill>
+          <a:blip r:embed="rId4"/>
+          <a:stretch>
+            <a:fillRect/>
+          </a:stretch>
+        </p:blipFill>
+        <p:spPr>
+          <a:xfrm>
+            <a:off x="4398829" y="1874244"/>
+            <a:ext cx="531176" cy="467941"/>
+          </a:xfrm>
+          <a:prstGeom prst="rect">
+            <a:avLst/>
+          </a:prstGeom>
+          <a:ln w="19050">
+            <a:solidFill>
+              <a:schemeClr val="tx1"/>
+            </a:solidFill>
+          </a:ln>
+        </p:spPr>
+      </p:pic>
+      <p:sp>
+        <p:nvSpPr>
+          <p:cNvPr id="21" name="TextBox 20">
+            <a:extLst>
+              <a:ext uri="{FF2B5EF4-FFF2-40B4-BE49-F238E27FC236}">
+                <a16:creationId xmlns:a16="http://schemas.microsoft.com/office/drawing/2014/main" id="{39A21BC2-4B24-0053-AC78-4609CB50271C}"/>
+              </a:ext>
+            </a:extLst>
+          </p:cNvPr>
+          <p:cNvSpPr txBox="1"/>
+          <p:nvPr/>
+        </p:nvSpPr>
+        <p:spPr>
+          <a:xfrm>
+            <a:off x="4999562" y="1817077"/>
+            <a:ext cx="1785282" cy="707886"/>
+          </a:xfrm>
+          <a:prstGeom prst="rect">
+            <a:avLst/>
+          </a:prstGeom>
+          <a:noFill/>
+        </p:spPr>
+        <p:txBody>
+          <a:bodyPr wrap="square">
+            <a:spAutoFit/>
+          </a:bodyPr>
+          <a:lstStyle/>
+          <a:p>
+            <a:r>
+              <a:rPr lang="en-US" sz="1000" b="1" dirty="0">
+                <a:solidFill>
+                  <a:schemeClr val="tx1">
+                    <a:lumMod val="75000"/>
+                    <a:lumOff val="25000"/>
+                  </a:schemeClr>
+                </a:solidFill>
+              </a:rPr>
+              <a:t>VM_ID</a:t>
+            </a:r>
+            <a:r>
+              <a:rPr lang="en-US" sz="1000" dirty="0">
+                <a:solidFill>
+                  <a:schemeClr val="tx1">
+                    <a:lumMod val="75000"/>
+                    <a:lumOff val="25000"/>
+                  </a:schemeClr>
+                </a:solidFill>
+              </a:rPr>
+              <a:t>: PW-</a:t>
+            </a:r>
+            <a:r>
+              <a:rPr lang="en-US" sz="1000" dirty="0" err="1">
+                <a:solidFill>
+                  <a:schemeClr val="tx1">
+                    <a:lumMod val="75000"/>
+                    <a:lumOff val="25000"/>
+                  </a:schemeClr>
+                </a:solidFill>
+              </a:rPr>
+              <a:t>WeatherFetcher</a:t>
+            </a:r>
+            <a:endParaRPr lang="en-US" sz="1000" dirty="0">
+              <a:solidFill>
+                <a:schemeClr val="tx1">
+                  <a:lumMod val="75000"/>
+                  <a:lumOff val="25000"/>
+                </a:schemeClr>
+              </a:solidFill>
+            </a:endParaRPr>
+          </a:p>
+          <a:p>
+            <a:r>
+              <a:rPr lang="en-US" sz="1000" b="1" dirty="0" err="1">
+                <a:solidFill>
+                  <a:schemeClr val="tx1">
+                    <a:lumMod val="75000"/>
+                    <a:lumOff val="25000"/>
+                  </a:schemeClr>
+                </a:solidFill>
+              </a:rPr>
+              <a:t>Func</a:t>
+            </a:r>
+            <a:r>
+              <a:rPr lang="en-US" sz="1000" dirty="0">
+                <a:solidFill>
+                  <a:schemeClr val="tx1">
+                    <a:lumMod val="75000"/>
+                    <a:lumOff val="25000"/>
+                  </a:schemeClr>
+                </a:solidFill>
+              </a:rPr>
+              <a:t>: Power Grid Weather Data Fetcher</a:t>
+            </a:r>
+          </a:p>
+          <a:p>
+            <a:r>
+              <a:rPr lang="en-US" sz="1000" b="1" dirty="0">
+                <a:solidFill>
+                  <a:schemeClr val="tx1">
+                    <a:lumMod val="75000"/>
+                    <a:lumOff val="25000"/>
+                  </a:schemeClr>
+                </a:solidFill>
+              </a:rPr>
+              <a:t>IP</a:t>
+            </a:r>
+            <a:r>
+              <a:rPr lang="en-US" sz="1000" dirty="0">
+                <a:solidFill>
+                  <a:schemeClr val="tx1">
+                    <a:lumMod val="75000"/>
+                    <a:lumOff val="25000"/>
+                  </a:schemeClr>
+                </a:solidFill>
+              </a:rPr>
+              <a:t>: </a:t>
+            </a:r>
+            <a:r>
+              <a:rPr lang="en-SG" sz="1000" i="0" dirty="0">
+                <a:solidFill>
+                  <a:srgbClr val="4B5563"/>
+                </a:solidFill>
+                <a:effectLst/>
+              </a:rPr>
+              <a:t>10.107.109.</a:t>
+            </a:r>
+            <a:r>
+              <a:rPr lang="en-SG" sz="1000" dirty="0">
+                <a:solidFill>
+                  <a:srgbClr val="4B5563"/>
+                </a:solidFill>
+              </a:rPr>
+              <a:t>6</a:t>
+            </a:r>
+            <a:endParaRPr lang="en-US" sz="1000" dirty="0">
+              <a:solidFill>
+                <a:schemeClr val="tx1">
+                  <a:lumMod val="75000"/>
+                  <a:lumOff val="25000"/>
+                </a:schemeClr>
+              </a:solidFill>
+            </a:endParaRPr>
+          </a:p>
+        </p:txBody>
+      </p:sp>
+      <p:cxnSp>
+        <p:nvCxnSpPr>
+          <p:cNvPr id="40" name="Connector: Elbow 39">
+            <a:extLst>
+              <a:ext uri="{FF2B5EF4-FFF2-40B4-BE49-F238E27FC236}">
+                <a16:creationId xmlns:a16="http://schemas.microsoft.com/office/drawing/2014/main" id="{C0FAB0F0-3A45-1B9E-5B4A-7853BD7997F5}"/>
+              </a:ext>
+            </a:extLst>
+          </p:cNvPr>
+          <p:cNvCxnSpPr>
+            <a:cxnSpLocks/>
+            <a:stCxn id="6" idx="3"/>
+            <a:endCxn id="4" idx="1"/>
+          </p:cNvCxnSpPr>
+          <p:nvPr/>
+        </p:nvCxnSpPr>
+        <p:spPr>
+          <a:xfrm>
+            <a:off x="1780300" y="2069309"/>
+            <a:ext cx="2197010" cy="1258188"/>
+          </a:xfrm>
+          <a:prstGeom prst="bentConnector3">
+            <a:avLst>
+              <a:gd name="adj1" fmla="val 92921"/>
+            </a:avLst>
+          </a:prstGeom>
+        </p:spPr>
+        <p:style>
+          <a:lnRef idx="2">
+            <a:schemeClr val="dk1"/>
+          </a:lnRef>
+          <a:fillRef idx="0">
+            <a:schemeClr val="dk1"/>
+          </a:fillRef>
+          <a:effectRef idx="1">
+            <a:schemeClr val="dk1"/>
+          </a:effectRef>
+          <a:fontRef idx="minor">
+            <a:schemeClr val="tx1"/>
+          </a:fontRef>
+        </p:style>
+      </p:cxnSp>
+      <p:sp>
+        <p:nvSpPr>
+          <p:cNvPr id="48" name="TextBox 47">
+            <a:extLst>
+              <a:ext uri="{FF2B5EF4-FFF2-40B4-BE49-F238E27FC236}">
+                <a16:creationId xmlns:a16="http://schemas.microsoft.com/office/drawing/2014/main" id="{33F8F8C3-1D81-4F23-569D-C49F4CD43272}"/>
+              </a:ext>
+            </a:extLst>
+          </p:cNvPr>
+          <p:cNvSpPr txBox="1"/>
+          <p:nvPr/>
+        </p:nvSpPr>
+        <p:spPr>
+          <a:xfrm>
+            <a:off x="971210" y="1328397"/>
+            <a:ext cx="4446910" cy="307777"/>
+          </a:xfrm>
+          <a:prstGeom prst="rect">
+            <a:avLst/>
+          </a:prstGeom>
+          <a:noFill/>
+        </p:spPr>
+        <p:txBody>
+          <a:bodyPr wrap="square">
+            <a:spAutoFit/>
+          </a:bodyPr>
+          <a:lstStyle/>
+          <a:p>
+            <a:r>
+              <a:rPr lang="en-US" sz="1400" b="1" dirty="0" err="1">
+                <a:solidFill>
+                  <a:schemeClr val="accent6">
+                    <a:lumMod val="50000"/>
+                  </a:schemeClr>
+                </a:solidFill>
+              </a:rPr>
+              <a:t>Power_Grid_Physical</a:t>
+            </a:r>
+            <a:r>
+              <a:rPr lang="en-US" sz="1400" b="1" dirty="0">
+                <a:solidFill>
+                  <a:schemeClr val="accent6">
+                    <a:lumMod val="50000"/>
+                  </a:schemeClr>
+                </a:solidFill>
+              </a:rPr>
+              <a:t> World Network </a:t>
+            </a:r>
+            <a:endParaRPr lang="en-SG" sz="1400" b="1" dirty="0">
+              <a:solidFill>
+                <a:schemeClr val="accent6">
+                  <a:lumMod val="50000"/>
+                </a:schemeClr>
+              </a:solidFill>
+            </a:endParaRPr>
+          </a:p>
+        </p:txBody>
+      </p:sp>
+      <p:sp>
+        <p:nvSpPr>
+          <p:cNvPr id="58" name="Rectangle 57">
+            <a:extLst>
+              <a:ext uri="{FF2B5EF4-FFF2-40B4-BE49-F238E27FC236}">
+                <a16:creationId xmlns:a16="http://schemas.microsoft.com/office/drawing/2014/main" id="{8111B453-2D55-E6EE-9252-25EAF7EEE1D6}"/>
+              </a:ext>
+            </a:extLst>
+          </p:cNvPr>
+          <p:cNvSpPr/>
+          <p:nvPr/>
+        </p:nvSpPr>
+        <p:spPr>
+          <a:xfrm>
+            <a:off x="7833758" y="2941988"/>
+            <a:ext cx="1136720" cy="641876"/>
+          </a:xfrm>
+          <a:prstGeom prst="rect">
+            <a:avLst/>
+          </a:prstGeom>
+          <a:solidFill>
+            <a:schemeClr val="bg1"/>
+          </a:solidFill>
+        </p:spPr>
+        <p:style>
+          <a:lnRef idx="2">
+            <a:schemeClr val="accent1">
+              <a:shade val="15000"/>
+            </a:schemeClr>
+          </a:lnRef>
+          <a:fillRef idx="1">
+            <a:schemeClr val="accent1"/>
+          </a:fillRef>
+          <a:effectRef idx="0">
+            <a:schemeClr val="accent1"/>
+          </a:effectRef>
+          <a:fontRef idx="minor">
+            <a:schemeClr val="lt1"/>
+          </a:fontRef>
+        </p:style>
+        <p:txBody>
+          <a:bodyPr rtlCol="0" anchor="ctr"/>
+          <a:lstStyle/>
+          <a:p>
+            <a:pPr algn="ctr"/>
+            <a:endParaRPr lang="en-SG" dirty="0"/>
+          </a:p>
+        </p:txBody>
+      </p:sp>
+      <p:pic>
+        <p:nvPicPr>
+          <p:cNvPr id="59" name="Picture 58">
+            <a:extLst>
+              <a:ext uri="{FF2B5EF4-FFF2-40B4-BE49-F238E27FC236}">
+                <a16:creationId xmlns:a16="http://schemas.microsoft.com/office/drawing/2014/main" id="{2964C113-3CBC-1017-4712-F5A717EFF17A}"/>
+              </a:ext>
+            </a:extLst>
+          </p:cNvPr>
+          <p:cNvPicPr>
+            <a:picLocks noChangeAspect="1"/>
+          </p:cNvPicPr>
+          <p:nvPr/>
+        </p:nvPicPr>
+        <p:blipFill>
+          <a:blip r:embed="rId4"/>
+          <a:stretch>
+            <a:fillRect/>
+          </a:stretch>
+        </p:blipFill>
+        <p:spPr>
+          <a:xfrm>
+            <a:off x="8176222" y="3022172"/>
+            <a:ext cx="531176" cy="467941"/>
+          </a:xfrm>
+          <a:prstGeom prst="rect">
+            <a:avLst/>
+          </a:prstGeom>
+        </p:spPr>
+      </p:pic>
+      <p:pic>
+        <p:nvPicPr>
+          <p:cNvPr id="60" name="Picture 59">
+            <a:extLst>
+              <a:ext uri="{FF2B5EF4-FFF2-40B4-BE49-F238E27FC236}">
+                <a16:creationId xmlns:a16="http://schemas.microsoft.com/office/drawing/2014/main" id="{4A235DCC-7D4D-9EE3-84B3-015964357DEA}"/>
+              </a:ext>
+            </a:extLst>
+          </p:cNvPr>
+          <p:cNvPicPr>
+            <a:picLocks noChangeAspect="1"/>
+          </p:cNvPicPr>
+          <p:nvPr/>
+        </p:nvPicPr>
+        <p:blipFill>
+          <a:blip r:embed="rId6"/>
+          <a:stretch>
+            <a:fillRect/>
+          </a:stretch>
+        </p:blipFill>
+        <p:spPr>
+          <a:xfrm>
+            <a:off x="8035086" y="3137181"/>
+            <a:ext cx="297869" cy="175743"/>
+          </a:xfrm>
+          <a:prstGeom prst="rect">
+            <a:avLst/>
+          </a:prstGeom>
+          <a:ln>
+            <a:solidFill>
+              <a:schemeClr val="tx1">
+                <a:lumMod val="75000"/>
+                <a:lumOff val="25000"/>
+              </a:schemeClr>
+            </a:solidFill>
+          </a:ln>
+        </p:spPr>
+      </p:pic>
+      <p:pic>
+        <p:nvPicPr>
+          <p:cNvPr id="62" name="Picture 61">
+            <a:extLst>
+              <a:ext uri="{FF2B5EF4-FFF2-40B4-BE49-F238E27FC236}">
+                <a16:creationId xmlns:a16="http://schemas.microsoft.com/office/drawing/2014/main" id="{A7F15A75-6A18-BEC9-C871-CE2A5E66BEC8}"/>
+              </a:ext>
+            </a:extLst>
+          </p:cNvPr>
+          <p:cNvPicPr>
+            <a:picLocks noChangeAspect="1"/>
+          </p:cNvPicPr>
+          <p:nvPr/>
+        </p:nvPicPr>
+        <p:blipFill>
+          <a:blip r:embed="rId7"/>
+          <a:stretch>
+            <a:fillRect/>
+          </a:stretch>
+        </p:blipFill>
+        <p:spPr>
+          <a:xfrm>
+            <a:off x="7664070" y="3201705"/>
+            <a:ext cx="259996" cy="253497"/>
+          </a:xfrm>
+          <a:prstGeom prst="rect">
+            <a:avLst/>
+          </a:prstGeom>
+        </p:spPr>
+      </p:pic>
+      <p:pic>
+        <p:nvPicPr>
+          <p:cNvPr id="63" name="Picture 62">
+            <a:extLst>
+              <a:ext uri="{FF2B5EF4-FFF2-40B4-BE49-F238E27FC236}">
+                <a16:creationId xmlns:a16="http://schemas.microsoft.com/office/drawing/2014/main" id="{86C22957-1245-50DC-DE6D-13B970050F7D}"/>
+              </a:ext>
+            </a:extLst>
+          </p:cNvPr>
+          <p:cNvPicPr>
+            <a:picLocks noChangeAspect="1"/>
+          </p:cNvPicPr>
+          <p:nvPr/>
+        </p:nvPicPr>
+        <p:blipFill>
+          <a:blip r:embed="rId7"/>
+          <a:stretch>
+            <a:fillRect/>
+          </a:stretch>
+        </p:blipFill>
+        <p:spPr>
+          <a:xfrm>
+            <a:off x="8272120" y="2744646"/>
+            <a:ext cx="259996" cy="253497"/>
+          </a:xfrm>
+          <a:prstGeom prst="rect">
+            <a:avLst/>
+          </a:prstGeom>
+        </p:spPr>
+      </p:pic>
+      <p:cxnSp>
+        <p:nvCxnSpPr>
+          <p:cNvPr id="64" name="Straight Connector 63">
+            <a:extLst>
+              <a:ext uri="{FF2B5EF4-FFF2-40B4-BE49-F238E27FC236}">
+                <a16:creationId xmlns:a16="http://schemas.microsoft.com/office/drawing/2014/main" id="{4C192514-D7BB-3729-DCAD-4DE9A035A1B2}"/>
+              </a:ext>
+            </a:extLst>
+          </p:cNvPr>
+          <p:cNvCxnSpPr>
+            <a:cxnSpLocks/>
+            <a:endCxn id="62" idx="1"/>
+          </p:cNvCxnSpPr>
+          <p:nvPr/>
+        </p:nvCxnSpPr>
+        <p:spPr>
+          <a:xfrm>
+            <a:off x="6503714" y="3328453"/>
+            <a:ext cx="1160356" cy="1"/>
+          </a:xfrm>
+          <a:prstGeom prst="line">
+            <a:avLst/>
+          </a:prstGeom>
+        </p:spPr>
+        <p:style>
+          <a:lnRef idx="2">
+            <a:schemeClr val="dk1"/>
+          </a:lnRef>
+          <a:fillRef idx="0">
+            <a:schemeClr val="dk1"/>
+          </a:fillRef>
+          <a:effectRef idx="1">
+            <a:schemeClr val="dk1"/>
+          </a:effectRef>
+          <a:fontRef idx="minor">
+            <a:schemeClr val="tx1"/>
+          </a:fontRef>
+        </p:style>
+      </p:cxnSp>
+      <p:sp>
+        <p:nvSpPr>
+          <p:cNvPr id="69" name="TextBox 68">
+            <a:extLst>
+              <a:ext uri="{FF2B5EF4-FFF2-40B4-BE49-F238E27FC236}">
+                <a16:creationId xmlns:a16="http://schemas.microsoft.com/office/drawing/2014/main" id="{5680BDB3-40D3-381A-ACDE-10C099567DEA}"/>
+              </a:ext>
+            </a:extLst>
+          </p:cNvPr>
+          <p:cNvSpPr txBox="1"/>
+          <p:nvPr/>
+        </p:nvSpPr>
+        <p:spPr>
+          <a:xfrm>
+            <a:off x="7697217" y="3573149"/>
+            <a:ext cx="1406418" cy="400110"/>
+          </a:xfrm>
+          <a:prstGeom prst="rect">
+            <a:avLst/>
+          </a:prstGeom>
+          <a:noFill/>
+        </p:spPr>
+        <p:txBody>
+          <a:bodyPr wrap="square">
+            <a:spAutoFit/>
+          </a:bodyPr>
+          <a:lstStyle/>
+          <a:p>
+            <a:r>
+              <a:rPr lang="en-US" sz="1000" b="1" dirty="0">
+                <a:solidFill>
+                  <a:schemeClr val="tx1">
+                    <a:lumMod val="75000"/>
+                    <a:lumOff val="25000"/>
+                  </a:schemeClr>
+                </a:solidFill>
+              </a:rPr>
+              <a:t>VM_ID</a:t>
+            </a:r>
+            <a:r>
+              <a:rPr lang="en-US" sz="1000" dirty="0">
+                <a:solidFill>
+                  <a:schemeClr val="tx1">
+                    <a:lumMod val="75000"/>
+                    <a:lumOff val="25000"/>
+                  </a:schemeClr>
+                </a:solidFill>
+              </a:rPr>
+              <a:t>: SCADA-PLC</a:t>
+            </a:r>
+          </a:p>
+          <a:p>
+            <a:r>
+              <a:rPr lang="en-US" sz="1000" b="1" dirty="0" err="1">
+                <a:solidFill>
+                  <a:schemeClr val="tx1">
+                    <a:lumMod val="75000"/>
+                    <a:lumOff val="25000"/>
+                  </a:schemeClr>
+                </a:solidFill>
+              </a:rPr>
+              <a:t>Func</a:t>
+            </a:r>
+            <a:r>
+              <a:rPr lang="en-US" sz="1000" dirty="0">
+                <a:solidFill>
+                  <a:schemeClr val="tx1">
+                    <a:lumMod val="75000"/>
+                    <a:lumOff val="25000"/>
+                  </a:schemeClr>
+                </a:solidFill>
+              </a:rPr>
+              <a:t>: Power Grid PLC </a:t>
+            </a:r>
+          </a:p>
+        </p:txBody>
+      </p:sp>
+      <p:sp>
+        <p:nvSpPr>
+          <p:cNvPr id="74" name="TextBox 73">
+            <a:extLst>
+              <a:ext uri="{FF2B5EF4-FFF2-40B4-BE49-F238E27FC236}">
+                <a16:creationId xmlns:a16="http://schemas.microsoft.com/office/drawing/2014/main" id="{236BF4E9-784F-2627-AA2A-AC02C4EB4FA1}"/>
+              </a:ext>
+            </a:extLst>
+          </p:cNvPr>
+          <p:cNvSpPr txBox="1"/>
+          <p:nvPr/>
+        </p:nvSpPr>
+        <p:spPr>
+          <a:xfrm>
+            <a:off x="6809502" y="3122261"/>
+            <a:ext cx="939854" cy="246221"/>
+          </a:xfrm>
+          <a:prstGeom prst="rect">
+            <a:avLst/>
+          </a:prstGeom>
+          <a:noFill/>
+        </p:spPr>
+        <p:txBody>
+          <a:bodyPr wrap="square" rtlCol="0">
+            <a:spAutoFit/>
+          </a:bodyPr>
+          <a:lstStyle/>
+          <a:p>
+            <a:r>
+              <a:rPr lang="en-US" sz="1000" dirty="0"/>
+              <a:t>10.107.109.9</a:t>
+            </a:r>
+          </a:p>
+        </p:txBody>
+      </p:sp>
+      <p:sp>
+        <p:nvSpPr>
+          <p:cNvPr id="75" name="Rectangle 74">
+            <a:extLst>
+              <a:ext uri="{FF2B5EF4-FFF2-40B4-BE49-F238E27FC236}">
+                <a16:creationId xmlns:a16="http://schemas.microsoft.com/office/drawing/2014/main" id="{D97536F3-6CC1-9E42-3CC2-1A8C9EFF5CBF}"/>
+              </a:ext>
+            </a:extLst>
+          </p:cNvPr>
+          <p:cNvSpPr/>
+          <p:nvPr/>
+        </p:nvSpPr>
+        <p:spPr>
+          <a:xfrm>
+            <a:off x="9159784" y="3652321"/>
+            <a:ext cx="1136720" cy="641876"/>
+          </a:xfrm>
+          <a:prstGeom prst="rect">
+            <a:avLst/>
+          </a:prstGeom>
+          <a:solidFill>
+            <a:schemeClr val="bg1"/>
+          </a:solidFill>
+        </p:spPr>
+        <p:style>
+          <a:lnRef idx="2">
+            <a:schemeClr val="accent1">
+              <a:shade val="15000"/>
+            </a:schemeClr>
+          </a:lnRef>
+          <a:fillRef idx="1">
+            <a:schemeClr val="accent1"/>
+          </a:fillRef>
+          <a:effectRef idx="0">
+            <a:schemeClr val="accent1"/>
+          </a:effectRef>
+          <a:fontRef idx="minor">
+            <a:schemeClr val="lt1"/>
+          </a:fontRef>
+        </p:style>
+        <p:txBody>
+          <a:bodyPr rtlCol="0" anchor="ctr"/>
+          <a:lstStyle/>
+          <a:p>
+            <a:pPr algn="ctr"/>
+            <a:endParaRPr lang="en-SG" dirty="0"/>
+          </a:p>
+        </p:txBody>
+      </p:sp>
+      <p:pic>
+        <p:nvPicPr>
+          <p:cNvPr id="76" name="Picture 75">
+            <a:extLst>
+              <a:ext uri="{FF2B5EF4-FFF2-40B4-BE49-F238E27FC236}">
+                <a16:creationId xmlns:a16="http://schemas.microsoft.com/office/drawing/2014/main" id="{AC27C94C-D78A-BD60-8853-9DD12F8F791C}"/>
+              </a:ext>
+            </a:extLst>
+          </p:cNvPr>
+          <p:cNvPicPr>
+            <a:picLocks noChangeAspect="1"/>
+          </p:cNvPicPr>
+          <p:nvPr/>
+        </p:nvPicPr>
+        <p:blipFill>
+          <a:blip r:embed="rId4"/>
+          <a:stretch>
+            <a:fillRect/>
+          </a:stretch>
+        </p:blipFill>
+        <p:spPr>
+          <a:xfrm>
+            <a:off x="9502248" y="3732505"/>
+            <a:ext cx="531176" cy="467941"/>
+          </a:xfrm>
+          <a:prstGeom prst="rect">
+            <a:avLst/>
+          </a:prstGeom>
+        </p:spPr>
+      </p:pic>
+      <p:pic>
+        <p:nvPicPr>
+          <p:cNvPr id="78" name="Picture 77">
+            <a:extLst>
+              <a:ext uri="{FF2B5EF4-FFF2-40B4-BE49-F238E27FC236}">
+                <a16:creationId xmlns:a16="http://schemas.microsoft.com/office/drawing/2014/main" id="{9A84A5DA-D4FD-FA53-9656-16DC911DB066}"/>
+              </a:ext>
+            </a:extLst>
+          </p:cNvPr>
+          <p:cNvPicPr>
+            <a:picLocks noChangeAspect="1"/>
+          </p:cNvPicPr>
+          <p:nvPr/>
+        </p:nvPicPr>
+        <p:blipFill>
+          <a:blip r:embed="rId7"/>
+          <a:stretch>
+            <a:fillRect/>
+          </a:stretch>
+        </p:blipFill>
+        <p:spPr>
+          <a:xfrm>
+            <a:off x="9006454" y="3923088"/>
+            <a:ext cx="259996" cy="253497"/>
+          </a:xfrm>
+          <a:prstGeom prst="rect">
+            <a:avLst/>
+          </a:prstGeom>
+        </p:spPr>
+      </p:pic>
+      <p:pic>
+        <p:nvPicPr>
+          <p:cNvPr id="79" name="Picture 78">
+            <a:extLst>
+              <a:ext uri="{FF2B5EF4-FFF2-40B4-BE49-F238E27FC236}">
+                <a16:creationId xmlns:a16="http://schemas.microsoft.com/office/drawing/2014/main" id="{DAABF185-C258-D197-E9C9-9B9DE43ED009}"/>
+              </a:ext>
+            </a:extLst>
+          </p:cNvPr>
+          <p:cNvPicPr>
+            <a:picLocks noChangeAspect="1"/>
+          </p:cNvPicPr>
+          <p:nvPr/>
+        </p:nvPicPr>
+        <p:blipFill>
+          <a:blip r:embed="rId7"/>
+          <a:stretch>
+            <a:fillRect/>
+          </a:stretch>
+        </p:blipFill>
+        <p:spPr>
+          <a:xfrm>
+            <a:off x="9226559" y="3504493"/>
+            <a:ext cx="259996" cy="253497"/>
+          </a:xfrm>
+          <a:prstGeom prst="rect">
+            <a:avLst/>
+          </a:prstGeom>
+        </p:spPr>
+      </p:pic>
+      <p:sp>
+        <p:nvSpPr>
+          <p:cNvPr id="80" name="TextBox 79">
+            <a:extLst>
+              <a:ext uri="{FF2B5EF4-FFF2-40B4-BE49-F238E27FC236}">
+                <a16:creationId xmlns:a16="http://schemas.microsoft.com/office/drawing/2014/main" id="{FF0A0E33-5F61-DCAD-BFA8-FE7F1DBF0739}"/>
+              </a:ext>
+            </a:extLst>
+          </p:cNvPr>
+          <p:cNvSpPr txBox="1"/>
+          <p:nvPr/>
+        </p:nvSpPr>
+        <p:spPr>
+          <a:xfrm>
+            <a:off x="9049968" y="4321001"/>
+            <a:ext cx="1798205" cy="400110"/>
+          </a:xfrm>
+          <a:prstGeom prst="rect">
+            <a:avLst/>
+          </a:prstGeom>
+          <a:noFill/>
+        </p:spPr>
+        <p:txBody>
+          <a:bodyPr wrap="square">
+            <a:spAutoFit/>
+          </a:bodyPr>
+          <a:lstStyle/>
+          <a:p>
+            <a:r>
+              <a:rPr lang="en-US" sz="1000" b="1" dirty="0">
+                <a:solidFill>
+                  <a:schemeClr val="tx1">
+                    <a:lumMod val="75000"/>
+                    <a:lumOff val="25000"/>
+                  </a:schemeClr>
+                </a:solidFill>
+              </a:rPr>
+              <a:t>VM_ID</a:t>
+            </a:r>
+            <a:r>
+              <a:rPr lang="en-US" sz="1000" dirty="0">
+                <a:solidFill>
+                  <a:schemeClr val="tx1">
+                    <a:lumMod val="75000"/>
+                    <a:lumOff val="25000"/>
+                  </a:schemeClr>
+                </a:solidFill>
+              </a:rPr>
+              <a:t>: SCADA-RTU</a:t>
+            </a:r>
+          </a:p>
+          <a:p>
+            <a:r>
+              <a:rPr lang="en-US" sz="1000" b="1" dirty="0" err="1">
+                <a:solidFill>
+                  <a:schemeClr val="tx1">
+                    <a:lumMod val="75000"/>
+                    <a:lumOff val="25000"/>
+                  </a:schemeClr>
+                </a:solidFill>
+              </a:rPr>
+              <a:t>Func</a:t>
+            </a:r>
+            <a:r>
+              <a:rPr lang="en-US" sz="1000" dirty="0">
+                <a:solidFill>
+                  <a:schemeClr val="tx1">
+                    <a:lumMod val="75000"/>
+                    <a:lumOff val="25000"/>
+                  </a:schemeClr>
+                </a:solidFill>
+              </a:rPr>
+              <a:t>: Power Grid RTU</a:t>
+            </a:r>
+          </a:p>
+        </p:txBody>
+      </p:sp>
+      <p:pic>
+        <p:nvPicPr>
+          <p:cNvPr id="81" name="Picture 80">
+            <a:extLst>
+              <a:ext uri="{FF2B5EF4-FFF2-40B4-BE49-F238E27FC236}">
+                <a16:creationId xmlns:a16="http://schemas.microsoft.com/office/drawing/2014/main" id="{6B0C7977-2097-5740-43F8-33048043D540}"/>
+              </a:ext>
+            </a:extLst>
+          </p:cNvPr>
+          <p:cNvPicPr>
+            <a:picLocks noChangeAspect="1"/>
+          </p:cNvPicPr>
+          <p:nvPr/>
+        </p:nvPicPr>
+        <p:blipFill>
+          <a:blip r:embed="rId8"/>
+          <a:stretch>
+            <a:fillRect/>
+          </a:stretch>
+        </p:blipFill>
+        <p:spPr>
+          <a:xfrm>
+            <a:off x="9295874" y="3886807"/>
+            <a:ext cx="340735" cy="141069"/>
+          </a:xfrm>
+          <a:prstGeom prst="rect">
+            <a:avLst/>
+          </a:prstGeom>
+          <a:ln w="12700">
+            <a:solidFill>
+              <a:schemeClr val="tx1"/>
+            </a:solidFill>
+          </a:ln>
+        </p:spPr>
+      </p:pic>
+      <p:cxnSp>
+        <p:nvCxnSpPr>
+          <p:cNvPr id="87" name="Straight Connector 86">
+            <a:extLst>
+              <a:ext uri="{FF2B5EF4-FFF2-40B4-BE49-F238E27FC236}">
+                <a16:creationId xmlns:a16="http://schemas.microsoft.com/office/drawing/2014/main" id="{311F76E6-8532-1CB4-2E32-C39BDE4A7872}"/>
+              </a:ext>
+            </a:extLst>
+          </p:cNvPr>
+          <p:cNvCxnSpPr>
+            <a:cxnSpLocks/>
+          </p:cNvCxnSpPr>
+          <p:nvPr/>
+        </p:nvCxnSpPr>
+        <p:spPr>
+          <a:xfrm>
+            <a:off x="6514291" y="3773271"/>
+            <a:ext cx="765138" cy="0"/>
+          </a:xfrm>
+          <a:prstGeom prst="line">
+            <a:avLst/>
+          </a:prstGeom>
+        </p:spPr>
+        <p:style>
+          <a:lnRef idx="2">
+            <a:schemeClr val="dk1"/>
+          </a:lnRef>
+          <a:fillRef idx="0">
+            <a:schemeClr val="dk1"/>
+          </a:fillRef>
+          <a:effectRef idx="1">
+            <a:schemeClr val="dk1"/>
+          </a:effectRef>
+          <a:fontRef idx="minor">
+            <a:schemeClr val="tx1"/>
+          </a:fontRef>
+        </p:style>
+      </p:cxnSp>
+      <p:cxnSp>
+        <p:nvCxnSpPr>
+          <p:cNvPr id="89" name="Straight Connector 88">
+            <a:extLst>
+              <a:ext uri="{FF2B5EF4-FFF2-40B4-BE49-F238E27FC236}">
+                <a16:creationId xmlns:a16="http://schemas.microsoft.com/office/drawing/2014/main" id="{96E36DB1-033E-A01C-5014-AC967BDCB896}"/>
+              </a:ext>
+            </a:extLst>
+          </p:cNvPr>
+          <p:cNvCxnSpPr>
+            <a:cxnSpLocks/>
+          </p:cNvCxnSpPr>
+          <p:nvPr/>
+        </p:nvCxnSpPr>
+        <p:spPr>
+          <a:xfrm>
+            <a:off x="7279429" y="3773204"/>
+            <a:ext cx="0" cy="276632"/>
+          </a:xfrm>
+          <a:prstGeom prst="line">
+            <a:avLst/>
+          </a:prstGeom>
+        </p:spPr>
+        <p:style>
+          <a:lnRef idx="2">
+            <a:schemeClr val="dk1"/>
+          </a:lnRef>
+          <a:fillRef idx="0">
+            <a:schemeClr val="dk1"/>
+          </a:fillRef>
+          <a:effectRef idx="1">
+            <a:schemeClr val="dk1"/>
+          </a:effectRef>
+          <a:fontRef idx="minor">
+            <a:schemeClr val="tx1"/>
+          </a:fontRef>
+        </p:style>
+      </p:cxnSp>
+      <p:cxnSp>
+        <p:nvCxnSpPr>
+          <p:cNvPr id="93" name="Straight Connector 92">
+            <a:extLst>
+              <a:ext uri="{FF2B5EF4-FFF2-40B4-BE49-F238E27FC236}">
+                <a16:creationId xmlns:a16="http://schemas.microsoft.com/office/drawing/2014/main" id="{202F7BB7-673B-EE09-748F-D77F13C6CCC5}"/>
+              </a:ext>
+            </a:extLst>
+          </p:cNvPr>
+          <p:cNvCxnSpPr>
+            <a:cxnSpLocks/>
+            <a:endCxn id="78" idx="1"/>
+          </p:cNvCxnSpPr>
+          <p:nvPr/>
+        </p:nvCxnSpPr>
+        <p:spPr>
+          <a:xfrm>
+            <a:off x="7297488" y="4049836"/>
+            <a:ext cx="1708966" cy="1"/>
+          </a:xfrm>
+          <a:prstGeom prst="line">
+            <a:avLst/>
+          </a:prstGeom>
+        </p:spPr>
+        <p:style>
+          <a:lnRef idx="2">
+            <a:schemeClr val="dk1"/>
+          </a:lnRef>
+          <a:fillRef idx="0">
+            <a:schemeClr val="dk1"/>
+          </a:fillRef>
+          <a:effectRef idx="1">
+            <a:schemeClr val="dk1"/>
+          </a:effectRef>
+          <a:fontRef idx="minor">
+            <a:schemeClr val="tx1"/>
+          </a:fontRef>
+        </p:style>
+      </p:cxnSp>
+      <p:pic>
+        <p:nvPicPr>
+          <p:cNvPr id="99" name="Picture 98">
+            <a:extLst>
+              <a:ext uri="{FF2B5EF4-FFF2-40B4-BE49-F238E27FC236}">
+                <a16:creationId xmlns:a16="http://schemas.microsoft.com/office/drawing/2014/main" id="{CFF67D33-1414-9B5E-24B2-37BF8B73DADC}"/>
+              </a:ext>
+            </a:extLst>
+          </p:cNvPr>
+          <p:cNvPicPr>
+            <a:picLocks noChangeAspect="1"/>
+          </p:cNvPicPr>
+          <p:nvPr/>
+        </p:nvPicPr>
+        <p:blipFill>
+          <a:blip r:embed="rId9"/>
+          <a:stretch>
+            <a:fillRect/>
+          </a:stretch>
+        </p:blipFill>
+        <p:spPr>
+          <a:xfrm>
+            <a:off x="7749356" y="929258"/>
+            <a:ext cx="2502417" cy="1432633"/>
+          </a:xfrm>
+          <a:prstGeom prst="rect">
+            <a:avLst/>
+          </a:prstGeom>
+          <a:ln w="6350">
+            <a:solidFill>
+              <a:schemeClr val="tx1"/>
+            </a:solidFill>
+          </a:ln>
+        </p:spPr>
+      </p:pic>
+      <p:sp>
+        <p:nvSpPr>
+          <p:cNvPr id="100" name="TextBox 99">
+            <a:extLst>
+              <a:ext uri="{FF2B5EF4-FFF2-40B4-BE49-F238E27FC236}">
+                <a16:creationId xmlns:a16="http://schemas.microsoft.com/office/drawing/2014/main" id="{4EEA5A7D-1277-0035-ECEE-67E94ABE569E}"/>
+              </a:ext>
+            </a:extLst>
+          </p:cNvPr>
+          <p:cNvSpPr txBox="1"/>
+          <p:nvPr/>
+        </p:nvSpPr>
+        <p:spPr>
+          <a:xfrm>
+            <a:off x="9409260" y="2366427"/>
+            <a:ext cx="1505193" cy="553998"/>
+          </a:xfrm>
+          <a:prstGeom prst="rect">
+            <a:avLst/>
+          </a:prstGeom>
+          <a:noFill/>
+        </p:spPr>
+        <p:txBody>
+          <a:bodyPr wrap="square">
+            <a:spAutoFit/>
+          </a:bodyPr>
+          <a:lstStyle/>
+          <a:p>
+            <a:r>
+              <a:rPr lang="en-US" sz="1000" b="1" dirty="0">
+                <a:solidFill>
+                  <a:schemeClr val="tx1">
+                    <a:lumMod val="75000"/>
+                    <a:lumOff val="25000"/>
+                  </a:schemeClr>
+                </a:solidFill>
+              </a:rPr>
+              <a:t>VM_ID</a:t>
+            </a:r>
+            <a:r>
+              <a:rPr lang="en-US" sz="1000" dirty="0">
+                <a:solidFill>
+                  <a:schemeClr val="tx1">
+                    <a:lumMod val="75000"/>
+                    <a:lumOff val="25000"/>
+                  </a:schemeClr>
+                </a:solidFill>
+              </a:rPr>
+              <a:t>: SCADA-HMI</a:t>
+            </a:r>
+          </a:p>
+          <a:p>
+            <a:r>
+              <a:rPr lang="en-US" sz="1000" b="1" dirty="0" err="1">
+                <a:solidFill>
+                  <a:schemeClr val="tx1">
+                    <a:lumMod val="75000"/>
+                    <a:lumOff val="25000"/>
+                  </a:schemeClr>
+                </a:solidFill>
+              </a:rPr>
+              <a:t>Func</a:t>
+            </a:r>
+            <a:r>
+              <a:rPr lang="en-US" sz="1000" dirty="0">
+                <a:solidFill>
+                  <a:schemeClr val="tx1">
+                    <a:lumMod val="75000"/>
+                    <a:lumOff val="25000"/>
+                  </a:schemeClr>
+                </a:solidFill>
+              </a:rPr>
+              <a:t>: Power Grid HMI</a:t>
+            </a:r>
+          </a:p>
+          <a:p>
+            <a:r>
+              <a:rPr lang="en-US" sz="1000" b="1" dirty="0">
+                <a:solidFill>
+                  <a:schemeClr val="tx1">
+                    <a:lumMod val="75000"/>
+                    <a:lumOff val="25000"/>
+                  </a:schemeClr>
+                </a:solidFill>
+              </a:rPr>
+              <a:t>IP</a:t>
+            </a:r>
+            <a:r>
+              <a:rPr lang="en-US" sz="1000" dirty="0">
+                <a:solidFill>
+                  <a:schemeClr val="tx1">
+                    <a:lumMod val="75000"/>
+                    <a:lumOff val="25000"/>
+                  </a:schemeClr>
+                </a:solidFill>
+              </a:rPr>
+              <a:t>: </a:t>
+            </a:r>
+            <a:r>
+              <a:rPr lang="en-SG" sz="1000" b="0" i="0" dirty="0">
+                <a:solidFill>
+                  <a:srgbClr val="4B5563"/>
+                </a:solidFill>
+                <a:effectLst/>
+              </a:rPr>
+              <a:t>10.107.108.5</a:t>
+            </a:r>
+            <a:endParaRPr lang="en-US" sz="1000" dirty="0">
+              <a:solidFill>
+                <a:schemeClr val="tx1">
+                  <a:lumMod val="75000"/>
+                  <a:lumOff val="25000"/>
+                </a:schemeClr>
+              </a:solidFill>
+            </a:endParaRPr>
+          </a:p>
+        </p:txBody>
+      </p:sp>
+      <p:sp>
+        <p:nvSpPr>
+          <p:cNvPr id="101" name="TextBox 100">
+            <a:extLst>
+              <a:ext uri="{FF2B5EF4-FFF2-40B4-BE49-F238E27FC236}">
+                <a16:creationId xmlns:a16="http://schemas.microsoft.com/office/drawing/2014/main" id="{63E9A48F-D463-2DCE-23DB-3EAF6FEB6DAB}"/>
+              </a:ext>
+            </a:extLst>
+          </p:cNvPr>
+          <p:cNvSpPr txBox="1"/>
+          <p:nvPr/>
+        </p:nvSpPr>
+        <p:spPr>
+          <a:xfrm>
+            <a:off x="8093517" y="4070642"/>
+            <a:ext cx="1049670" cy="246221"/>
+          </a:xfrm>
+          <a:prstGeom prst="rect">
+            <a:avLst/>
+          </a:prstGeom>
+          <a:noFill/>
+        </p:spPr>
+        <p:txBody>
+          <a:bodyPr wrap="square" rtlCol="0">
+            <a:spAutoFit/>
+          </a:bodyPr>
+          <a:lstStyle/>
+          <a:p>
+            <a:r>
+              <a:rPr lang="en-US" sz="1000" dirty="0"/>
+              <a:t>10.107.109.10</a:t>
+            </a:r>
+          </a:p>
+        </p:txBody>
+      </p:sp>
+      <p:cxnSp>
+        <p:nvCxnSpPr>
+          <p:cNvPr id="102" name="Straight Connector 101">
+            <a:extLst>
+              <a:ext uri="{FF2B5EF4-FFF2-40B4-BE49-F238E27FC236}">
+                <a16:creationId xmlns:a16="http://schemas.microsoft.com/office/drawing/2014/main" id="{E25D8531-F5CE-5500-2DC7-39A9E97ABB78}"/>
+              </a:ext>
+            </a:extLst>
+          </p:cNvPr>
+          <p:cNvCxnSpPr>
+            <a:cxnSpLocks/>
+            <a:endCxn id="63" idx="0"/>
+          </p:cNvCxnSpPr>
+          <p:nvPr/>
+        </p:nvCxnSpPr>
+        <p:spPr>
+          <a:xfrm>
+            <a:off x="8385932" y="2361891"/>
+            <a:ext cx="0" cy="382755"/>
+          </a:xfrm>
+          <a:prstGeom prst="line">
+            <a:avLst/>
+          </a:prstGeom>
+        </p:spPr>
+        <p:style>
+          <a:lnRef idx="2">
+            <a:schemeClr val="dk1"/>
+          </a:lnRef>
+          <a:fillRef idx="0">
+            <a:schemeClr val="dk1"/>
+          </a:fillRef>
+          <a:effectRef idx="1">
+            <a:schemeClr val="dk1"/>
+          </a:effectRef>
+          <a:fontRef idx="minor">
+            <a:schemeClr val="tx1"/>
+          </a:fontRef>
+        </p:style>
+      </p:cxnSp>
+      <p:cxnSp>
+        <p:nvCxnSpPr>
+          <p:cNvPr id="105" name="Straight Connector 104">
+            <a:extLst>
+              <a:ext uri="{FF2B5EF4-FFF2-40B4-BE49-F238E27FC236}">
+                <a16:creationId xmlns:a16="http://schemas.microsoft.com/office/drawing/2014/main" id="{4ED829C5-E36C-B995-EEC6-7ECA9F58B708}"/>
+              </a:ext>
+            </a:extLst>
+          </p:cNvPr>
+          <p:cNvCxnSpPr>
+            <a:cxnSpLocks/>
+          </p:cNvCxnSpPr>
+          <p:nvPr/>
+        </p:nvCxnSpPr>
+        <p:spPr>
+          <a:xfrm>
+            <a:off x="9346986" y="2361891"/>
+            <a:ext cx="0" cy="1142602"/>
+          </a:xfrm>
+          <a:prstGeom prst="line">
+            <a:avLst/>
+          </a:prstGeom>
+        </p:spPr>
+        <p:style>
+          <a:lnRef idx="2">
+            <a:schemeClr val="dk1"/>
+          </a:lnRef>
+          <a:fillRef idx="0">
+            <a:schemeClr val="dk1"/>
+          </a:fillRef>
+          <a:effectRef idx="1">
+            <a:schemeClr val="dk1"/>
+          </a:effectRef>
+          <a:fontRef idx="minor">
+            <a:schemeClr val="tx1"/>
+          </a:fontRef>
+        </p:style>
+      </p:cxnSp>
+      <p:sp>
+        <p:nvSpPr>
+          <p:cNvPr id="108" name="TextBox 107">
+            <a:extLst>
+              <a:ext uri="{FF2B5EF4-FFF2-40B4-BE49-F238E27FC236}">
+                <a16:creationId xmlns:a16="http://schemas.microsoft.com/office/drawing/2014/main" id="{76638ADE-39E8-41EE-A643-7A309238EEE8}"/>
+              </a:ext>
+            </a:extLst>
+          </p:cNvPr>
+          <p:cNvSpPr txBox="1"/>
+          <p:nvPr/>
+        </p:nvSpPr>
+        <p:spPr>
+          <a:xfrm>
+            <a:off x="7539065" y="2531139"/>
+            <a:ext cx="939854" cy="246221"/>
+          </a:xfrm>
+          <a:prstGeom prst="rect">
+            <a:avLst/>
+          </a:prstGeom>
+          <a:noFill/>
+        </p:spPr>
+        <p:txBody>
+          <a:bodyPr wrap="square" rtlCol="0">
+            <a:spAutoFit/>
+          </a:bodyPr>
+          <a:lstStyle/>
+          <a:p>
+            <a:r>
+              <a:rPr lang="en-US" sz="1000" dirty="0"/>
+              <a:t>10.107.108.3</a:t>
+            </a:r>
+          </a:p>
+        </p:txBody>
+      </p:sp>
+      <p:sp>
+        <p:nvSpPr>
+          <p:cNvPr id="109" name="TextBox 108">
+            <a:extLst>
+              <a:ext uri="{FF2B5EF4-FFF2-40B4-BE49-F238E27FC236}">
+                <a16:creationId xmlns:a16="http://schemas.microsoft.com/office/drawing/2014/main" id="{26ED16A9-955D-642E-EA2B-4BB417914FA7}"/>
+              </a:ext>
+            </a:extLst>
+          </p:cNvPr>
+          <p:cNvSpPr txBox="1"/>
+          <p:nvPr/>
+        </p:nvSpPr>
+        <p:spPr>
+          <a:xfrm>
+            <a:off x="9317634" y="3281470"/>
+            <a:ext cx="939854" cy="246221"/>
+          </a:xfrm>
+          <a:prstGeom prst="rect">
+            <a:avLst/>
+          </a:prstGeom>
+          <a:noFill/>
+        </p:spPr>
+        <p:txBody>
+          <a:bodyPr wrap="square" rtlCol="0">
+            <a:spAutoFit/>
+          </a:bodyPr>
+          <a:lstStyle/>
+          <a:p>
+            <a:r>
+              <a:rPr lang="en-US" sz="1000" dirty="0"/>
+              <a:t>10.107.108.4</a:t>
+            </a:r>
+          </a:p>
+        </p:txBody>
+      </p:sp>
+      <p:sp>
+        <p:nvSpPr>
+          <p:cNvPr id="111" name="TextBox 110">
+            <a:extLst>
+              <a:ext uri="{FF2B5EF4-FFF2-40B4-BE49-F238E27FC236}">
+                <a16:creationId xmlns:a16="http://schemas.microsoft.com/office/drawing/2014/main" id="{D4040C53-E027-00EB-1206-83F8B00EF1FE}"/>
+              </a:ext>
+            </a:extLst>
+          </p:cNvPr>
+          <p:cNvSpPr txBox="1"/>
+          <p:nvPr/>
+        </p:nvSpPr>
+        <p:spPr>
+          <a:xfrm>
+            <a:off x="7539065" y="612231"/>
+            <a:ext cx="3166106" cy="307777"/>
+          </a:xfrm>
+          <a:prstGeom prst="rect">
+            <a:avLst/>
+          </a:prstGeom>
+          <a:noFill/>
+        </p:spPr>
+        <p:txBody>
+          <a:bodyPr wrap="square">
+            <a:spAutoFit/>
+          </a:bodyPr>
+          <a:lstStyle/>
+          <a:p>
+            <a:r>
+              <a:rPr lang="en-US" sz="1400" b="1" dirty="0" err="1">
+                <a:solidFill>
+                  <a:schemeClr val="accent1"/>
+                </a:solidFill>
+              </a:rPr>
+              <a:t>Power_Grid_System</a:t>
+            </a:r>
+            <a:r>
+              <a:rPr lang="en-US" sz="1400" b="1" dirty="0">
+                <a:solidFill>
+                  <a:schemeClr val="accent1"/>
+                </a:solidFill>
+              </a:rPr>
+              <a:t> SCADA Network </a:t>
+            </a:r>
+            <a:endParaRPr lang="en-SG" sz="1400" b="1" dirty="0">
+              <a:solidFill>
+                <a:schemeClr val="accent1"/>
+              </a:solidFill>
+            </a:endParaRPr>
+          </a:p>
+        </p:txBody>
+      </p:sp>
+      <p:sp>
+        <p:nvSpPr>
+          <p:cNvPr id="112" name="TextBox 111">
+            <a:extLst>
+              <a:ext uri="{FF2B5EF4-FFF2-40B4-BE49-F238E27FC236}">
+                <a16:creationId xmlns:a16="http://schemas.microsoft.com/office/drawing/2014/main" id="{CFA7213A-3026-218F-35C5-8E09EE84DDDC}"/>
+              </a:ext>
+            </a:extLst>
+          </p:cNvPr>
+          <p:cNvSpPr txBox="1"/>
+          <p:nvPr/>
+        </p:nvSpPr>
+        <p:spPr>
+          <a:xfrm>
+            <a:off x="8332955" y="2443618"/>
+            <a:ext cx="807198" cy="276999"/>
+          </a:xfrm>
+          <a:prstGeom prst="rect">
+            <a:avLst/>
+          </a:prstGeom>
+          <a:noFill/>
+        </p:spPr>
+        <p:txBody>
+          <a:bodyPr wrap="square">
+            <a:spAutoFit/>
+          </a:bodyPr>
+          <a:lstStyle/>
+          <a:p>
+            <a:r>
+              <a:rPr lang="en-US" sz="1200" b="1" dirty="0">
+                <a:solidFill>
+                  <a:schemeClr val="accent6">
+                    <a:lumMod val="50000"/>
+                  </a:schemeClr>
+                </a:solidFill>
+              </a:rPr>
+              <a:t>Modbus</a:t>
+            </a:r>
+            <a:endParaRPr lang="en-SG" sz="1200" b="1" dirty="0">
+              <a:solidFill>
+                <a:schemeClr val="accent6">
+                  <a:lumMod val="50000"/>
+                </a:schemeClr>
+              </a:solidFill>
+            </a:endParaRPr>
+          </a:p>
+        </p:txBody>
+      </p:sp>
+      <p:sp>
+        <p:nvSpPr>
+          <p:cNvPr id="113" name="TextBox 112">
+            <a:extLst>
+              <a:ext uri="{FF2B5EF4-FFF2-40B4-BE49-F238E27FC236}">
+                <a16:creationId xmlns:a16="http://schemas.microsoft.com/office/drawing/2014/main" id="{0F722B3C-5A53-AFE6-50A3-9F19D36905CE}"/>
+              </a:ext>
+            </a:extLst>
+          </p:cNvPr>
+          <p:cNvSpPr txBox="1"/>
+          <p:nvPr/>
+        </p:nvSpPr>
+        <p:spPr>
+          <a:xfrm>
+            <a:off x="9314103" y="2936227"/>
+            <a:ext cx="901141" cy="276999"/>
+          </a:xfrm>
+          <a:prstGeom prst="rect">
+            <a:avLst/>
+          </a:prstGeom>
+          <a:noFill/>
+        </p:spPr>
+        <p:txBody>
+          <a:bodyPr wrap="square">
+            <a:spAutoFit/>
+          </a:bodyPr>
+          <a:lstStyle/>
+          <a:p>
+            <a:r>
+              <a:rPr lang="en-US" sz="1200" b="1" dirty="0">
+                <a:solidFill>
+                  <a:schemeClr val="accent1"/>
+                </a:solidFill>
+              </a:rPr>
+              <a:t>S7Comm</a:t>
+            </a:r>
+            <a:endParaRPr lang="en-SG" sz="1200" b="1" dirty="0">
+              <a:solidFill>
+                <a:schemeClr val="accent1"/>
+              </a:solidFill>
+            </a:endParaRPr>
+          </a:p>
+        </p:txBody>
+      </p:sp>
+      <p:sp>
+        <p:nvSpPr>
+          <p:cNvPr id="114" name="TextBox 113">
+            <a:extLst>
+              <a:ext uri="{FF2B5EF4-FFF2-40B4-BE49-F238E27FC236}">
+                <a16:creationId xmlns:a16="http://schemas.microsoft.com/office/drawing/2014/main" id="{3BD7553C-A167-AFB8-7429-FB622BAC593D}"/>
+              </a:ext>
+            </a:extLst>
+          </p:cNvPr>
+          <p:cNvSpPr txBox="1"/>
+          <p:nvPr/>
+        </p:nvSpPr>
+        <p:spPr>
+          <a:xfrm>
+            <a:off x="873188" y="554533"/>
+            <a:ext cx="5197290" cy="646331"/>
+          </a:xfrm>
+          <a:prstGeom prst="rect">
+            <a:avLst/>
+          </a:prstGeom>
+          <a:noFill/>
+        </p:spPr>
+        <p:txBody>
+          <a:bodyPr wrap="square">
+            <a:spAutoFit/>
+          </a:bodyPr>
+          <a:lstStyle/>
+          <a:p>
+            <a:r>
+              <a:rPr lang="en-US" b="1" dirty="0"/>
+              <a:t>S7Comm FDI Power Outage Attack Case Study on Power Grid Simulation System </a:t>
+            </a:r>
+            <a:endParaRPr lang="en-SG" b="1" dirty="0"/>
+          </a:p>
+        </p:txBody>
+      </p:sp>
+      <p:pic>
+        <p:nvPicPr>
+          <p:cNvPr id="2" name="Picture 1" descr="A graphic of a power grid&#10;&#10;Description automatically generated">
+            <a:extLst>
+              <a:ext uri="{FF2B5EF4-FFF2-40B4-BE49-F238E27FC236}">
+                <a16:creationId xmlns:a16="http://schemas.microsoft.com/office/drawing/2014/main" id="{C225606B-C7C7-80B8-B683-48C0D78DEA69}"/>
+              </a:ext>
+            </a:extLst>
+          </p:cNvPr>
+          <p:cNvPicPr>
+            <a:picLocks noChangeAspect="1"/>
+          </p:cNvPicPr>
+          <p:nvPr/>
+        </p:nvPicPr>
+        <p:blipFill>
+          <a:blip r:embed="rId10">
+            <a:extLst>
+              <a:ext uri="{28A0092B-C50C-407E-A947-70E740481C1C}">
+                <a14:useLocalDpi xmlns:a14="http://schemas.microsoft.com/office/drawing/2010/main" val="0"/>
+              </a:ext>
+            </a:extLst>
+          </a:blip>
+          <a:stretch>
+            <a:fillRect/>
+          </a:stretch>
+        </p:blipFill>
+        <p:spPr>
+          <a:xfrm>
+            <a:off x="6206563" y="583519"/>
+            <a:ext cx="1006274" cy="1153861"/>
+          </a:xfrm>
+          <a:prstGeom prst="rect">
+            <a:avLst/>
+          </a:prstGeom>
+          <a:ln w="12700">
+            <a:solidFill>
+              <a:schemeClr val="tx1"/>
+            </a:solidFill>
+          </a:ln>
+          <a:effectLst>
+            <a:outerShdw blurRad="63500" sx="102000" sy="102000" algn="ctr" rotWithShape="0">
+              <a:prstClr val="black">
+                <a:alpha val="40000"/>
+              </a:prstClr>
+            </a:outerShdw>
+          </a:effectLst>
+          <a:scene3d>
+            <a:camera prst="orthographicFront"/>
+            <a:lightRig rig="threePt" dir="t"/>
+          </a:scene3d>
+          <a:sp3d>
+            <a:bevelT w="165100" prst="coolSlant"/>
+          </a:sp3d>
+        </p:spPr>
+      </p:pic>
+      <p:pic>
+        <p:nvPicPr>
+          <p:cNvPr id="3" name="Picture 2">
+            <a:extLst>
+              <a:ext uri="{FF2B5EF4-FFF2-40B4-BE49-F238E27FC236}">
+                <a16:creationId xmlns:a16="http://schemas.microsoft.com/office/drawing/2014/main" id="{D01E7B04-6C0C-A321-0551-CD9C39E0565F}"/>
+              </a:ext>
+            </a:extLst>
+          </p:cNvPr>
+          <p:cNvPicPr>
+            <a:picLocks noChangeAspect="1"/>
+          </p:cNvPicPr>
+          <p:nvPr/>
+        </p:nvPicPr>
+        <p:blipFill>
+          <a:blip r:embed="rId11"/>
+          <a:stretch>
+            <a:fillRect/>
+          </a:stretch>
+        </p:blipFill>
+        <p:spPr>
+          <a:xfrm>
+            <a:off x="1061928" y="5533170"/>
+            <a:ext cx="491801" cy="545259"/>
+          </a:xfrm>
+          <a:prstGeom prst="rect">
+            <a:avLst/>
+          </a:prstGeom>
+          <a:ln w="9525">
+            <a:solidFill>
+              <a:schemeClr val="tx1"/>
+            </a:solidFill>
+          </a:ln>
+        </p:spPr>
+      </p:pic>
+      <p:pic>
+        <p:nvPicPr>
+          <p:cNvPr id="8" name="Picture 7">
+            <a:extLst>
+              <a:ext uri="{FF2B5EF4-FFF2-40B4-BE49-F238E27FC236}">
+                <a16:creationId xmlns:a16="http://schemas.microsoft.com/office/drawing/2014/main" id="{A8624C8E-79FB-E164-A8B4-DE9A747016F0}"/>
+              </a:ext>
+            </a:extLst>
+          </p:cNvPr>
+          <p:cNvPicPr>
+            <a:picLocks noChangeAspect="1"/>
+          </p:cNvPicPr>
+          <p:nvPr/>
+        </p:nvPicPr>
+        <p:blipFill>
+          <a:blip r:embed="rId12"/>
+          <a:stretch>
+            <a:fillRect/>
+          </a:stretch>
+        </p:blipFill>
+        <p:spPr>
+          <a:xfrm>
+            <a:off x="4133630" y="5426664"/>
+            <a:ext cx="1607894" cy="739864"/>
+          </a:xfrm>
+          <a:prstGeom prst="rect">
+            <a:avLst/>
+          </a:prstGeom>
+          <a:ln w="19050">
+            <a:solidFill>
+              <a:srgbClr val="FF0000"/>
+            </a:solidFill>
+            <a:prstDash val="sysDash"/>
+          </a:ln>
+        </p:spPr>
+      </p:pic>
+      <p:sp>
+        <p:nvSpPr>
+          <p:cNvPr id="9" name="Rectangle 8">
+            <a:extLst>
+              <a:ext uri="{FF2B5EF4-FFF2-40B4-BE49-F238E27FC236}">
+                <a16:creationId xmlns:a16="http://schemas.microsoft.com/office/drawing/2014/main" id="{D54ACF3E-AD74-8818-A730-DEC19BF5E4D4}"/>
+              </a:ext>
+            </a:extLst>
+          </p:cNvPr>
+          <p:cNvSpPr/>
+          <p:nvPr/>
+        </p:nvSpPr>
+        <p:spPr>
+          <a:xfrm>
+            <a:off x="6701880" y="5148754"/>
+            <a:ext cx="4131725" cy="929675"/>
+          </a:xfrm>
+          <a:prstGeom prst="rect">
+            <a:avLst/>
+          </a:prstGeom>
+          <a:solidFill>
+            <a:schemeClr val="accent2">
+              <a:lumMod val="20000"/>
+              <a:lumOff val="80000"/>
+            </a:schemeClr>
+          </a:solidFill>
+          <a:ln>
+            <a:solidFill>
+              <a:schemeClr val="accent2">
+                <a:lumMod val="75000"/>
+              </a:schemeClr>
+            </a:solidFill>
+            <a:prstDash val="sysDash"/>
+          </a:ln>
+        </p:spPr>
+        <p:style>
+          <a:lnRef idx="2">
+            <a:schemeClr val="accent6"/>
+          </a:lnRef>
+          <a:fillRef idx="1">
+            <a:schemeClr val="lt1"/>
+          </a:fillRef>
+          <a:effectRef idx="0">
+            <a:schemeClr val="accent6"/>
+          </a:effectRef>
+          <a:fontRef idx="minor">
+            <a:schemeClr val="dk1"/>
+          </a:fontRef>
+        </p:style>
+        <p:txBody>
+          <a:bodyPr rtlCol="0" anchor="ctr"/>
+          <a:lstStyle/>
+          <a:p>
+            <a:pPr algn="ctr"/>
+            <a:endParaRPr lang="en-SG" dirty="0"/>
+          </a:p>
+        </p:txBody>
+      </p:sp>
+      <p:sp>
+        <p:nvSpPr>
+          <p:cNvPr id="11" name="TextBox 10">
+            <a:extLst>
+              <a:ext uri="{FF2B5EF4-FFF2-40B4-BE49-F238E27FC236}">
+                <a16:creationId xmlns:a16="http://schemas.microsoft.com/office/drawing/2014/main" id="{83B43906-3C71-08B2-4A0B-7677C9DC8F70}"/>
+              </a:ext>
+            </a:extLst>
+          </p:cNvPr>
+          <p:cNvSpPr txBox="1"/>
+          <p:nvPr/>
+        </p:nvSpPr>
+        <p:spPr>
+          <a:xfrm>
+            <a:off x="6498686" y="4841201"/>
+            <a:ext cx="3423307" cy="307777"/>
+          </a:xfrm>
+          <a:prstGeom prst="rect">
+            <a:avLst/>
+          </a:prstGeom>
+          <a:noFill/>
+        </p:spPr>
+        <p:txBody>
+          <a:bodyPr wrap="square">
+            <a:spAutoFit/>
+          </a:bodyPr>
+          <a:lstStyle/>
+          <a:p>
+            <a:r>
+              <a:rPr lang="en-US" sz="1400" b="1" dirty="0" err="1">
+                <a:solidFill>
+                  <a:schemeClr val="accent2">
+                    <a:lumMod val="75000"/>
+                  </a:schemeClr>
+                </a:solidFill>
+              </a:rPr>
+              <a:t>Power_Grid_System</a:t>
+            </a:r>
+            <a:r>
+              <a:rPr lang="en-US" sz="1400" b="1" dirty="0">
+                <a:solidFill>
+                  <a:schemeClr val="accent2">
+                    <a:lumMod val="75000"/>
+                  </a:schemeClr>
+                </a:solidFill>
+              </a:rPr>
+              <a:t> Corporate Network </a:t>
+            </a:r>
+            <a:endParaRPr lang="en-SG" sz="1400" b="1" dirty="0">
+              <a:solidFill>
+                <a:schemeClr val="accent2">
+                  <a:lumMod val="75000"/>
+                </a:schemeClr>
+              </a:solidFill>
+            </a:endParaRPr>
+          </a:p>
+        </p:txBody>
+      </p:sp>
+      <p:sp>
+        <p:nvSpPr>
+          <p:cNvPr id="14" name="Rectangle 13">
+            <a:extLst>
+              <a:ext uri="{FF2B5EF4-FFF2-40B4-BE49-F238E27FC236}">
+                <a16:creationId xmlns:a16="http://schemas.microsoft.com/office/drawing/2014/main" id="{794B3644-7EC6-5D32-9574-07C4020B8457}"/>
+              </a:ext>
+            </a:extLst>
+          </p:cNvPr>
+          <p:cNvSpPr/>
+          <p:nvPr/>
+        </p:nvSpPr>
+        <p:spPr>
+          <a:xfrm>
+            <a:off x="9168706" y="5326233"/>
+            <a:ext cx="1136720" cy="641876"/>
+          </a:xfrm>
+          <a:prstGeom prst="rect">
+            <a:avLst/>
+          </a:prstGeom>
+          <a:solidFill>
+            <a:schemeClr val="bg1"/>
+          </a:solidFill>
+        </p:spPr>
+        <p:style>
+          <a:lnRef idx="2">
+            <a:schemeClr val="accent1">
+              <a:shade val="15000"/>
+            </a:schemeClr>
+          </a:lnRef>
+          <a:fillRef idx="1">
+            <a:schemeClr val="accent1"/>
+          </a:fillRef>
+          <a:effectRef idx="0">
+            <a:schemeClr val="accent1"/>
+          </a:effectRef>
+          <a:fontRef idx="minor">
+            <a:schemeClr val="lt1"/>
+          </a:fontRef>
+        </p:style>
+        <p:txBody>
+          <a:bodyPr rtlCol="0" anchor="ctr"/>
+          <a:lstStyle/>
+          <a:p>
+            <a:pPr algn="ctr"/>
+            <a:endParaRPr lang="en-SG" dirty="0"/>
+          </a:p>
+        </p:txBody>
+      </p:sp>
+      <p:pic>
+        <p:nvPicPr>
+          <p:cNvPr id="16" name="Picture 15">
+            <a:extLst>
+              <a:ext uri="{FF2B5EF4-FFF2-40B4-BE49-F238E27FC236}">
+                <a16:creationId xmlns:a16="http://schemas.microsoft.com/office/drawing/2014/main" id="{87BA1605-01AA-8F8D-97E1-98FA9E55331F}"/>
+              </a:ext>
+            </a:extLst>
+          </p:cNvPr>
+          <p:cNvPicPr>
+            <a:picLocks noChangeAspect="1"/>
+          </p:cNvPicPr>
+          <p:nvPr/>
+        </p:nvPicPr>
+        <p:blipFill>
+          <a:blip r:embed="rId4"/>
+          <a:stretch>
+            <a:fillRect/>
+          </a:stretch>
+        </p:blipFill>
+        <p:spPr>
+          <a:xfrm>
+            <a:off x="9230008" y="5419987"/>
+            <a:ext cx="305794" cy="269390"/>
+          </a:xfrm>
+          <a:prstGeom prst="rect">
+            <a:avLst/>
+          </a:prstGeom>
+        </p:spPr>
+      </p:pic>
+      <p:sp>
+        <p:nvSpPr>
+          <p:cNvPr id="17" name="Rectangle 16">
+            <a:extLst>
+              <a:ext uri="{FF2B5EF4-FFF2-40B4-BE49-F238E27FC236}">
+                <a16:creationId xmlns:a16="http://schemas.microsoft.com/office/drawing/2014/main" id="{BD073905-42A7-3EE0-DCC1-972DAFA59FBD}"/>
+              </a:ext>
+            </a:extLst>
+          </p:cNvPr>
+          <p:cNvSpPr/>
+          <p:nvPr/>
+        </p:nvSpPr>
+        <p:spPr>
+          <a:xfrm>
+            <a:off x="7153560" y="5350387"/>
+            <a:ext cx="1136720" cy="641876"/>
+          </a:xfrm>
+          <a:prstGeom prst="rect">
+            <a:avLst/>
+          </a:prstGeom>
+          <a:solidFill>
+            <a:schemeClr val="bg1"/>
+          </a:solidFill>
+        </p:spPr>
+        <p:style>
+          <a:lnRef idx="2">
+            <a:schemeClr val="accent1">
+              <a:shade val="15000"/>
+            </a:schemeClr>
+          </a:lnRef>
+          <a:fillRef idx="1">
+            <a:schemeClr val="accent1"/>
+          </a:fillRef>
+          <a:effectRef idx="0">
+            <a:schemeClr val="accent1"/>
+          </a:effectRef>
+          <a:fontRef idx="minor">
+            <a:schemeClr val="lt1"/>
+          </a:fontRef>
+        </p:style>
+        <p:txBody>
+          <a:bodyPr rtlCol="0" anchor="ctr"/>
+          <a:lstStyle/>
+          <a:p>
+            <a:pPr algn="ctr"/>
+            <a:endParaRPr lang="en-SG" dirty="0"/>
+          </a:p>
+        </p:txBody>
+      </p:sp>
+      <p:pic>
+        <p:nvPicPr>
+          <p:cNvPr id="18" name="Picture 17">
+            <a:extLst>
+              <a:ext uri="{FF2B5EF4-FFF2-40B4-BE49-F238E27FC236}">
+                <a16:creationId xmlns:a16="http://schemas.microsoft.com/office/drawing/2014/main" id="{B2B0EAB3-B3B0-0AA5-336A-171ED26CC731}"/>
+              </a:ext>
+            </a:extLst>
+          </p:cNvPr>
+          <p:cNvPicPr>
+            <a:picLocks noChangeAspect="1"/>
+          </p:cNvPicPr>
+          <p:nvPr/>
+        </p:nvPicPr>
+        <p:blipFill>
+          <a:blip r:embed="rId4"/>
+          <a:stretch>
+            <a:fillRect/>
+          </a:stretch>
+        </p:blipFill>
+        <p:spPr>
+          <a:xfrm>
+            <a:off x="7190744" y="5393256"/>
+            <a:ext cx="366481" cy="322852"/>
+          </a:xfrm>
+          <a:prstGeom prst="rect">
+            <a:avLst/>
+          </a:prstGeom>
+        </p:spPr>
+      </p:pic>
+      <p:pic>
+        <p:nvPicPr>
+          <p:cNvPr id="22" name="Picture 21" descr="A red horse on wheels&#10;&#10;Description automatically generated">
+            <a:extLst>
+              <a:ext uri="{FF2B5EF4-FFF2-40B4-BE49-F238E27FC236}">
+                <a16:creationId xmlns:a16="http://schemas.microsoft.com/office/drawing/2014/main" id="{E16AA369-EE59-68D7-FB98-58E9E554D846}"/>
+              </a:ext>
+            </a:extLst>
+          </p:cNvPr>
+          <p:cNvPicPr>
+            <a:picLocks noChangeAspect="1"/>
+          </p:cNvPicPr>
+          <p:nvPr/>
+        </p:nvPicPr>
+        <p:blipFill>
+          <a:blip r:embed="rId13">
+            <a:extLst>
+              <a:ext uri="{28A0092B-C50C-407E-A947-70E740481C1C}">
+                <a14:useLocalDpi xmlns:a14="http://schemas.microsoft.com/office/drawing/2010/main" val="0"/>
+              </a:ext>
+            </a:extLst>
+          </a:blip>
+          <a:stretch>
+            <a:fillRect/>
+          </a:stretch>
+        </p:blipFill>
+        <p:spPr>
+          <a:xfrm flipH="1">
+            <a:off x="7682230" y="5560080"/>
+            <a:ext cx="448226" cy="354190"/>
+          </a:xfrm>
+          <a:prstGeom prst="rect">
+            <a:avLst/>
+          </a:prstGeom>
+          <a:ln w="19050">
+            <a:solidFill>
+              <a:srgbClr val="FF0000"/>
+            </a:solidFill>
+          </a:ln>
+        </p:spPr>
+      </p:pic>
+      <p:sp>
+        <p:nvSpPr>
+          <p:cNvPr id="23" name="TextBox 22">
+            <a:extLst>
+              <a:ext uri="{FF2B5EF4-FFF2-40B4-BE49-F238E27FC236}">
+                <a16:creationId xmlns:a16="http://schemas.microsoft.com/office/drawing/2014/main" id="{53A58BD8-2146-8119-4E41-237DCE6BAE4E}"/>
+              </a:ext>
+            </a:extLst>
+          </p:cNvPr>
+          <p:cNvSpPr txBox="1"/>
+          <p:nvPr/>
+        </p:nvSpPr>
+        <p:spPr>
+          <a:xfrm>
+            <a:off x="7458222" y="5315263"/>
+            <a:ext cx="1038857" cy="276999"/>
+          </a:xfrm>
+          <a:prstGeom prst="rect">
+            <a:avLst/>
+          </a:prstGeom>
+          <a:noFill/>
+        </p:spPr>
+        <p:txBody>
+          <a:bodyPr wrap="square">
+            <a:spAutoFit/>
+          </a:bodyPr>
+          <a:lstStyle/>
+          <a:p>
+            <a:r>
+              <a:rPr lang="en-SG" sz="1200" b="1" dirty="0">
+                <a:solidFill>
+                  <a:schemeClr val="accent2">
+                    <a:lumMod val="75000"/>
+                  </a:schemeClr>
+                </a:solidFill>
+              </a:rPr>
+              <a:t>Spy Trojan</a:t>
+            </a:r>
+          </a:p>
+        </p:txBody>
+      </p:sp>
+      <p:sp>
+        <p:nvSpPr>
+          <p:cNvPr id="24" name="TextBox 23">
+            <a:extLst>
+              <a:ext uri="{FF2B5EF4-FFF2-40B4-BE49-F238E27FC236}">
+                <a16:creationId xmlns:a16="http://schemas.microsoft.com/office/drawing/2014/main" id="{001BF3DA-1A6C-60CE-884E-2870C077004D}"/>
+              </a:ext>
+            </a:extLst>
+          </p:cNvPr>
+          <p:cNvSpPr txBox="1"/>
+          <p:nvPr/>
+        </p:nvSpPr>
+        <p:spPr>
+          <a:xfrm>
+            <a:off x="7119527" y="5128250"/>
+            <a:ext cx="1248998" cy="246221"/>
+          </a:xfrm>
+          <a:prstGeom prst="rect">
+            <a:avLst/>
+          </a:prstGeom>
+          <a:noFill/>
+        </p:spPr>
+        <p:txBody>
+          <a:bodyPr wrap="square">
+            <a:spAutoFit/>
+          </a:bodyPr>
+          <a:lstStyle/>
+          <a:p>
+            <a:r>
+              <a:rPr lang="en-US" sz="1000" b="1" dirty="0">
+                <a:solidFill>
+                  <a:schemeClr val="tx1">
+                    <a:lumMod val="75000"/>
+                    <a:lumOff val="25000"/>
+                  </a:schemeClr>
+                </a:solidFill>
+              </a:rPr>
+              <a:t>VM_ID</a:t>
+            </a:r>
+            <a:r>
+              <a:rPr lang="en-US" sz="1000" dirty="0">
+                <a:solidFill>
+                  <a:schemeClr val="tx1">
+                    <a:lumMod val="75000"/>
+                    <a:lumOff val="25000"/>
+                  </a:schemeClr>
+                </a:solidFill>
+              </a:rPr>
+              <a:t>: Victim 01</a:t>
+            </a:r>
+          </a:p>
+        </p:txBody>
+      </p:sp>
+      <p:sp>
+        <p:nvSpPr>
+          <p:cNvPr id="25" name="TextBox 24">
+            <a:extLst>
+              <a:ext uri="{FF2B5EF4-FFF2-40B4-BE49-F238E27FC236}">
+                <a16:creationId xmlns:a16="http://schemas.microsoft.com/office/drawing/2014/main" id="{95BD5D23-192D-6A35-4DA6-AD314DE7F396}"/>
+              </a:ext>
+            </a:extLst>
+          </p:cNvPr>
+          <p:cNvSpPr txBox="1"/>
+          <p:nvPr/>
+        </p:nvSpPr>
+        <p:spPr>
+          <a:xfrm>
+            <a:off x="8811783" y="5120199"/>
+            <a:ext cx="1142244" cy="245785"/>
+          </a:xfrm>
+          <a:prstGeom prst="rect">
+            <a:avLst/>
+          </a:prstGeom>
+          <a:noFill/>
+        </p:spPr>
+        <p:txBody>
+          <a:bodyPr wrap="square">
+            <a:spAutoFit/>
+          </a:bodyPr>
+          <a:lstStyle/>
+          <a:p>
+            <a:r>
+              <a:rPr lang="en-US" sz="1000" b="1" dirty="0">
+                <a:solidFill>
+                  <a:schemeClr val="tx1">
+                    <a:lumMod val="75000"/>
+                    <a:lumOff val="25000"/>
+                  </a:schemeClr>
+                </a:solidFill>
+              </a:rPr>
+              <a:t>VM_ID</a:t>
+            </a:r>
+            <a:r>
+              <a:rPr lang="en-US" sz="1000" dirty="0">
+                <a:solidFill>
+                  <a:schemeClr val="tx1">
+                    <a:lumMod val="75000"/>
+                    <a:lumOff val="25000"/>
+                  </a:schemeClr>
+                </a:solidFill>
+              </a:rPr>
+              <a:t>: Victim 02</a:t>
+            </a:r>
+          </a:p>
+        </p:txBody>
+      </p:sp>
+      <p:pic>
+        <p:nvPicPr>
+          <p:cNvPr id="26" name="Picture 25">
+            <a:extLst>
+              <a:ext uri="{FF2B5EF4-FFF2-40B4-BE49-F238E27FC236}">
+                <a16:creationId xmlns:a16="http://schemas.microsoft.com/office/drawing/2014/main" id="{B9FBA90F-0081-D07D-52B4-712BB39C7322}"/>
+              </a:ext>
+            </a:extLst>
+          </p:cNvPr>
+          <p:cNvPicPr>
+            <a:picLocks noChangeAspect="1"/>
+          </p:cNvPicPr>
+          <p:nvPr/>
+        </p:nvPicPr>
+        <p:blipFill>
+          <a:blip r:embed="rId14"/>
+          <a:stretch>
+            <a:fillRect/>
+          </a:stretch>
+        </p:blipFill>
+        <p:spPr>
+          <a:xfrm>
+            <a:off x="2022284" y="5146020"/>
+            <a:ext cx="1564350" cy="1155202"/>
+          </a:xfrm>
+          <a:prstGeom prst="rect">
+            <a:avLst/>
+          </a:prstGeom>
+          <a:ln w="9525">
+            <a:solidFill>
+              <a:schemeClr val="tx1"/>
+            </a:solidFill>
+          </a:ln>
+        </p:spPr>
+      </p:pic>
+      <p:sp>
+        <p:nvSpPr>
+          <p:cNvPr id="27" name="Rectangle 26">
+            <a:extLst>
+              <a:ext uri="{FF2B5EF4-FFF2-40B4-BE49-F238E27FC236}">
+                <a16:creationId xmlns:a16="http://schemas.microsoft.com/office/drawing/2014/main" id="{D1DC4E81-3F82-5164-C897-BFE4D9653295}"/>
+              </a:ext>
+            </a:extLst>
+          </p:cNvPr>
+          <p:cNvSpPr/>
+          <p:nvPr/>
+        </p:nvSpPr>
+        <p:spPr>
+          <a:xfrm>
+            <a:off x="2031706" y="5755013"/>
+            <a:ext cx="1564350" cy="446330"/>
+          </a:xfrm>
+          <a:prstGeom prst="rect">
+            <a:avLst/>
+          </a:prstGeom>
+          <a:noFill/>
+          <a:ln>
+            <a:noFill/>
+            <a:prstDash val="sysDash"/>
+          </a:ln>
+        </p:spPr>
+        <p:style>
+          <a:lnRef idx="2">
+            <a:schemeClr val="accent1">
+              <a:shade val="15000"/>
+            </a:schemeClr>
+          </a:lnRef>
+          <a:fillRef idx="1">
+            <a:schemeClr val="accent1"/>
+          </a:fillRef>
+          <a:effectRef idx="0">
+            <a:schemeClr val="accent1"/>
+          </a:effectRef>
+          <a:fontRef idx="minor">
+            <a:schemeClr val="lt1"/>
+          </a:fontRef>
+        </p:style>
+        <p:txBody>
+          <a:bodyPr rtlCol="0" anchor="ctr"/>
+          <a:lstStyle/>
+          <a:p>
+            <a:r>
+              <a:rPr lang="en-SG" sz="1200" b="1" dirty="0">
+                <a:solidFill>
+                  <a:schemeClr val="bg1"/>
+                </a:solidFill>
+              </a:rPr>
+              <a:t>Attack tasks assign  bulletin board</a:t>
+            </a:r>
+          </a:p>
+        </p:txBody>
+      </p:sp>
+      <p:pic>
+        <p:nvPicPr>
+          <p:cNvPr id="28" name="Picture 27">
+            <a:extLst>
+              <a:ext uri="{FF2B5EF4-FFF2-40B4-BE49-F238E27FC236}">
+                <a16:creationId xmlns:a16="http://schemas.microsoft.com/office/drawing/2014/main" id="{E007387A-F8D3-7E24-95D6-899384ED18B6}"/>
+              </a:ext>
+            </a:extLst>
+          </p:cNvPr>
+          <p:cNvPicPr>
+            <a:picLocks noChangeAspect="1"/>
+          </p:cNvPicPr>
+          <p:nvPr/>
+        </p:nvPicPr>
+        <p:blipFill>
+          <a:blip r:embed="rId15"/>
+          <a:stretch>
+            <a:fillRect/>
+          </a:stretch>
+        </p:blipFill>
+        <p:spPr>
+          <a:xfrm>
+            <a:off x="9654769" y="5428563"/>
+            <a:ext cx="501600" cy="351119"/>
+          </a:xfrm>
+          <a:prstGeom prst="rect">
+            <a:avLst/>
+          </a:prstGeom>
+        </p:spPr>
+      </p:pic>
+      <p:sp>
+        <p:nvSpPr>
+          <p:cNvPr id="29" name="TextBox 28">
+            <a:extLst>
+              <a:ext uri="{FF2B5EF4-FFF2-40B4-BE49-F238E27FC236}">
+                <a16:creationId xmlns:a16="http://schemas.microsoft.com/office/drawing/2014/main" id="{96E2B2DC-21E5-929C-D9C3-94D16D0391F7}"/>
+              </a:ext>
+            </a:extLst>
+          </p:cNvPr>
+          <p:cNvSpPr txBox="1"/>
+          <p:nvPr/>
+        </p:nvSpPr>
+        <p:spPr>
+          <a:xfrm>
+            <a:off x="9374717" y="5729539"/>
+            <a:ext cx="1038857" cy="276999"/>
+          </a:xfrm>
+          <a:prstGeom prst="rect">
+            <a:avLst/>
+          </a:prstGeom>
+          <a:noFill/>
+        </p:spPr>
+        <p:txBody>
+          <a:bodyPr wrap="square">
+            <a:spAutoFit/>
+          </a:bodyPr>
+          <a:lstStyle/>
+          <a:p>
+            <a:r>
+              <a:rPr lang="en-SG" sz="1200" b="1" dirty="0">
+                <a:solidFill>
+                  <a:schemeClr val="accent2">
+                    <a:lumMod val="75000"/>
+                  </a:schemeClr>
+                </a:solidFill>
+              </a:rPr>
+              <a:t>FDI Script</a:t>
+            </a:r>
+          </a:p>
+        </p:txBody>
+      </p:sp>
+      <p:cxnSp>
+        <p:nvCxnSpPr>
+          <p:cNvPr id="30" name="Straight Connector 29">
+            <a:extLst>
+              <a:ext uri="{FF2B5EF4-FFF2-40B4-BE49-F238E27FC236}">
+                <a16:creationId xmlns:a16="http://schemas.microsoft.com/office/drawing/2014/main" id="{897B62DE-12FA-D7E5-A730-93B17466E444}"/>
+              </a:ext>
+            </a:extLst>
+          </p:cNvPr>
+          <p:cNvCxnSpPr>
+            <a:cxnSpLocks/>
+          </p:cNvCxnSpPr>
+          <p:nvPr/>
+        </p:nvCxnSpPr>
+        <p:spPr>
+          <a:xfrm>
+            <a:off x="9875985" y="4769014"/>
+            <a:ext cx="0" cy="414411"/>
+          </a:xfrm>
+          <a:prstGeom prst="line">
+            <a:avLst/>
+          </a:prstGeom>
+        </p:spPr>
+        <p:style>
+          <a:lnRef idx="2">
+            <a:schemeClr val="dk1"/>
+          </a:lnRef>
+          <a:fillRef idx="0">
+            <a:schemeClr val="dk1"/>
+          </a:fillRef>
+          <a:effectRef idx="1">
+            <a:schemeClr val="dk1"/>
+          </a:effectRef>
+          <a:fontRef idx="minor">
+            <a:schemeClr val="tx1"/>
+          </a:fontRef>
+        </p:style>
+      </p:cxnSp>
+      <p:cxnSp>
+        <p:nvCxnSpPr>
+          <p:cNvPr id="33" name="Straight Arrow Connector 32">
+            <a:extLst>
+              <a:ext uri="{FF2B5EF4-FFF2-40B4-BE49-F238E27FC236}">
+                <a16:creationId xmlns:a16="http://schemas.microsoft.com/office/drawing/2014/main" id="{AEB219E7-CB75-0EB9-499A-0EA8B6FC59A8}"/>
+              </a:ext>
+            </a:extLst>
+          </p:cNvPr>
+          <p:cNvCxnSpPr>
+            <a:cxnSpLocks/>
+            <a:stCxn id="3" idx="3"/>
+          </p:cNvCxnSpPr>
+          <p:nvPr/>
+        </p:nvCxnSpPr>
+        <p:spPr>
+          <a:xfrm>
+            <a:off x="1553729" y="5805800"/>
+            <a:ext cx="433520" cy="0"/>
+          </a:xfrm>
+          <a:prstGeom prst="straightConnector1">
+            <a:avLst/>
+          </a:prstGeom>
+          <a:ln w="28575">
+            <a:solidFill>
+              <a:srgbClr val="C00000"/>
+            </a:solidFill>
+            <a:prstDash val="sysDash"/>
+            <a:tailEnd type="triangle"/>
+          </a:ln>
+        </p:spPr>
+        <p:style>
+          <a:lnRef idx="2">
+            <a:schemeClr val="accent1"/>
+          </a:lnRef>
+          <a:fillRef idx="0">
+            <a:schemeClr val="accent1"/>
+          </a:fillRef>
+          <a:effectRef idx="1">
+            <a:schemeClr val="accent1"/>
+          </a:effectRef>
+          <a:fontRef idx="minor">
+            <a:schemeClr val="tx1"/>
+          </a:fontRef>
+        </p:style>
+      </p:cxnSp>
+      <p:cxnSp>
+        <p:nvCxnSpPr>
+          <p:cNvPr id="37" name="Straight Arrow Connector 36">
+            <a:extLst>
+              <a:ext uri="{FF2B5EF4-FFF2-40B4-BE49-F238E27FC236}">
+                <a16:creationId xmlns:a16="http://schemas.microsoft.com/office/drawing/2014/main" id="{0DCA3E30-641D-9D50-3293-4FDB34FD418B}"/>
+              </a:ext>
+            </a:extLst>
+          </p:cNvPr>
+          <p:cNvCxnSpPr>
+            <a:cxnSpLocks/>
+            <a:endCxn id="8" idx="1"/>
+          </p:cNvCxnSpPr>
+          <p:nvPr/>
+        </p:nvCxnSpPr>
+        <p:spPr>
+          <a:xfrm>
+            <a:off x="3605478" y="5790050"/>
+            <a:ext cx="528152" cy="0"/>
+          </a:xfrm>
+          <a:prstGeom prst="straightConnector1">
+            <a:avLst/>
+          </a:prstGeom>
+          <a:ln w="28575">
+            <a:solidFill>
+              <a:srgbClr val="C00000"/>
+            </a:solidFill>
+            <a:prstDash val="sysDash"/>
+            <a:tailEnd type="triangle"/>
+          </a:ln>
+        </p:spPr>
+        <p:style>
+          <a:lnRef idx="2">
+            <a:schemeClr val="accent1"/>
+          </a:lnRef>
+          <a:fillRef idx="0">
+            <a:schemeClr val="accent1"/>
+          </a:fillRef>
+          <a:effectRef idx="1">
+            <a:schemeClr val="accent1"/>
+          </a:effectRef>
+          <a:fontRef idx="minor">
+            <a:schemeClr val="tx1"/>
+          </a:fontRef>
+        </p:style>
+      </p:cxnSp>
+      <p:sp>
+        <p:nvSpPr>
+          <p:cNvPr id="41" name="TextBox 40">
+            <a:extLst>
+              <a:ext uri="{FF2B5EF4-FFF2-40B4-BE49-F238E27FC236}">
+                <a16:creationId xmlns:a16="http://schemas.microsoft.com/office/drawing/2014/main" id="{5D373AB4-A13C-A041-602C-ECD5CE69430A}"/>
+              </a:ext>
+            </a:extLst>
+          </p:cNvPr>
+          <p:cNvSpPr txBox="1"/>
+          <p:nvPr/>
+        </p:nvSpPr>
+        <p:spPr>
+          <a:xfrm>
+            <a:off x="4024825" y="5128250"/>
+            <a:ext cx="1825503" cy="276999"/>
+          </a:xfrm>
+          <a:prstGeom prst="rect">
+            <a:avLst/>
+          </a:prstGeom>
+          <a:noFill/>
+        </p:spPr>
+        <p:txBody>
+          <a:bodyPr wrap="square">
+            <a:spAutoFit/>
+          </a:bodyPr>
+          <a:lstStyle/>
+          <a:p>
+            <a:r>
+              <a:rPr lang="en-SG" sz="1200" b="1" dirty="0">
+                <a:solidFill>
+                  <a:schemeClr val="accent2">
+                    <a:lumMod val="75000"/>
+                  </a:schemeClr>
+                </a:solidFill>
+              </a:rPr>
+              <a:t>Ninja Malware C2 Hub</a:t>
+            </a:r>
+          </a:p>
+        </p:txBody>
+      </p:sp>
+      <p:cxnSp>
+        <p:nvCxnSpPr>
+          <p:cNvPr id="42" name="Straight Arrow Connector 41">
+            <a:extLst>
+              <a:ext uri="{FF2B5EF4-FFF2-40B4-BE49-F238E27FC236}">
+                <a16:creationId xmlns:a16="http://schemas.microsoft.com/office/drawing/2014/main" id="{BC7A0AC3-9A03-E0B7-37DD-16616CE5805B}"/>
+              </a:ext>
+            </a:extLst>
+          </p:cNvPr>
+          <p:cNvCxnSpPr>
+            <a:cxnSpLocks/>
+          </p:cNvCxnSpPr>
+          <p:nvPr/>
+        </p:nvCxnSpPr>
+        <p:spPr>
+          <a:xfrm>
+            <a:off x="5741524" y="5830089"/>
+            <a:ext cx="1922546" cy="0"/>
+          </a:xfrm>
+          <a:prstGeom prst="straightConnector1">
+            <a:avLst/>
+          </a:prstGeom>
+          <a:ln w="28575">
+            <a:solidFill>
+              <a:srgbClr val="C00000"/>
+            </a:solidFill>
+            <a:prstDash val="sysDash"/>
+            <a:tailEnd type="triangle"/>
+          </a:ln>
+        </p:spPr>
+        <p:style>
+          <a:lnRef idx="2">
+            <a:schemeClr val="accent1"/>
+          </a:lnRef>
+          <a:fillRef idx="0">
+            <a:schemeClr val="accent1"/>
+          </a:fillRef>
+          <a:effectRef idx="1">
+            <a:schemeClr val="accent1"/>
+          </a:effectRef>
+          <a:fontRef idx="minor">
+            <a:schemeClr val="tx1"/>
+          </a:fontRef>
+        </p:style>
+      </p:cxnSp>
+      <p:pic>
+        <p:nvPicPr>
+          <p:cNvPr id="44" name="Picture 43">
+            <a:extLst>
+              <a:ext uri="{FF2B5EF4-FFF2-40B4-BE49-F238E27FC236}">
+                <a16:creationId xmlns:a16="http://schemas.microsoft.com/office/drawing/2014/main" id="{223971EA-2AA9-FBB5-C403-DB4EDCA33A46}"/>
+              </a:ext>
+            </a:extLst>
+          </p:cNvPr>
+          <p:cNvPicPr>
+            <a:picLocks noChangeAspect="1"/>
+          </p:cNvPicPr>
+          <p:nvPr/>
+        </p:nvPicPr>
+        <p:blipFill>
+          <a:blip r:embed="rId15"/>
+          <a:stretch>
+            <a:fillRect/>
+          </a:stretch>
+        </p:blipFill>
+        <p:spPr>
+          <a:xfrm>
+            <a:off x="6070478" y="5438232"/>
+            <a:ext cx="408540" cy="285977"/>
+          </a:xfrm>
+          <a:prstGeom prst="rect">
+            <a:avLst/>
+          </a:prstGeom>
+        </p:spPr>
+      </p:pic>
+      <p:cxnSp>
+        <p:nvCxnSpPr>
+          <p:cNvPr id="45" name="Straight Arrow Connector 44">
+            <a:extLst>
+              <a:ext uri="{FF2B5EF4-FFF2-40B4-BE49-F238E27FC236}">
+                <a16:creationId xmlns:a16="http://schemas.microsoft.com/office/drawing/2014/main" id="{EBF3798E-19DD-A91F-E35C-47D361233980}"/>
+              </a:ext>
+            </a:extLst>
+          </p:cNvPr>
+          <p:cNvCxnSpPr>
+            <a:cxnSpLocks/>
+          </p:cNvCxnSpPr>
+          <p:nvPr/>
+        </p:nvCxnSpPr>
+        <p:spPr>
+          <a:xfrm>
+            <a:off x="8154495" y="5705924"/>
+            <a:ext cx="1500274" cy="0"/>
+          </a:xfrm>
+          <a:prstGeom prst="straightConnector1">
+            <a:avLst/>
+          </a:prstGeom>
+          <a:ln w="28575">
+            <a:solidFill>
+              <a:srgbClr val="C00000"/>
+            </a:solidFill>
+            <a:prstDash val="sysDash"/>
+            <a:tailEnd type="triangle"/>
+          </a:ln>
+        </p:spPr>
+        <p:style>
+          <a:lnRef idx="2">
+            <a:schemeClr val="accent1"/>
+          </a:lnRef>
+          <a:fillRef idx="0">
+            <a:schemeClr val="accent1"/>
+          </a:fillRef>
+          <a:effectRef idx="1">
+            <a:schemeClr val="accent1"/>
+          </a:effectRef>
+          <a:fontRef idx="minor">
+            <a:schemeClr val="tx1"/>
+          </a:fontRef>
+        </p:style>
+      </p:cxnSp>
+      <p:pic>
+        <p:nvPicPr>
+          <p:cNvPr id="47" name="Graphic 46" descr="Target with solid fill">
+            <a:extLst>
+              <a:ext uri="{FF2B5EF4-FFF2-40B4-BE49-F238E27FC236}">
+                <a16:creationId xmlns:a16="http://schemas.microsoft.com/office/drawing/2014/main" id="{420132E1-225E-C7C3-B5EC-39CFF1C81D14}"/>
+              </a:ext>
+            </a:extLst>
+          </p:cNvPr>
+          <p:cNvPicPr>
+            <a:picLocks noChangeAspect="1"/>
+          </p:cNvPicPr>
+          <p:nvPr/>
+        </p:nvPicPr>
+        <p:blipFill>
+          <a:blip r:embed="rId16">
+            <a:extLst>
+              <a:ext uri="{96DAC541-7B7A-43D3-8B79-37D633B846F1}">
+                <asvg:svgBlip xmlns:asvg="http://schemas.microsoft.com/office/drawing/2016/SVG/main" r:embed="rId17"/>
+              </a:ext>
+            </a:extLst>
+          </a:blip>
+          <a:stretch>
+            <a:fillRect/>
+          </a:stretch>
+        </p:blipFill>
+        <p:spPr>
+          <a:xfrm>
+            <a:off x="9754156" y="3828352"/>
+            <a:ext cx="485715" cy="485715"/>
+          </a:xfrm>
+          <a:prstGeom prst="rect">
+            <a:avLst/>
+          </a:prstGeom>
+        </p:spPr>
+      </p:pic>
+      <p:cxnSp>
+        <p:nvCxnSpPr>
+          <p:cNvPr id="49" name="Straight Arrow Connector 48">
+            <a:extLst>
+              <a:ext uri="{FF2B5EF4-FFF2-40B4-BE49-F238E27FC236}">
+                <a16:creationId xmlns:a16="http://schemas.microsoft.com/office/drawing/2014/main" id="{83A5F9BE-AA53-3C60-E3BB-BD8B444A740A}"/>
+              </a:ext>
+            </a:extLst>
+          </p:cNvPr>
+          <p:cNvCxnSpPr>
+            <a:cxnSpLocks/>
+          </p:cNvCxnSpPr>
+          <p:nvPr/>
+        </p:nvCxnSpPr>
+        <p:spPr>
+          <a:xfrm flipV="1">
+            <a:off x="10033424" y="4280282"/>
+            <a:ext cx="0" cy="1216573"/>
+          </a:xfrm>
+          <a:prstGeom prst="straightConnector1">
+            <a:avLst/>
+          </a:prstGeom>
+          <a:ln w="28575">
+            <a:solidFill>
+              <a:srgbClr val="C00000"/>
+            </a:solidFill>
+            <a:prstDash val="sysDash"/>
+            <a:tailEnd type="triangle"/>
+          </a:ln>
+        </p:spPr>
+        <p:style>
+          <a:lnRef idx="2">
+            <a:schemeClr val="accent1"/>
+          </a:lnRef>
+          <a:fillRef idx="0">
+            <a:schemeClr val="accent1"/>
+          </a:fillRef>
+          <a:effectRef idx="1">
+            <a:schemeClr val="accent1"/>
+          </a:effectRef>
+          <a:fontRef idx="minor">
+            <a:schemeClr val="tx1"/>
+          </a:fontRef>
+        </p:style>
+      </p:cxnSp>
+      <p:cxnSp>
+        <p:nvCxnSpPr>
+          <p:cNvPr id="51" name="Straight Arrow Connector 50">
+            <a:extLst>
+              <a:ext uri="{FF2B5EF4-FFF2-40B4-BE49-F238E27FC236}">
+                <a16:creationId xmlns:a16="http://schemas.microsoft.com/office/drawing/2014/main" id="{C393E015-CC53-C051-542F-3B1FE8AAE59D}"/>
+              </a:ext>
+            </a:extLst>
+          </p:cNvPr>
+          <p:cNvCxnSpPr>
+            <a:cxnSpLocks/>
+          </p:cNvCxnSpPr>
+          <p:nvPr/>
+        </p:nvCxnSpPr>
+        <p:spPr>
+          <a:xfrm flipH="1">
+            <a:off x="9503356" y="3573334"/>
+            <a:ext cx="501600" cy="10715"/>
+          </a:xfrm>
+          <a:prstGeom prst="straightConnector1">
+            <a:avLst/>
+          </a:prstGeom>
+          <a:ln w="28575">
+            <a:solidFill>
+              <a:schemeClr val="accent2"/>
+            </a:solidFill>
+            <a:prstDash val="sysDash"/>
+            <a:tailEnd type="triangle"/>
+          </a:ln>
+        </p:spPr>
+        <p:style>
+          <a:lnRef idx="2">
+            <a:schemeClr val="accent1"/>
+          </a:lnRef>
+          <a:fillRef idx="0">
+            <a:schemeClr val="accent1"/>
+          </a:fillRef>
+          <a:effectRef idx="1">
+            <a:schemeClr val="accent1"/>
+          </a:effectRef>
+          <a:fontRef idx="minor">
+            <a:schemeClr val="tx1"/>
+          </a:fontRef>
+        </p:style>
+      </p:cxnSp>
+      <p:cxnSp>
+        <p:nvCxnSpPr>
+          <p:cNvPr id="52" name="Straight Arrow Connector 51">
+            <a:extLst>
+              <a:ext uri="{FF2B5EF4-FFF2-40B4-BE49-F238E27FC236}">
+                <a16:creationId xmlns:a16="http://schemas.microsoft.com/office/drawing/2014/main" id="{48733C62-E33B-7DAB-124D-95E048425861}"/>
+              </a:ext>
+            </a:extLst>
+          </p:cNvPr>
+          <p:cNvCxnSpPr>
+            <a:cxnSpLocks/>
+          </p:cNvCxnSpPr>
+          <p:nvPr/>
+        </p:nvCxnSpPr>
+        <p:spPr>
+          <a:xfrm flipV="1">
+            <a:off x="9249805" y="2392865"/>
+            <a:ext cx="0" cy="1062337"/>
+          </a:xfrm>
+          <a:prstGeom prst="straightConnector1">
+            <a:avLst/>
+          </a:prstGeom>
+          <a:ln w="28575">
+            <a:solidFill>
+              <a:schemeClr val="accent2"/>
+            </a:solidFill>
+            <a:prstDash val="sysDash"/>
+            <a:tailEnd type="triangle"/>
+          </a:ln>
+        </p:spPr>
+        <p:style>
+          <a:lnRef idx="2">
+            <a:schemeClr val="accent1"/>
+          </a:lnRef>
+          <a:fillRef idx="0">
+            <a:schemeClr val="accent1"/>
+          </a:fillRef>
+          <a:effectRef idx="1">
+            <a:schemeClr val="accent1"/>
+          </a:effectRef>
+          <a:fontRef idx="minor">
+            <a:schemeClr val="tx1"/>
+          </a:fontRef>
+        </p:style>
+      </p:cxnSp>
+      <p:cxnSp>
+        <p:nvCxnSpPr>
+          <p:cNvPr id="61" name="Straight Arrow Connector 60">
+            <a:extLst>
+              <a:ext uri="{FF2B5EF4-FFF2-40B4-BE49-F238E27FC236}">
+                <a16:creationId xmlns:a16="http://schemas.microsoft.com/office/drawing/2014/main" id="{E1890D5F-3F2C-AB42-F04D-6B2EB0B2B7C8}"/>
+              </a:ext>
+            </a:extLst>
+          </p:cNvPr>
+          <p:cNvCxnSpPr>
+            <a:cxnSpLocks/>
+          </p:cNvCxnSpPr>
+          <p:nvPr/>
+        </p:nvCxnSpPr>
+        <p:spPr>
+          <a:xfrm flipV="1">
+            <a:off x="10033424" y="3564847"/>
+            <a:ext cx="0" cy="299686"/>
+          </a:xfrm>
+          <a:prstGeom prst="straightConnector1">
+            <a:avLst/>
+          </a:prstGeom>
+          <a:ln w="28575">
+            <a:solidFill>
+              <a:schemeClr val="accent2"/>
+            </a:solidFill>
+            <a:prstDash val="sysDash"/>
+            <a:tailEnd type="triangle"/>
+          </a:ln>
+        </p:spPr>
+        <p:style>
+          <a:lnRef idx="2">
+            <a:schemeClr val="accent1"/>
+          </a:lnRef>
+          <a:fillRef idx="0">
+            <a:schemeClr val="accent1"/>
+          </a:fillRef>
+          <a:effectRef idx="1">
+            <a:schemeClr val="accent1"/>
+          </a:effectRef>
+          <a:fontRef idx="minor">
+            <a:schemeClr val="tx1"/>
+          </a:fontRef>
+        </p:style>
+      </p:cxnSp>
+      <p:pic>
+        <p:nvPicPr>
+          <p:cNvPr id="67" name="Graphic 66" descr="Close with solid fill">
+            <a:extLst>
+              <a:ext uri="{FF2B5EF4-FFF2-40B4-BE49-F238E27FC236}">
+                <a16:creationId xmlns:a16="http://schemas.microsoft.com/office/drawing/2014/main" id="{3C87CC9E-787C-756B-6E41-7AF7B12D197D}"/>
+              </a:ext>
+            </a:extLst>
+          </p:cNvPr>
+          <p:cNvPicPr>
+            <a:picLocks noChangeAspect="1"/>
+          </p:cNvPicPr>
+          <p:nvPr/>
+        </p:nvPicPr>
+        <p:blipFill>
+          <a:blip r:embed="rId18">
+            <a:extLst>
+              <a:ext uri="{96DAC541-7B7A-43D3-8B79-37D633B846F1}">
+                <asvg:svgBlip xmlns:asvg="http://schemas.microsoft.com/office/drawing/2016/SVG/main" r:embed="rId19"/>
+              </a:ext>
+            </a:extLst>
+          </a:blip>
+          <a:stretch>
+            <a:fillRect/>
+          </a:stretch>
+        </p:blipFill>
+        <p:spPr>
+          <a:xfrm>
+            <a:off x="8960360" y="1867626"/>
+            <a:ext cx="578889" cy="578889"/>
+          </a:xfrm>
+          <a:prstGeom prst="rect">
+            <a:avLst/>
+          </a:prstGeom>
+        </p:spPr>
+      </p:pic>
+      <p:cxnSp>
+        <p:nvCxnSpPr>
+          <p:cNvPr id="68" name="Straight Arrow Connector 67">
+            <a:extLst>
+              <a:ext uri="{FF2B5EF4-FFF2-40B4-BE49-F238E27FC236}">
+                <a16:creationId xmlns:a16="http://schemas.microsoft.com/office/drawing/2014/main" id="{B779DDEC-61A2-3F5F-DEAE-AEDA74F3730F}"/>
+              </a:ext>
+            </a:extLst>
+          </p:cNvPr>
+          <p:cNvCxnSpPr>
+            <a:cxnSpLocks/>
+          </p:cNvCxnSpPr>
+          <p:nvPr/>
+        </p:nvCxnSpPr>
+        <p:spPr>
+          <a:xfrm>
+            <a:off x="8234189" y="2379401"/>
+            <a:ext cx="0" cy="543881"/>
+          </a:xfrm>
+          <a:prstGeom prst="straightConnector1">
+            <a:avLst/>
+          </a:prstGeom>
+          <a:ln w="28575">
+            <a:solidFill>
+              <a:schemeClr val="accent2"/>
+            </a:solidFill>
+            <a:prstDash val="sysDash"/>
+            <a:tailEnd type="triangle"/>
+          </a:ln>
+        </p:spPr>
+        <p:style>
+          <a:lnRef idx="2">
+            <a:schemeClr val="accent1"/>
+          </a:lnRef>
+          <a:fillRef idx="0">
+            <a:schemeClr val="accent1"/>
+          </a:fillRef>
+          <a:effectRef idx="1">
+            <a:schemeClr val="accent1"/>
+          </a:effectRef>
+          <a:fontRef idx="minor">
+            <a:schemeClr val="tx1"/>
+          </a:fontRef>
+        </p:style>
+      </p:cxnSp>
+      <p:pic>
+        <p:nvPicPr>
+          <p:cNvPr id="71" name="Graphic 70" descr="Close with solid fill">
+            <a:extLst>
+              <a:ext uri="{FF2B5EF4-FFF2-40B4-BE49-F238E27FC236}">
+                <a16:creationId xmlns:a16="http://schemas.microsoft.com/office/drawing/2014/main" id="{8F5B11E1-CD55-1EA2-9720-09D9F4B32A97}"/>
+              </a:ext>
+            </a:extLst>
+          </p:cNvPr>
+          <p:cNvPicPr>
+            <a:picLocks noChangeAspect="1"/>
+          </p:cNvPicPr>
+          <p:nvPr/>
+        </p:nvPicPr>
+        <p:blipFill>
+          <a:blip r:embed="rId18">
+            <a:extLst>
+              <a:ext uri="{96DAC541-7B7A-43D3-8B79-37D633B846F1}">
+                <asvg:svgBlip xmlns:asvg="http://schemas.microsoft.com/office/drawing/2016/SVG/main" r:embed="rId19"/>
+              </a:ext>
+            </a:extLst>
+          </a:blip>
+          <a:stretch>
+            <a:fillRect/>
+          </a:stretch>
+        </p:blipFill>
+        <p:spPr>
+          <a:xfrm>
+            <a:off x="8377456" y="3090536"/>
+            <a:ext cx="578889" cy="578889"/>
+          </a:xfrm>
+          <a:prstGeom prst="rect">
+            <a:avLst/>
+          </a:prstGeom>
+        </p:spPr>
+      </p:pic>
+      <p:cxnSp>
+        <p:nvCxnSpPr>
+          <p:cNvPr id="85" name="Straight Arrow Connector 84">
+            <a:extLst>
+              <a:ext uri="{FF2B5EF4-FFF2-40B4-BE49-F238E27FC236}">
+                <a16:creationId xmlns:a16="http://schemas.microsoft.com/office/drawing/2014/main" id="{2DA5D462-8DF4-BEEE-55C4-443F4EA7B36D}"/>
+              </a:ext>
+            </a:extLst>
+          </p:cNvPr>
+          <p:cNvCxnSpPr>
+            <a:cxnSpLocks/>
+          </p:cNvCxnSpPr>
+          <p:nvPr/>
+        </p:nvCxnSpPr>
+        <p:spPr>
+          <a:xfrm flipH="1">
+            <a:off x="6580014" y="3122261"/>
+            <a:ext cx="1200830" cy="0"/>
+          </a:xfrm>
+          <a:prstGeom prst="straightConnector1">
+            <a:avLst/>
+          </a:prstGeom>
+          <a:ln w="28575">
+            <a:solidFill>
+              <a:schemeClr val="accent2"/>
+            </a:solidFill>
+            <a:prstDash val="sysDash"/>
+            <a:tailEnd type="triangle"/>
+          </a:ln>
+        </p:spPr>
+        <p:style>
+          <a:lnRef idx="2">
+            <a:schemeClr val="accent1"/>
+          </a:lnRef>
+          <a:fillRef idx="0">
+            <a:schemeClr val="accent1"/>
+          </a:fillRef>
+          <a:effectRef idx="1">
+            <a:schemeClr val="accent1"/>
+          </a:effectRef>
+          <a:fontRef idx="minor">
+            <a:schemeClr val="tx1"/>
+          </a:fontRef>
+        </p:style>
+      </p:cxnSp>
+      <p:cxnSp>
+        <p:nvCxnSpPr>
+          <p:cNvPr id="91" name="Straight Arrow Connector 90">
+            <a:extLst>
+              <a:ext uri="{FF2B5EF4-FFF2-40B4-BE49-F238E27FC236}">
+                <a16:creationId xmlns:a16="http://schemas.microsoft.com/office/drawing/2014/main" id="{452D5ADA-A0DD-92C5-D912-B9F2E66881F6}"/>
+              </a:ext>
+            </a:extLst>
+          </p:cNvPr>
+          <p:cNvCxnSpPr>
+            <a:cxnSpLocks/>
+          </p:cNvCxnSpPr>
+          <p:nvPr/>
+        </p:nvCxnSpPr>
+        <p:spPr>
+          <a:xfrm flipV="1">
+            <a:off x="3901009" y="2018370"/>
+            <a:ext cx="0" cy="1227001"/>
+          </a:xfrm>
+          <a:prstGeom prst="straightConnector1">
+            <a:avLst/>
+          </a:prstGeom>
+          <a:ln w="28575">
+            <a:solidFill>
+              <a:schemeClr val="accent2"/>
+            </a:solidFill>
+            <a:prstDash val="sysDash"/>
+            <a:tailEnd type="triangle"/>
+          </a:ln>
+        </p:spPr>
+        <p:style>
+          <a:lnRef idx="2">
+            <a:schemeClr val="accent1"/>
+          </a:lnRef>
+          <a:fillRef idx="0">
+            <a:schemeClr val="accent1"/>
+          </a:fillRef>
+          <a:effectRef idx="1">
+            <a:schemeClr val="accent1"/>
+          </a:effectRef>
+          <a:fontRef idx="minor">
+            <a:schemeClr val="tx1"/>
+          </a:fontRef>
+        </p:style>
+      </p:cxnSp>
+      <p:cxnSp>
+        <p:nvCxnSpPr>
+          <p:cNvPr id="31" name="Straight Arrow Connector 30">
+            <a:extLst>
+              <a:ext uri="{FF2B5EF4-FFF2-40B4-BE49-F238E27FC236}">
+                <a16:creationId xmlns:a16="http://schemas.microsoft.com/office/drawing/2014/main" id="{365D747E-0A21-BDA5-A1AB-FEC6E963768F}"/>
+              </a:ext>
+            </a:extLst>
+          </p:cNvPr>
+          <p:cNvCxnSpPr>
+            <a:cxnSpLocks/>
+          </p:cNvCxnSpPr>
+          <p:nvPr/>
+        </p:nvCxnSpPr>
+        <p:spPr>
+          <a:xfrm flipH="1">
+            <a:off x="1855126" y="1958802"/>
+            <a:ext cx="1986318" cy="0"/>
+          </a:xfrm>
+          <a:prstGeom prst="straightConnector1">
+            <a:avLst/>
+          </a:prstGeom>
+          <a:ln w="28575">
+            <a:solidFill>
+              <a:schemeClr val="accent2"/>
+            </a:solidFill>
+            <a:prstDash val="sysDash"/>
+            <a:tailEnd type="triangle"/>
+          </a:ln>
+        </p:spPr>
+        <p:style>
+          <a:lnRef idx="2">
+            <a:schemeClr val="accent1"/>
+          </a:lnRef>
+          <a:fillRef idx="0">
+            <a:schemeClr val="accent1"/>
+          </a:fillRef>
+          <a:effectRef idx="1">
+            <a:schemeClr val="accent1"/>
+          </a:effectRef>
+          <a:fontRef idx="minor">
+            <a:schemeClr val="tx1"/>
+          </a:fontRef>
+        </p:style>
+      </p:cxnSp>
+      <p:cxnSp>
+        <p:nvCxnSpPr>
+          <p:cNvPr id="35" name="Straight Arrow Connector 34">
+            <a:extLst>
+              <a:ext uri="{FF2B5EF4-FFF2-40B4-BE49-F238E27FC236}">
+                <a16:creationId xmlns:a16="http://schemas.microsoft.com/office/drawing/2014/main" id="{578C640E-CCC3-E1EE-EB9B-783D7653E166}"/>
+              </a:ext>
+            </a:extLst>
+          </p:cNvPr>
+          <p:cNvCxnSpPr>
+            <a:cxnSpLocks/>
+          </p:cNvCxnSpPr>
+          <p:nvPr/>
+        </p:nvCxnSpPr>
+        <p:spPr>
+          <a:xfrm>
+            <a:off x="1425245" y="2303279"/>
+            <a:ext cx="0" cy="314781"/>
+          </a:xfrm>
+          <a:prstGeom prst="straightConnector1">
+            <a:avLst/>
+          </a:prstGeom>
+          <a:ln w="28575">
+            <a:solidFill>
+              <a:schemeClr val="accent2"/>
+            </a:solidFill>
+            <a:prstDash val="sysDash"/>
+            <a:tailEnd type="triangle"/>
+          </a:ln>
+        </p:spPr>
+        <p:style>
+          <a:lnRef idx="2">
+            <a:schemeClr val="accent1"/>
+          </a:lnRef>
+          <a:fillRef idx="0">
+            <a:schemeClr val="accent1"/>
+          </a:fillRef>
+          <a:effectRef idx="1">
+            <a:schemeClr val="accent1"/>
+          </a:effectRef>
+          <a:fontRef idx="minor">
+            <a:schemeClr val="tx1"/>
+          </a:fontRef>
+        </p:style>
+      </p:cxnSp>
+      <p:pic>
+        <p:nvPicPr>
+          <p:cNvPr id="39" name="Graphic 38" descr="Close with solid fill">
+            <a:extLst>
+              <a:ext uri="{FF2B5EF4-FFF2-40B4-BE49-F238E27FC236}">
+                <a16:creationId xmlns:a16="http://schemas.microsoft.com/office/drawing/2014/main" id="{37463A89-2773-03F8-27DA-EC2BF47AB984}"/>
+              </a:ext>
+            </a:extLst>
+          </p:cNvPr>
+          <p:cNvPicPr>
+            <a:picLocks noChangeAspect="1"/>
+          </p:cNvPicPr>
+          <p:nvPr/>
+        </p:nvPicPr>
+        <p:blipFill>
+          <a:blip r:embed="rId18">
+            <a:extLst>
+              <a:ext uri="{96DAC541-7B7A-43D3-8B79-37D633B846F1}">
+                <asvg:svgBlip xmlns:asvg="http://schemas.microsoft.com/office/drawing/2016/SVG/main" r:embed="rId19"/>
+              </a:ext>
+            </a:extLst>
+          </a:blip>
+          <a:stretch>
+            <a:fillRect/>
+          </a:stretch>
+        </p:blipFill>
+        <p:spPr>
+          <a:xfrm>
+            <a:off x="1278102" y="1811550"/>
+            <a:ext cx="473220" cy="473220"/>
+          </a:xfrm>
+          <a:prstGeom prst="rect">
+            <a:avLst/>
+          </a:prstGeom>
+        </p:spPr>
+      </p:pic>
+      <p:pic>
+        <p:nvPicPr>
+          <p:cNvPr id="43" name="Graphic 42" descr="Close with solid fill">
+            <a:extLst>
+              <a:ext uri="{FF2B5EF4-FFF2-40B4-BE49-F238E27FC236}">
+                <a16:creationId xmlns:a16="http://schemas.microsoft.com/office/drawing/2014/main" id="{BEB3089F-4000-9F32-03C5-D03C39002E24}"/>
+              </a:ext>
+            </a:extLst>
+          </p:cNvPr>
+          <p:cNvPicPr>
+            <a:picLocks noChangeAspect="1"/>
+          </p:cNvPicPr>
+          <p:nvPr/>
+        </p:nvPicPr>
+        <p:blipFill>
+          <a:blip r:embed="rId18">
+            <a:extLst>
+              <a:ext uri="{96DAC541-7B7A-43D3-8B79-37D633B846F1}">
+                <asvg:svgBlip xmlns:asvg="http://schemas.microsoft.com/office/drawing/2016/SVG/main" r:embed="rId19"/>
+              </a:ext>
+            </a:extLst>
+          </a:blip>
+          <a:stretch>
+            <a:fillRect/>
+          </a:stretch>
+        </p:blipFill>
+        <p:spPr>
+          <a:xfrm>
+            <a:off x="1339113" y="2714536"/>
+            <a:ext cx="692593" cy="692593"/>
+          </a:xfrm>
+          <a:prstGeom prst="rect">
+            <a:avLst/>
+          </a:prstGeom>
+        </p:spPr>
+      </p:pic>
+      <p:pic>
+        <p:nvPicPr>
+          <p:cNvPr id="46" name="Graphic 45" descr="Close with solid fill">
+            <a:extLst>
+              <a:ext uri="{FF2B5EF4-FFF2-40B4-BE49-F238E27FC236}">
+                <a16:creationId xmlns:a16="http://schemas.microsoft.com/office/drawing/2014/main" id="{B4CCDD2E-FE9A-54BB-BD6D-1247B7EA54D4}"/>
+              </a:ext>
+            </a:extLst>
+          </p:cNvPr>
+          <p:cNvPicPr>
+            <a:picLocks noChangeAspect="1"/>
+          </p:cNvPicPr>
+          <p:nvPr/>
+        </p:nvPicPr>
+        <p:blipFill>
+          <a:blip r:embed="rId18">
+            <a:extLst>
+              <a:ext uri="{96DAC541-7B7A-43D3-8B79-37D633B846F1}">
+                <asvg:svgBlip xmlns:asvg="http://schemas.microsoft.com/office/drawing/2016/SVG/main" r:embed="rId19"/>
+              </a:ext>
+            </a:extLst>
+          </a:blip>
+          <a:stretch>
+            <a:fillRect/>
+          </a:stretch>
+        </p:blipFill>
+        <p:spPr>
+          <a:xfrm>
+            <a:off x="5751566" y="2630939"/>
+            <a:ext cx="692593" cy="692593"/>
+          </a:xfrm>
+          <a:prstGeom prst="rect">
+            <a:avLst/>
+          </a:prstGeom>
+        </p:spPr>
+      </p:pic>
+      <p:sp>
+        <p:nvSpPr>
+          <p:cNvPr id="50" name="TextBox 49">
+            <a:extLst>
+              <a:ext uri="{FF2B5EF4-FFF2-40B4-BE49-F238E27FC236}">
+                <a16:creationId xmlns:a16="http://schemas.microsoft.com/office/drawing/2014/main" id="{28A0BBF6-8875-030A-30A5-46A728EB94F5}"/>
+              </a:ext>
+            </a:extLst>
+          </p:cNvPr>
+          <p:cNvSpPr txBox="1"/>
+          <p:nvPr/>
+        </p:nvSpPr>
+        <p:spPr>
+          <a:xfrm>
+            <a:off x="4984080" y="6176730"/>
+            <a:ext cx="925288" cy="307777"/>
+          </a:xfrm>
+          <a:prstGeom prst="rect">
+            <a:avLst/>
+          </a:prstGeom>
+          <a:noFill/>
+        </p:spPr>
+        <p:txBody>
+          <a:bodyPr wrap="square">
+            <a:spAutoFit/>
+          </a:bodyPr>
+          <a:lstStyle/>
+          <a:p>
+            <a:r>
+              <a:rPr lang="en-SG" sz="1400" b="1" dirty="0">
+                <a:solidFill>
+                  <a:srgbClr val="7030A0"/>
+                </a:solidFill>
+              </a:rPr>
+              <a:t>Internet</a:t>
+            </a:r>
+            <a:r>
+              <a:rPr lang="en-SG" sz="1200" b="1" dirty="0">
+                <a:solidFill>
+                  <a:srgbClr val="7030A0"/>
+                </a:solidFill>
+              </a:rPr>
+              <a:t> </a:t>
+            </a:r>
+          </a:p>
+        </p:txBody>
+      </p:sp>
+      <p:sp>
+        <p:nvSpPr>
+          <p:cNvPr id="53" name="TextBox 52">
+            <a:extLst>
+              <a:ext uri="{FF2B5EF4-FFF2-40B4-BE49-F238E27FC236}">
+                <a16:creationId xmlns:a16="http://schemas.microsoft.com/office/drawing/2014/main" id="{85CC67C7-444D-1E58-43D7-FBC43D6FCA4B}"/>
+              </a:ext>
+            </a:extLst>
+          </p:cNvPr>
+          <p:cNvSpPr txBox="1"/>
+          <p:nvPr/>
+        </p:nvSpPr>
+        <p:spPr>
+          <a:xfrm>
+            <a:off x="962918" y="5048025"/>
+            <a:ext cx="1038857" cy="461665"/>
+          </a:xfrm>
+          <a:prstGeom prst="rect">
+            <a:avLst/>
+          </a:prstGeom>
+          <a:noFill/>
+        </p:spPr>
+        <p:txBody>
+          <a:bodyPr wrap="square">
+            <a:spAutoFit/>
+          </a:bodyPr>
+          <a:lstStyle/>
+          <a:p>
+            <a:r>
+              <a:rPr lang="en-SG" sz="1200" b="1" dirty="0">
+                <a:solidFill>
+                  <a:schemeClr val="accent2">
+                    <a:lumMod val="75000"/>
+                  </a:schemeClr>
+                </a:solidFill>
+              </a:rPr>
+              <a:t>Red team attacker </a:t>
+            </a:r>
+          </a:p>
+        </p:txBody>
+      </p:sp>
+      <p:pic>
+        <p:nvPicPr>
+          <p:cNvPr id="54" name="Graphic 53" descr="Target with solid fill">
+            <a:extLst>
+              <a:ext uri="{FF2B5EF4-FFF2-40B4-BE49-F238E27FC236}">
+                <a16:creationId xmlns:a16="http://schemas.microsoft.com/office/drawing/2014/main" id="{782287CC-C3A9-8243-AFBE-2935A8BB1A6E}"/>
+              </a:ext>
+            </a:extLst>
+          </p:cNvPr>
+          <p:cNvPicPr>
+            <a:picLocks noChangeAspect="1"/>
+          </p:cNvPicPr>
+          <p:nvPr/>
+        </p:nvPicPr>
+        <p:blipFill>
+          <a:blip r:embed="rId16">
+            <a:extLst>
+              <a:ext uri="{96DAC541-7B7A-43D3-8B79-37D633B846F1}">
+                <asvg:svgBlip xmlns:asvg="http://schemas.microsoft.com/office/drawing/2016/SVG/main" r:embed="rId17"/>
+              </a:ext>
+            </a:extLst>
+          </a:blip>
+          <a:stretch>
+            <a:fillRect/>
+          </a:stretch>
+        </p:blipFill>
+        <p:spPr>
+          <a:xfrm>
+            <a:off x="6206563" y="6086951"/>
+            <a:ext cx="397053" cy="397053"/>
+          </a:xfrm>
+          <a:prstGeom prst="rect">
+            <a:avLst/>
+          </a:prstGeom>
+        </p:spPr>
+      </p:pic>
+      <p:sp>
+        <p:nvSpPr>
+          <p:cNvPr id="55" name="TextBox 54">
+            <a:extLst>
+              <a:ext uri="{FF2B5EF4-FFF2-40B4-BE49-F238E27FC236}">
+                <a16:creationId xmlns:a16="http://schemas.microsoft.com/office/drawing/2014/main" id="{C97BF45B-6277-0B91-C8B7-80B854D6A960}"/>
+              </a:ext>
+            </a:extLst>
+          </p:cNvPr>
+          <p:cNvSpPr txBox="1"/>
+          <p:nvPr/>
+        </p:nvSpPr>
+        <p:spPr>
+          <a:xfrm>
+            <a:off x="6580014" y="6149432"/>
+            <a:ext cx="2097282" cy="276999"/>
+          </a:xfrm>
+          <a:prstGeom prst="rect">
+            <a:avLst/>
+          </a:prstGeom>
+          <a:noFill/>
+        </p:spPr>
+        <p:txBody>
+          <a:bodyPr wrap="square">
+            <a:spAutoFit/>
+          </a:bodyPr>
+          <a:lstStyle/>
+          <a:p>
+            <a:r>
+              <a:rPr lang="en-US" sz="1200" b="1" dirty="0">
+                <a:solidFill>
+                  <a:srgbClr val="C00000"/>
+                </a:solidFill>
+              </a:rPr>
+              <a:t>Attack direct target VM</a:t>
+            </a:r>
+            <a:endParaRPr lang="en-SG" sz="1200" b="1" dirty="0">
+              <a:solidFill>
+                <a:srgbClr val="C00000"/>
+              </a:solidFill>
+            </a:endParaRPr>
+          </a:p>
+        </p:txBody>
+      </p:sp>
+      <p:pic>
+        <p:nvPicPr>
+          <p:cNvPr id="56" name="Graphic 55" descr="Close with solid fill">
+            <a:extLst>
+              <a:ext uri="{FF2B5EF4-FFF2-40B4-BE49-F238E27FC236}">
+                <a16:creationId xmlns:a16="http://schemas.microsoft.com/office/drawing/2014/main" id="{FE0A9D5A-48B4-940C-7DBB-CD090BF90848}"/>
+              </a:ext>
+            </a:extLst>
+          </p:cNvPr>
+          <p:cNvPicPr>
+            <a:picLocks noChangeAspect="1"/>
+          </p:cNvPicPr>
+          <p:nvPr/>
+        </p:nvPicPr>
+        <p:blipFill>
+          <a:blip r:embed="rId18">
+            <a:extLst>
+              <a:ext uri="{96DAC541-7B7A-43D3-8B79-37D633B846F1}">
+                <asvg:svgBlip xmlns:asvg="http://schemas.microsoft.com/office/drawing/2016/SVG/main" r:embed="rId19"/>
+              </a:ext>
+            </a:extLst>
+          </a:blip>
+          <a:stretch>
+            <a:fillRect/>
+          </a:stretch>
+        </p:blipFill>
+        <p:spPr>
+          <a:xfrm>
+            <a:off x="8551642" y="6123116"/>
+            <a:ext cx="369824" cy="369824"/>
+          </a:xfrm>
+          <a:prstGeom prst="rect">
+            <a:avLst/>
+          </a:prstGeom>
+        </p:spPr>
+      </p:pic>
+      <p:sp>
+        <p:nvSpPr>
+          <p:cNvPr id="57" name="TextBox 56">
+            <a:extLst>
+              <a:ext uri="{FF2B5EF4-FFF2-40B4-BE49-F238E27FC236}">
+                <a16:creationId xmlns:a16="http://schemas.microsoft.com/office/drawing/2014/main" id="{A01099D9-1D19-1B80-2931-E84E86C694C4}"/>
+              </a:ext>
+            </a:extLst>
+          </p:cNvPr>
+          <p:cNvSpPr txBox="1"/>
+          <p:nvPr/>
+        </p:nvSpPr>
+        <p:spPr>
+          <a:xfrm>
+            <a:off x="8888387" y="6097186"/>
+            <a:ext cx="2026066" cy="461665"/>
+          </a:xfrm>
+          <a:prstGeom prst="rect">
+            <a:avLst/>
+          </a:prstGeom>
+          <a:noFill/>
+        </p:spPr>
+        <p:txBody>
+          <a:bodyPr wrap="square">
+            <a:spAutoFit/>
+          </a:bodyPr>
+          <a:lstStyle/>
+          <a:p>
+            <a:r>
+              <a:rPr lang="en-US" sz="1200" b="1" dirty="0">
+                <a:solidFill>
+                  <a:srgbClr val="C00000"/>
+                </a:solidFill>
+              </a:rPr>
+              <a:t>VM effected during the attack progress </a:t>
+            </a:r>
+            <a:endParaRPr lang="en-SG" sz="1200" b="1" dirty="0">
+              <a:solidFill>
+                <a:srgbClr val="C00000"/>
+              </a:solidFill>
+            </a:endParaRPr>
+          </a:p>
+        </p:txBody>
+      </p:sp>
+    </p:spTree>
+    <p:extLst>
+      <p:ext uri="{BB962C8B-B14F-4D97-AF65-F5344CB8AC3E}">
+        <p14:creationId xmlns:p14="http://schemas.microsoft.com/office/powerpoint/2010/main" val="2967072913"/>
       </p:ext>
     </p:extLst>
   </p:cSld>
@@ -10268,4 +14910,319 @@
     </a:ext>
   </a:extLst>
 </a:theme>
+</file>
+
+<file path=ppt/theme/theme2.xml><?xml version="1.0" encoding="utf-8"?>
+<a:theme xmlns:a="http://schemas.openxmlformats.org/drawingml/2006/main" name="Office Theme">
+  <a:themeElements>
+    <a:clrScheme name="Office">
+      <a:dk1>
+        <a:sysClr val="windowText" lastClr="000000"/>
+      </a:dk1>
+      <a:lt1>
+        <a:sysClr val="window" lastClr="FFFFFF"/>
+      </a:lt1>
+      <a:dk2>
+        <a:srgbClr val="0E2841"/>
+      </a:dk2>
+      <a:lt2>
+        <a:srgbClr val="E8E8E8"/>
+      </a:lt2>
+      <a:accent1>
+        <a:srgbClr val="156082"/>
+      </a:accent1>
+      <a:accent2>
+        <a:srgbClr val="E97132"/>
+      </a:accent2>
+      <a:accent3>
+        <a:srgbClr val="196B24"/>
+      </a:accent3>
+      <a:accent4>
+        <a:srgbClr val="0F9ED5"/>
+      </a:accent4>
+      <a:accent5>
+        <a:srgbClr val="A02B93"/>
+      </a:accent5>
+      <a:accent6>
+        <a:srgbClr val="4EA72E"/>
+      </a:accent6>
+      <a:hlink>
+        <a:srgbClr val="467886"/>
+      </a:hlink>
+      <a:folHlink>
+        <a:srgbClr val="96607D"/>
+      </a:folHlink>
+    </a:clrScheme>
+    <a:fontScheme name="Office">
+      <a:majorFont>
+        <a:latin typeface="Aptos Display" panose="02110004020202020204"/>
+        <a:ea typeface=""/>
+        <a:cs typeface=""/>
+        <a:font script="Jpan" typeface="游ゴシック Light"/>
+        <a:font script="Hang" typeface="맑은 고딕"/>
+        <a:font script="Hans" typeface="等线 Light"/>
+        <a:font script="Hant" typeface="新細明體"/>
+        <a:font script="Arab" typeface="Times New Roman"/>
+        <a:font script="Hebr" typeface="Times New Roman"/>
+        <a:font script="Thai" typeface="Angsana New"/>
+        <a:font script="Ethi" typeface="Nyala"/>
+        <a:font script="Beng" typeface="Vrinda"/>
+        <a:font script="Gujr" typeface="Shruti"/>
+        <a:font script="Khmr" typeface="MoolBoran"/>
+        <a:font script="Knda" typeface="Tunga"/>
+        <a:font script="Guru" typeface="Raavi"/>
+        <a:font script="Cans" typeface="Euphemia"/>
+        <a:font script="Cher" typeface="Plantagenet Cherokee"/>
+        <a:font script="Yiii" typeface="Microsoft Yi Baiti"/>
+        <a:font script="Tibt" typeface="Microsoft Himalaya"/>
+        <a:font script="Thaa" typeface="MV Boli"/>
+        <a:font script="Deva" typeface="Mangal"/>
+        <a:font script="Telu" typeface="Gautami"/>
+        <a:font script="Taml" typeface="Latha"/>
+        <a:font script="Syrc" typeface="Estrangelo Edessa"/>
+        <a:font script="Orya" typeface="Kalinga"/>
+        <a:font script="Mlym" typeface="Kartika"/>
+        <a:font script="Laoo" typeface="DokChampa"/>
+        <a:font script="Sinh" typeface="Iskoola Pota"/>
+        <a:font script="Mong" typeface="Mongolian Baiti"/>
+        <a:font script="Viet" typeface="Times New Roman"/>
+        <a:font script="Uigh" typeface="Microsoft Uighur"/>
+        <a:font script="Geor" typeface="Sylfaen"/>
+        <a:font script="Armn" typeface="Arial"/>
+        <a:font script="Bugi" typeface="Leelawadee UI"/>
+        <a:font script="Bopo" typeface="Microsoft JhengHei"/>
+        <a:font script="Java" typeface="Javanese Text"/>
+        <a:font script="Lisu" typeface="Segoe UI"/>
+        <a:font script="Mymr" typeface="Myanmar Text"/>
+        <a:font script="Nkoo" typeface="Ebrima"/>
+        <a:font script="Olck" typeface="Nirmala UI"/>
+        <a:font script="Osma" typeface="Ebrima"/>
+        <a:font script="Phag" typeface="Phagspa"/>
+        <a:font script="Syrn" typeface="Estrangelo Edessa"/>
+        <a:font script="Syrj" typeface="Estrangelo Edessa"/>
+        <a:font script="Syre" typeface="Estrangelo Edessa"/>
+        <a:font script="Sora" typeface="Nirmala UI"/>
+        <a:font script="Tale" typeface="Microsoft Tai Le"/>
+        <a:font script="Talu" typeface="Microsoft New Tai Lue"/>
+        <a:font script="Tfng" typeface="Ebrima"/>
+      </a:majorFont>
+      <a:minorFont>
+        <a:latin typeface="Aptos" panose="02110004020202020204"/>
+        <a:ea typeface=""/>
+        <a:cs typeface=""/>
+        <a:font script="Jpan" typeface="游ゴシック"/>
+        <a:font script="Hang" typeface="맑은 고딕"/>
+        <a:font script="Hans" typeface="等线"/>
+        <a:font script="Hant" typeface="新細明體"/>
+        <a:font script="Arab" typeface="Arial"/>
+        <a:font script="Hebr" typeface="Arial"/>
+        <a:font script="Thai" typeface="Cordia New"/>
+        <a:font script="Ethi" typeface="Nyala"/>
+        <a:font script="Beng" typeface="Vrinda"/>
+        <a:font script="Gujr" typeface="Shruti"/>
+        <a:font script="Khmr" typeface="DaunPenh"/>
+        <a:font script="Knda" typeface="Tunga"/>
+        <a:font script="Guru" typeface="Raavi"/>
+        <a:font script="Cans" typeface="Euphemia"/>
+        <a:font script="Cher" typeface="Plantagenet Cherokee"/>
+        <a:font script="Yiii" typeface="Microsoft Yi Baiti"/>
+        <a:font script="Tibt" typeface="Microsoft Himalaya"/>
+        <a:font script="Thaa" typeface="MV Boli"/>
+        <a:font script="Deva" typeface="Mangal"/>
+        <a:font script="Telu" typeface="Gautami"/>
+        <a:font script="Taml" typeface="Latha"/>
+        <a:font script="Syrc" typeface="Estrangelo Edessa"/>
+        <a:font script="Orya" typeface="Kalinga"/>
+        <a:font script="Mlym" typeface="Kartika"/>
+        <a:font script="Laoo" typeface="DokChampa"/>
+        <a:font script="Sinh" typeface="Iskoola Pota"/>
+        <a:font script="Mong" typeface="Mongolian Baiti"/>
+        <a:font script="Viet" typeface="Arial"/>
+        <a:font script="Uigh" typeface="Microsoft Uighur"/>
+        <a:font script="Geor" typeface="Sylfaen"/>
+        <a:font script="Armn" typeface="Arial"/>
+        <a:font script="Bugi" typeface="Leelawadee UI"/>
+        <a:font script="Bopo" typeface="Microsoft JhengHei"/>
+        <a:font script="Java" typeface="Javanese Text"/>
+        <a:font script="Lisu" typeface="Segoe UI"/>
+        <a:font script="Mymr" typeface="Myanmar Text"/>
+        <a:font script="Nkoo" typeface="Ebrima"/>
+        <a:font script="Olck" typeface="Nirmala UI"/>
+        <a:font script="Osma" typeface="Ebrima"/>
+        <a:font script="Phag" typeface="Phagspa"/>
+        <a:font script="Syrn" typeface="Estrangelo Edessa"/>
+        <a:font script="Syrj" typeface="Estrangelo Edessa"/>
+        <a:font script="Syre" typeface="Estrangelo Edessa"/>
+        <a:font script="Sora" typeface="Nirmala UI"/>
+        <a:font script="Tale" typeface="Microsoft Tai Le"/>
+        <a:font script="Talu" typeface="Microsoft New Tai Lue"/>
+        <a:font script="Tfng" typeface="Ebrima"/>
+      </a:minorFont>
+    </a:fontScheme>
+    <a:fmtScheme name="Office">
+      <a:fillStyleLst>
+        <a:solidFill>
+          <a:schemeClr val="phClr"/>
+        </a:solidFill>
+        <a:gradFill rotWithShape="1">
+          <a:gsLst>
+            <a:gs pos="0">
+              <a:schemeClr val="phClr">
+                <a:lumMod val="110000"/>
+                <a:satMod val="105000"/>
+                <a:tint val="67000"/>
+              </a:schemeClr>
+            </a:gs>
+            <a:gs pos="50000">
+              <a:schemeClr val="phClr">
+                <a:lumMod val="105000"/>
+                <a:satMod val="103000"/>
+                <a:tint val="73000"/>
+              </a:schemeClr>
+            </a:gs>
+            <a:gs pos="100000">
+              <a:schemeClr val="phClr">
+                <a:lumMod val="105000"/>
+                <a:satMod val="109000"/>
+                <a:tint val="81000"/>
+              </a:schemeClr>
+            </a:gs>
+          </a:gsLst>
+          <a:lin ang="5400000" scaled="0"/>
+        </a:gradFill>
+        <a:gradFill rotWithShape="1">
+          <a:gsLst>
+            <a:gs pos="0">
+              <a:schemeClr val="phClr">
+                <a:satMod val="103000"/>
+                <a:lumMod val="102000"/>
+                <a:tint val="94000"/>
+              </a:schemeClr>
+            </a:gs>
+            <a:gs pos="50000">
+              <a:schemeClr val="phClr">
+                <a:satMod val="110000"/>
+                <a:lumMod val="100000"/>
+                <a:shade val="100000"/>
+              </a:schemeClr>
+            </a:gs>
+            <a:gs pos="100000">
+              <a:schemeClr val="phClr">
+                <a:lumMod val="99000"/>
+                <a:satMod val="120000"/>
+                <a:shade val="78000"/>
+              </a:schemeClr>
+            </a:gs>
+          </a:gsLst>
+          <a:lin ang="5400000" scaled="0"/>
+        </a:gradFill>
+      </a:fillStyleLst>
+      <a:lnStyleLst>
+        <a:ln w="12700" cap="flat" cmpd="sng" algn="ctr">
+          <a:solidFill>
+            <a:schemeClr val="phClr"/>
+          </a:solidFill>
+          <a:prstDash val="solid"/>
+          <a:miter lim="800000"/>
+        </a:ln>
+        <a:ln w="19050" cap="flat" cmpd="sng" algn="ctr">
+          <a:solidFill>
+            <a:schemeClr val="phClr"/>
+          </a:solidFill>
+          <a:prstDash val="solid"/>
+          <a:miter lim="800000"/>
+        </a:ln>
+        <a:ln w="25400" cap="flat" cmpd="sng" algn="ctr">
+          <a:solidFill>
+            <a:schemeClr val="phClr"/>
+          </a:solidFill>
+          <a:prstDash val="solid"/>
+          <a:miter lim="800000"/>
+        </a:ln>
+      </a:lnStyleLst>
+      <a:effectStyleLst>
+        <a:effectStyle>
+          <a:effectLst/>
+        </a:effectStyle>
+        <a:effectStyle>
+          <a:effectLst/>
+        </a:effectStyle>
+        <a:effectStyle>
+          <a:effectLst>
+            <a:outerShdw blurRad="57150" dist="19050" dir="5400000" algn="ctr" rotWithShape="0">
+              <a:srgbClr val="000000">
+                <a:alpha val="63000"/>
+              </a:srgbClr>
+            </a:outerShdw>
+          </a:effectLst>
+        </a:effectStyle>
+      </a:effectStyleLst>
+      <a:bgFillStyleLst>
+        <a:solidFill>
+          <a:schemeClr val="phClr"/>
+        </a:solidFill>
+        <a:solidFill>
+          <a:schemeClr val="phClr">
+            <a:tint val="95000"/>
+            <a:satMod val="170000"/>
+          </a:schemeClr>
+        </a:solidFill>
+        <a:gradFill rotWithShape="1">
+          <a:gsLst>
+            <a:gs pos="0">
+              <a:schemeClr val="phClr">
+                <a:tint val="93000"/>
+                <a:satMod val="150000"/>
+                <a:shade val="98000"/>
+                <a:lumMod val="102000"/>
+              </a:schemeClr>
+            </a:gs>
+            <a:gs pos="50000">
+              <a:schemeClr val="phClr">
+                <a:tint val="98000"/>
+                <a:satMod val="130000"/>
+                <a:shade val="90000"/>
+                <a:lumMod val="103000"/>
+              </a:schemeClr>
+            </a:gs>
+            <a:gs pos="100000">
+              <a:schemeClr val="phClr">
+                <a:shade val="63000"/>
+                <a:satMod val="120000"/>
+              </a:schemeClr>
+            </a:gs>
+          </a:gsLst>
+          <a:lin ang="5400000" scaled="0"/>
+        </a:gradFill>
+      </a:bgFillStyleLst>
+    </a:fmtScheme>
+  </a:themeElements>
+  <a:objectDefaults>
+    <a:lnDef>
+      <a:spPr/>
+      <a:bodyPr/>
+      <a:lstStyle/>
+      <a:style>
+        <a:lnRef idx="2">
+          <a:schemeClr val="accent1"/>
+        </a:lnRef>
+        <a:fillRef idx="0">
+          <a:schemeClr val="accent1"/>
+        </a:fillRef>
+        <a:effectRef idx="1">
+          <a:schemeClr val="accent1"/>
+        </a:effectRef>
+        <a:fontRef idx="minor">
+          <a:schemeClr val="tx1"/>
+        </a:fontRef>
+      </a:style>
+    </a:lnDef>
+  </a:objectDefaults>
+  <a:extraClrSchemeLst/>
+  <a:extLst>
+    <a:ext uri="{05A4C25C-085E-4340-85A3-A5531E510DB2}">
+      <thm15:themeFamily xmlns:thm15="http://schemas.microsoft.com/office/thememl/2012/main" name="Office Theme" id="{2E142A2C-CD16-42D6-873A-C26D2A0506FA}" vid="{1BDDFF52-6CD6-40A5-AB3C-68EB2F1E4D0A}"/>
+    </a:ext>
+  </a:extLst>
+</a:theme>
 </file>
</xml_diff>